<commit_message>
[add] remove error commit
</commit_message>
<xml_diff>
--- a/2019_0627_Git_Share_HA.pptx
+++ b/2019_0627_Git_Share_HA.pptx
@@ -5,18 +5,20 @@
     <p:sldMasterId id="2147483648" r:id="rId1"/>
   </p:sldMasterIdLst>
   <p:notesMasterIdLst>
-    <p:notesMasterId r:id="rId11"/>
+    <p:notesMasterId r:id="rId13"/>
   </p:notesMasterIdLst>
   <p:sldIdLst>
     <p:sldId id="256" r:id="rId2"/>
     <p:sldId id="257" r:id="rId3"/>
     <p:sldId id="259" r:id="rId4"/>
-    <p:sldId id="260" r:id="rId5"/>
-    <p:sldId id="261" r:id="rId6"/>
-    <p:sldId id="262" r:id="rId7"/>
-    <p:sldId id="264" r:id="rId8"/>
-    <p:sldId id="263" r:id="rId9"/>
-    <p:sldId id="258" r:id="rId10"/>
+    <p:sldId id="265" r:id="rId5"/>
+    <p:sldId id="266" r:id="rId6"/>
+    <p:sldId id="260" r:id="rId7"/>
+    <p:sldId id="261" r:id="rId8"/>
+    <p:sldId id="262" r:id="rId9"/>
+    <p:sldId id="264" r:id="rId10"/>
+    <p:sldId id="263" r:id="rId11"/>
+    <p:sldId id="258" r:id="rId12"/>
   </p:sldIdLst>
   <p:sldSz cx="9144000" cy="6858000" type="screen4x3"/>
   <p:notesSz cx="6858000" cy="9144000"/>
@@ -3866,7 +3868,7 @@
 </p:sld>
 </file>
 
-<file path=ppt/slides/slide2.xml><?xml version="1.0" encoding="utf-8"?>
+<file path=ppt/slides/slide10.xml><?xml version="1.0" encoding="utf-8"?>
 <p:sld xmlns:a="http://schemas.openxmlformats.org/drawingml/2006/main" xmlns:r="http://schemas.openxmlformats.org/officeDocument/2006/relationships" xmlns:p="http://schemas.openxmlformats.org/presentationml/2006/main">
   <p:cSld>
     <p:spTree>
@@ -3885,1203 +3887,6 @@
       </p:grpSpPr>
       <p:sp>
         <p:nvSpPr>
-          <p:cNvPr id="2" name="標題 1"/>
-          <p:cNvSpPr>
-            <a:spLocks noGrp="1"/>
-          </p:cNvSpPr>
-          <p:nvPr>
-            <p:ph type="title"/>
-          </p:nvPr>
-        </p:nvSpPr>
-        <p:spPr/>
-        <p:txBody>
-          <a:bodyPr/>
-          <a:lstStyle/>
-          <a:p>
-            <a:r>
-              <a:rPr lang="zh-TW" altLang="en-US" dirty="0"/>
-              <a:t>內容</a:t>
-            </a:r>
-          </a:p>
-        </p:txBody>
-      </p:sp>
-      <p:sp>
-        <p:nvSpPr>
-          <p:cNvPr id="3" name="內容版面配置區 2"/>
-          <p:cNvSpPr>
-            <a:spLocks noGrp="1"/>
-          </p:cNvSpPr>
-          <p:nvPr>
-            <p:ph idx="1"/>
-          </p:nvPr>
-        </p:nvSpPr>
-        <p:spPr>
-          <a:xfrm>
-            <a:off x="457200" y="1628800"/>
-            <a:ext cx="8229600" cy="4525963"/>
-          </a:xfrm>
-        </p:spPr>
-        <p:txBody>
-          <a:bodyPr>
-            <a:normAutofit fontScale="92500" lnSpcReduction="20000"/>
-          </a:bodyPr>
-          <a:lstStyle/>
-          <a:p>
-            <a:r>
-              <a:rPr lang="en-US" altLang="zh-TW" dirty="0"/>
-              <a:t>Git</a:t>
-            </a:r>
-            <a:r>
-              <a:rPr lang="zh-TW" altLang="en-US" dirty="0"/>
-              <a:t>的特性 </a:t>
-            </a:r>
-            <a:r>
-              <a:rPr lang="en-US" altLang="zh-TW" dirty="0"/>
-              <a:t>(</a:t>
-            </a:r>
-            <a:r>
-              <a:rPr lang="en-US" altLang="zh-TW" dirty="0" err="1"/>
-              <a:t>svn</a:t>
-            </a:r>
-            <a:r>
-              <a:rPr lang="en-US" altLang="zh-TW" dirty="0"/>
-              <a:t> -&gt; git)</a:t>
-            </a:r>
-          </a:p>
-          <a:p>
-            <a:r>
-              <a:rPr lang="en-US" altLang="zh-TW" dirty="0"/>
-              <a:t>Git</a:t>
-            </a:r>
-            <a:r>
-              <a:rPr lang="zh-TW" altLang="en-US" dirty="0"/>
-              <a:t> </a:t>
-            </a:r>
-            <a:r>
-              <a:rPr lang="en-US" altLang="zh-TW" dirty="0"/>
-              <a:t>tools</a:t>
-            </a:r>
-            <a:r>
-              <a:rPr lang="zh-TW" altLang="en-US" dirty="0"/>
-              <a:t> </a:t>
-            </a:r>
-            <a:r>
-              <a:rPr lang="en-US" altLang="zh-TW" dirty="0"/>
-              <a:t>(</a:t>
-            </a:r>
-            <a:r>
-              <a:rPr lang="en-US" altLang="zh-TW" dirty="0" err="1"/>
-              <a:t>gitlab</a:t>
-            </a:r>
-            <a:r>
-              <a:rPr lang="en-US" altLang="zh-TW" dirty="0"/>
-              <a:t>, bash, </a:t>
-            </a:r>
-            <a:r>
-              <a:rPr lang="en-US" altLang="zh-TW" dirty="0" err="1"/>
-              <a:t>vscode</a:t>
-            </a:r>
-            <a:r>
-              <a:rPr lang="en-US" altLang="zh-TW" dirty="0"/>
-              <a:t>, </a:t>
-            </a:r>
-            <a:r>
-              <a:rPr lang="en-US" altLang="zh-TW" dirty="0" err="1"/>
-              <a:t>tortoiseGit</a:t>
-            </a:r>
-            <a:r>
-              <a:rPr lang="en-US" altLang="zh-TW" dirty="0"/>
-              <a:t>, </a:t>
-            </a:r>
-            <a:r>
-              <a:rPr lang="en-US" altLang="zh-TW" dirty="0" err="1"/>
-              <a:t>sourceTree</a:t>
-            </a:r>
-            <a:r>
-              <a:rPr lang="en-US" altLang="zh-TW" dirty="0"/>
-              <a:t>)</a:t>
-            </a:r>
-          </a:p>
-          <a:p>
-            <a:r>
-              <a:rPr lang="en-US" altLang="zh-TW" dirty="0"/>
-              <a:t>commit (work-tree/staged, commit with amend)</a:t>
-            </a:r>
-          </a:p>
-          <a:p>
-            <a:r>
-              <a:rPr lang="en-US" altLang="zh-TW" dirty="0"/>
-              <a:t>commit-operator (reset, revert, cherry-pick)</a:t>
-            </a:r>
-          </a:p>
-          <a:p>
-            <a:r>
-              <a:rPr lang="en-US" altLang="zh-TW" dirty="0"/>
-              <a:t>branch (tracking, merge, rebase, pull, push)</a:t>
-            </a:r>
-          </a:p>
-          <a:p>
-            <a:r>
-              <a:rPr lang="en-US" altLang="zh-TW" dirty="0"/>
-              <a:t>Gitlab (issue tracking, branch by issue(?), pull request)</a:t>
-            </a:r>
-          </a:p>
-          <a:p>
-            <a:r>
-              <a:rPr lang="en-US" altLang="zh-TW" dirty="0"/>
-              <a:t>Further (config, ignore, attribute, hook)</a:t>
-            </a:r>
-          </a:p>
-          <a:p>
-            <a:r>
-              <a:rPr lang="en-US" altLang="zh-TW" dirty="0"/>
-              <a:t>Reference</a:t>
-            </a:r>
-          </a:p>
-        </p:txBody>
-      </p:sp>
-      <p:sp>
-        <p:nvSpPr>
-          <p:cNvPr id="5" name="頁尾版面配置區 4"/>
-          <p:cNvSpPr>
-            <a:spLocks noGrp="1"/>
-          </p:cNvSpPr>
-          <p:nvPr>
-            <p:ph type="ftr" sz="quarter" idx="11"/>
-          </p:nvPr>
-        </p:nvSpPr>
-        <p:spPr/>
-        <p:txBody>
-          <a:bodyPr/>
-          <a:lstStyle/>
-          <a:p>
-            <a:r>
-              <a:rPr lang="en-US" altLang="zh-TW"/>
-              <a:t>104</a:t>
-            </a:r>
-            <a:r>
-              <a:rPr lang="zh-TW" altLang="en-US"/>
-              <a:t>人資學院  </a:t>
-            </a:r>
-            <a:r>
-              <a:rPr lang="en-US" altLang="zh-TW"/>
-              <a:t>All Rights Reserved</a:t>
-            </a:r>
-            <a:endParaRPr lang="zh-TW" altLang="en-US"/>
-          </a:p>
-        </p:txBody>
-      </p:sp>
-    </p:spTree>
-    <p:extLst>
-      <p:ext uri="{BB962C8B-B14F-4D97-AF65-F5344CB8AC3E}">
-        <p14:creationId xmlns:p14="http://schemas.microsoft.com/office/powerpoint/2010/main" val="4274691960"/>
-      </p:ext>
-    </p:extLst>
-  </p:cSld>
-  <p:clrMapOvr>
-    <a:masterClrMapping/>
-  </p:clrMapOvr>
-</p:sld>
-</file>
-
-<file path=ppt/slides/slide3.xml><?xml version="1.0" encoding="utf-8"?>
-<p:sld xmlns:a="http://schemas.openxmlformats.org/drawingml/2006/main" xmlns:r="http://schemas.openxmlformats.org/officeDocument/2006/relationships" xmlns:p="http://schemas.openxmlformats.org/presentationml/2006/main">
-  <p:cSld>
-    <p:spTree>
-      <p:nvGrpSpPr>
-        <p:cNvPr id="1" name=""/>
-        <p:cNvGrpSpPr/>
-        <p:nvPr/>
-      </p:nvGrpSpPr>
-      <p:grpSpPr>
-        <a:xfrm>
-          <a:off x="0" y="0"/>
-          <a:ext cx="0" cy="0"/>
-          <a:chOff x="0" y="0"/>
-          <a:chExt cx="0" cy="0"/>
-        </a:xfrm>
-      </p:grpSpPr>
-      <p:sp>
-        <p:nvSpPr>
-          <p:cNvPr id="2" name="標題 1">
-            <a:extLst>
-              <a:ext uri="{FF2B5EF4-FFF2-40B4-BE49-F238E27FC236}">
-                <a16:creationId xmlns:a16="http://schemas.microsoft.com/office/drawing/2014/main" id="{BF6D624E-CCBB-4E03-A8FD-7FC5FEC7B1A9}"/>
-              </a:ext>
-            </a:extLst>
-          </p:cNvPr>
-          <p:cNvSpPr>
-            <a:spLocks noGrp="1"/>
-          </p:cNvSpPr>
-          <p:nvPr>
-            <p:ph type="title"/>
-          </p:nvPr>
-        </p:nvSpPr>
-        <p:spPr/>
-        <p:txBody>
-          <a:bodyPr/>
-          <a:lstStyle/>
-          <a:p>
-            <a:r>
-              <a:rPr lang="en-US" altLang="zh-TW" dirty="0"/>
-              <a:t>Git</a:t>
-            </a:r>
-            <a:r>
-              <a:rPr lang="zh-TW" altLang="en-US" dirty="0"/>
-              <a:t>特性</a:t>
-            </a:r>
-          </a:p>
-        </p:txBody>
-      </p:sp>
-      <p:sp>
-        <p:nvSpPr>
-          <p:cNvPr id="3" name="內容版面配置區 2">
-            <a:extLst>
-              <a:ext uri="{FF2B5EF4-FFF2-40B4-BE49-F238E27FC236}">
-                <a16:creationId xmlns:a16="http://schemas.microsoft.com/office/drawing/2014/main" id="{444E510F-E2DA-465C-BCB9-76045CEF4FCC}"/>
-              </a:ext>
-            </a:extLst>
-          </p:cNvPr>
-          <p:cNvSpPr>
-            <a:spLocks noGrp="1"/>
-          </p:cNvSpPr>
-          <p:nvPr>
-            <p:ph idx="1"/>
-          </p:nvPr>
-        </p:nvSpPr>
-        <p:spPr/>
-        <p:txBody>
-          <a:bodyPr/>
-          <a:lstStyle/>
-          <a:p>
-            <a:r>
-              <a:rPr lang="en-US" altLang="zh-TW" dirty="0">
-                <a:sym typeface="Wingdings" panose="05000000000000000000" pitchFamily="2" charset="2"/>
-              </a:rPr>
-              <a:t>/Ehrms2portal_SC</a:t>
-            </a:r>
-            <a:br>
-              <a:rPr lang="en-US" altLang="zh-TW" dirty="0">
-                <a:sym typeface="Wingdings" panose="05000000000000000000" pitchFamily="2" charset="2"/>
-              </a:rPr>
-            </a:br>
-            <a:r>
-              <a:rPr lang="en-US" altLang="zh-TW" dirty="0">
-                <a:sym typeface="Wingdings" panose="05000000000000000000" pitchFamily="2" charset="2"/>
-              </a:rPr>
-              <a:t>/api-auth-acUser.js LINE</a:t>
-            </a:r>
-            <a:r>
-              <a:rPr lang="en-US" altLang="zh-TW" dirty="0">
-                <a:sym typeface="Wingdings" panose="05000000000000000000" pitchFamily="2" charset="2"/>
-                <a:hlinkClick r:id="rId2"/>
-              </a:rPr>
-              <a:t> 1095</a:t>
-            </a:r>
-            <a:endParaRPr lang="en-US" altLang="zh-TW" dirty="0">
-              <a:sym typeface="Wingdings" panose="05000000000000000000" pitchFamily="2" charset="2"/>
-            </a:endParaRPr>
-          </a:p>
-        </p:txBody>
-      </p:sp>
-      <p:sp>
-        <p:nvSpPr>
-          <p:cNvPr id="4" name="頁尾版面配置區 3">
-            <a:extLst>
-              <a:ext uri="{FF2B5EF4-FFF2-40B4-BE49-F238E27FC236}">
-                <a16:creationId xmlns:a16="http://schemas.microsoft.com/office/drawing/2014/main" id="{906666CF-5A60-4C06-B04C-164D753A21A4}"/>
-              </a:ext>
-            </a:extLst>
-          </p:cNvPr>
-          <p:cNvSpPr>
-            <a:spLocks noGrp="1"/>
-          </p:cNvSpPr>
-          <p:nvPr>
-            <p:ph type="ftr" sz="quarter" idx="11"/>
-          </p:nvPr>
-        </p:nvSpPr>
-        <p:spPr/>
-        <p:txBody>
-          <a:bodyPr/>
-          <a:lstStyle/>
-          <a:p>
-            <a:r>
-              <a:rPr lang="en-US" altLang="zh-TW"/>
-              <a:t>104</a:t>
-            </a:r>
-            <a:r>
-              <a:rPr lang="zh-TW" altLang="en-US"/>
-              <a:t>人資學院  </a:t>
-            </a:r>
-            <a:r>
-              <a:rPr lang="en-US" altLang="zh-TW"/>
-              <a:t>All Rights Reserved</a:t>
-            </a:r>
-            <a:endParaRPr lang="zh-TW" altLang="en-US"/>
-          </a:p>
-        </p:txBody>
-      </p:sp>
-      <p:pic>
-        <p:nvPicPr>
-          <p:cNvPr id="5" name="圖片 4">
-            <a:extLst>
-              <a:ext uri="{FF2B5EF4-FFF2-40B4-BE49-F238E27FC236}">
-                <a16:creationId xmlns:a16="http://schemas.microsoft.com/office/drawing/2014/main" id="{CCFA6BC6-C040-43FD-ACAE-D033534C4B9A}"/>
-              </a:ext>
-            </a:extLst>
-          </p:cNvPr>
-          <p:cNvPicPr>
-            <a:picLocks noChangeAspect="1"/>
-          </p:cNvPicPr>
-          <p:nvPr/>
-        </p:nvPicPr>
-        <p:blipFill>
-          <a:blip r:embed="rId3"/>
-          <a:stretch>
-            <a:fillRect/>
-          </a:stretch>
-        </p:blipFill>
-        <p:spPr>
-          <a:xfrm>
-            <a:off x="1341204" y="2749872"/>
-            <a:ext cx="7346560" cy="3376291"/>
-          </a:xfrm>
-          <a:prstGeom prst="rect">
-            <a:avLst/>
-          </a:prstGeom>
-        </p:spPr>
-      </p:pic>
-    </p:spTree>
-    <p:extLst>
-      <p:ext uri="{BB962C8B-B14F-4D97-AF65-F5344CB8AC3E}">
-        <p14:creationId xmlns:p14="http://schemas.microsoft.com/office/powerpoint/2010/main" val="423122223"/>
-      </p:ext>
-    </p:extLst>
-  </p:cSld>
-  <p:clrMapOvr>
-    <a:masterClrMapping/>
-  </p:clrMapOvr>
-</p:sld>
-</file>
-
-<file path=ppt/slides/slide4.xml><?xml version="1.0" encoding="utf-8"?>
-<p:sld xmlns:a="http://schemas.openxmlformats.org/drawingml/2006/main" xmlns:r="http://schemas.openxmlformats.org/officeDocument/2006/relationships" xmlns:p="http://schemas.openxmlformats.org/presentationml/2006/main">
-  <p:cSld>
-    <p:spTree>
-      <p:nvGrpSpPr>
-        <p:cNvPr id="1" name=""/>
-        <p:cNvGrpSpPr/>
-        <p:nvPr/>
-      </p:nvGrpSpPr>
-      <p:grpSpPr>
-        <a:xfrm>
-          <a:off x="0" y="0"/>
-          <a:ext cx="0" cy="0"/>
-          <a:chOff x="0" y="0"/>
-          <a:chExt cx="0" cy="0"/>
-        </a:xfrm>
-      </p:grpSpPr>
-      <p:sp>
-        <p:nvSpPr>
-          <p:cNvPr id="2" name="標題 1">
-            <a:extLst>
-              <a:ext uri="{FF2B5EF4-FFF2-40B4-BE49-F238E27FC236}">
-                <a16:creationId xmlns:a16="http://schemas.microsoft.com/office/drawing/2014/main" id="{1F53BFC4-38C1-46A5-8967-4D5F3CB1B717}"/>
-              </a:ext>
-            </a:extLst>
-          </p:cNvPr>
-          <p:cNvSpPr>
-            <a:spLocks noGrp="1"/>
-          </p:cNvSpPr>
-          <p:nvPr>
-            <p:ph type="title"/>
-          </p:nvPr>
-        </p:nvSpPr>
-        <p:spPr/>
-        <p:txBody>
-          <a:bodyPr/>
-          <a:lstStyle/>
-          <a:p>
-            <a:r>
-              <a:rPr lang="en-US" altLang="zh-TW" dirty="0"/>
-              <a:t>Promise </a:t>
-            </a:r>
-            <a:r>
-              <a:rPr lang="en-US" altLang="zh-TW" dirty="0" err="1"/>
-              <a:t>concat</a:t>
-            </a:r>
-            <a:endParaRPr lang="zh-TW" altLang="en-US" dirty="0"/>
-          </a:p>
-        </p:txBody>
-      </p:sp>
-      <p:sp>
-        <p:nvSpPr>
-          <p:cNvPr id="3" name="內容版面配置區 2">
-            <a:extLst>
-              <a:ext uri="{FF2B5EF4-FFF2-40B4-BE49-F238E27FC236}">
-                <a16:creationId xmlns:a16="http://schemas.microsoft.com/office/drawing/2014/main" id="{ED6A5C43-F74E-4DBC-AC33-4FB90C3BE8D6}"/>
-              </a:ext>
-            </a:extLst>
-          </p:cNvPr>
-          <p:cNvSpPr>
-            <a:spLocks noGrp="1"/>
-          </p:cNvSpPr>
-          <p:nvPr>
-            <p:ph idx="1"/>
-          </p:nvPr>
-        </p:nvSpPr>
-        <p:spPr/>
-        <p:txBody>
-          <a:bodyPr/>
-          <a:lstStyle/>
-          <a:p>
-            <a:r>
-              <a:rPr lang="en-US" altLang="zh-TW" dirty="0">
-                <a:sym typeface="Wingdings" panose="05000000000000000000" pitchFamily="2" charset="2"/>
-              </a:rPr>
-              <a:t>/Ehrms2portal_SC/api-auth-acUser.js LINE </a:t>
-            </a:r>
-            <a:r>
-              <a:rPr lang="en-US" altLang="zh-TW" dirty="0">
-                <a:sym typeface="Wingdings" panose="05000000000000000000" pitchFamily="2" charset="2"/>
-                <a:hlinkClick r:id="rId2"/>
-              </a:rPr>
-              <a:t>927</a:t>
-            </a:r>
-            <a:endParaRPr lang="en-US" altLang="zh-TW" dirty="0">
-              <a:sym typeface="Wingdings" panose="05000000000000000000" pitchFamily="2" charset="2"/>
-            </a:endParaRPr>
-          </a:p>
-          <a:p>
-            <a:endParaRPr lang="en-US" altLang="zh-TW" dirty="0">
-              <a:sym typeface="Wingdings" panose="05000000000000000000" pitchFamily="2" charset="2"/>
-            </a:endParaRPr>
-          </a:p>
-        </p:txBody>
-      </p:sp>
-      <p:sp>
-        <p:nvSpPr>
-          <p:cNvPr id="4" name="頁尾版面配置區 3">
-            <a:extLst>
-              <a:ext uri="{FF2B5EF4-FFF2-40B4-BE49-F238E27FC236}">
-                <a16:creationId xmlns:a16="http://schemas.microsoft.com/office/drawing/2014/main" id="{9C15FB9A-0695-4774-8738-81A625865030}"/>
-              </a:ext>
-            </a:extLst>
-          </p:cNvPr>
-          <p:cNvSpPr>
-            <a:spLocks noGrp="1"/>
-          </p:cNvSpPr>
-          <p:nvPr>
-            <p:ph type="ftr" sz="quarter" idx="11"/>
-          </p:nvPr>
-        </p:nvSpPr>
-        <p:spPr/>
-        <p:txBody>
-          <a:bodyPr/>
-          <a:lstStyle/>
-          <a:p>
-            <a:r>
-              <a:rPr lang="en-US" altLang="zh-TW"/>
-              <a:t>104</a:t>
-            </a:r>
-            <a:r>
-              <a:rPr lang="zh-TW" altLang="en-US"/>
-              <a:t>人資學院  </a:t>
-            </a:r>
-            <a:r>
-              <a:rPr lang="en-US" altLang="zh-TW"/>
-              <a:t>All Rights Reserved</a:t>
-            </a:r>
-            <a:endParaRPr lang="zh-TW" altLang="en-US"/>
-          </a:p>
-        </p:txBody>
-      </p:sp>
-      <p:pic>
-        <p:nvPicPr>
-          <p:cNvPr id="5" name="圖片 4">
-            <a:extLst>
-              <a:ext uri="{FF2B5EF4-FFF2-40B4-BE49-F238E27FC236}">
-                <a16:creationId xmlns:a16="http://schemas.microsoft.com/office/drawing/2014/main" id="{58663B3E-3A13-4FFA-B551-C659A514A42A}"/>
-              </a:ext>
-            </a:extLst>
-          </p:cNvPr>
-          <p:cNvPicPr>
-            <a:picLocks noChangeAspect="1"/>
-          </p:cNvPicPr>
-          <p:nvPr/>
-        </p:nvPicPr>
-        <p:blipFill>
-          <a:blip r:embed="rId3"/>
-          <a:stretch>
-            <a:fillRect/>
-          </a:stretch>
-        </p:blipFill>
-        <p:spPr>
-          <a:xfrm>
-            <a:off x="505244" y="2276872"/>
-            <a:ext cx="8269654" cy="4052746"/>
-          </a:xfrm>
-          <a:prstGeom prst="rect">
-            <a:avLst/>
-          </a:prstGeom>
-        </p:spPr>
-      </p:pic>
-    </p:spTree>
-    <p:extLst>
-      <p:ext uri="{BB962C8B-B14F-4D97-AF65-F5344CB8AC3E}">
-        <p14:creationId xmlns:p14="http://schemas.microsoft.com/office/powerpoint/2010/main" val="280376510"/>
-      </p:ext>
-    </p:extLst>
-  </p:cSld>
-  <p:clrMapOvr>
-    <a:masterClrMapping/>
-  </p:clrMapOvr>
-</p:sld>
-</file>
-
-<file path=ppt/slides/slide5.xml><?xml version="1.0" encoding="utf-8"?>
-<p:sld xmlns:a="http://schemas.openxmlformats.org/drawingml/2006/main" xmlns:r="http://schemas.openxmlformats.org/officeDocument/2006/relationships" xmlns:p="http://schemas.openxmlformats.org/presentationml/2006/main">
-  <p:cSld>
-    <p:spTree>
-      <p:nvGrpSpPr>
-        <p:cNvPr id="1" name=""/>
-        <p:cNvGrpSpPr/>
-        <p:nvPr/>
-      </p:nvGrpSpPr>
-      <p:grpSpPr>
-        <a:xfrm>
-          <a:off x="0" y="0"/>
-          <a:ext cx="0" cy="0"/>
-          <a:chOff x="0" y="0"/>
-          <a:chExt cx="0" cy="0"/>
-        </a:xfrm>
-      </p:grpSpPr>
-      <p:sp>
-        <p:nvSpPr>
-          <p:cNvPr id="2" name="標題 1">
-            <a:extLst>
-              <a:ext uri="{FF2B5EF4-FFF2-40B4-BE49-F238E27FC236}">
-                <a16:creationId xmlns:a16="http://schemas.microsoft.com/office/drawing/2014/main" id="{51841209-40F9-48A5-9D1B-ED5369596D62}"/>
-              </a:ext>
-            </a:extLst>
-          </p:cNvPr>
-          <p:cNvSpPr>
-            <a:spLocks noGrp="1"/>
-          </p:cNvSpPr>
-          <p:nvPr>
-            <p:ph type="title"/>
-          </p:nvPr>
-        </p:nvSpPr>
-        <p:spPr/>
-        <p:txBody>
-          <a:bodyPr/>
-          <a:lstStyle/>
-          <a:p>
-            <a:r>
-              <a:rPr lang="en-US" altLang="zh-TW" dirty="0" err="1"/>
-              <a:t>Async</a:t>
-            </a:r>
-            <a:r>
-              <a:rPr lang="en-US" altLang="zh-TW" dirty="0"/>
-              <a:t> try-catch-finally</a:t>
-            </a:r>
-            <a:endParaRPr lang="zh-TW" altLang="en-US" dirty="0"/>
-          </a:p>
-        </p:txBody>
-      </p:sp>
-      <p:sp>
-        <p:nvSpPr>
-          <p:cNvPr id="3" name="內容版面配置區 2">
-            <a:extLst>
-              <a:ext uri="{FF2B5EF4-FFF2-40B4-BE49-F238E27FC236}">
-                <a16:creationId xmlns:a16="http://schemas.microsoft.com/office/drawing/2014/main" id="{F478725F-0E0D-47B3-9E2B-1F4D255BF391}"/>
-              </a:ext>
-            </a:extLst>
-          </p:cNvPr>
-          <p:cNvSpPr>
-            <a:spLocks noGrp="1"/>
-          </p:cNvSpPr>
-          <p:nvPr>
-            <p:ph idx="1"/>
-          </p:nvPr>
-        </p:nvSpPr>
-        <p:spPr/>
-        <p:txBody>
-          <a:bodyPr/>
-          <a:lstStyle/>
-          <a:p>
-            <a:r>
-              <a:rPr lang="en-US" altLang="zh-TW" dirty="0">
-                <a:sym typeface="Wingdings" panose="05000000000000000000" pitchFamily="2" charset="2"/>
-              </a:rPr>
-              <a:t>/Ehrms2portal_SC/api-auth-acUser.js LINE </a:t>
-            </a:r>
-            <a:r>
-              <a:rPr lang="en-US" altLang="zh-TW" dirty="0">
-                <a:sym typeface="Wingdings" panose="05000000000000000000" pitchFamily="2" charset="2"/>
-                <a:hlinkClick r:id="rId2"/>
-              </a:rPr>
-              <a:t>954</a:t>
-            </a:r>
-            <a:br>
-              <a:rPr lang="en-US" altLang="zh-TW" dirty="0">
-                <a:sym typeface="Wingdings" panose="05000000000000000000" pitchFamily="2" charset="2"/>
-              </a:rPr>
-            </a:br>
-            <a:br>
-              <a:rPr lang="en-US" altLang="zh-TW" dirty="0">
-                <a:sym typeface="Wingdings" panose="05000000000000000000" pitchFamily="2" charset="2"/>
-              </a:rPr>
-            </a:br>
-            <a:endParaRPr lang="en-US" altLang="zh-TW" dirty="0">
-              <a:sym typeface="Wingdings" panose="05000000000000000000" pitchFamily="2" charset="2"/>
-            </a:endParaRPr>
-          </a:p>
-        </p:txBody>
-      </p:sp>
-      <p:sp>
-        <p:nvSpPr>
-          <p:cNvPr id="4" name="頁尾版面配置區 3">
-            <a:extLst>
-              <a:ext uri="{FF2B5EF4-FFF2-40B4-BE49-F238E27FC236}">
-                <a16:creationId xmlns:a16="http://schemas.microsoft.com/office/drawing/2014/main" id="{F27157E0-4972-47AE-BAEE-01518FBF20C6}"/>
-              </a:ext>
-            </a:extLst>
-          </p:cNvPr>
-          <p:cNvSpPr>
-            <a:spLocks noGrp="1"/>
-          </p:cNvSpPr>
-          <p:nvPr>
-            <p:ph type="ftr" sz="quarter" idx="11"/>
-          </p:nvPr>
-        </p:nvSpPr>
-        <p:spPr/>
-        <p:txBody>
-          <a:bodyPr/>
-          <a:lstStyle/>
-          <a:p>
-            <a:r>
-              <a:rPr lang="en-US" altLang="zh-TW"/>
-              <a:t>104</a:t>
-            </a:r>
-            <a:r>
-              <a:rPr lang="zh-TW" altLang="en-US"/>
-              <a:t>人資學院  </a:t>
-            </a:r>
-            <a:r>
-              <a:rPr lang="en-US" altLang="zh-TW"/>
-              <a:t>All Rights Reserved</a:t>
-            </a:r>
-            <a:endParaRPr lang="zh-TW" altLang="en-US"/>
-          </a:p>
-        </p:txBody>
-      </p:sp>
-      <p:pic>
-        <p:nvPicPr>
-          <p:cNvPr id="5" name="圖片 4">
-            <a:extLst>
-              <a:ext uri="{FF2B5EF4-FFF2-40B4-BE49-F238E27FC236}">
-                <a16:creationId xmlns:a16="http://schemas.microsoft.com/office/drawing/2014/main" id="{35A7F754-E147-45E8-8627-5B09F096336F}"/>
-              </a:ext>
-            </a:extLst>
-          </p:cNvPr>
-          <p:cNvPicPr>
-            <a:picLocks noChangeAspect="1"/>
-          </p:cNvPicPr>
-          <p:nvPr/>
-        </p:nvPicPr>
-        <p:blipFill>
-          <a:blip r:embed="rId3"/>
-          <a:stretch>
-            <a:fillRect/>
-          </a:stretch>
-        </p:blipFill>
-        <p:spPr>
-          <a:xfrm>
-            <a:off x="228158" y="2564904"/>
-            <a:ext cx="8645615" cy="3743821"/>
-          </a:xfrm>
-          <a:prstGeom prst="rect">
-            <a:avLst/>
-          </a:prstGeom>
-        </p:spPr>
-      </p:pic>
-    </p:spTree>
-    <p:extLst>
-      <p:ext uri="{BB962C8B-B14F-4D97-AF65-F5344CB8AC3E}">
-        <p14:creationId xmlns:p14="http://schemas.microsoft.com/office/powerpoint/2010/main" val="909642701"/>
-      </p:ext>
-    </p:extLst>
-  </p:cSld>
-  <p:clrMapOvr>
-    <a:masterClrMapping/>
-  </p:clrMapOvr>
-</p:sld>
-</file>
-
-<file path=ppt/slides/slide6.xml><?xml version="1.0" encoding="utf-8"?>
-<p:sld xmlns:a="http://schemas.openxmlformats.org/drawingml/2006/main" xmlns:r="http://schemas.openxmlformats.org/officeDocument/2006/relationships" xmlns:p="http://schemas.openxmlformats.org/presentationml/2006/main">
-  <p:cSld>
-    <p:spTree>
-      <p:nvGrpSpPr>
-        <p:cNvPr id="1" name=""/>
-        <p:cNvGrpSpPr/>
-        <p:nvPr/>
-      </p:nvGrpSpPr>
-      <p:grpSpPr>
-        <a:xfrm>
-          <a:off x="0" y="0"/>
-          <a:ext cx="0" cy="0"/>
-          <a:chOff x="0" y="0"/>
-          <a:chExt cx="0" cy="0"/>
-        </a:xfrm>
-      </p:grpSpPr>
-      <p:sp>
-        <p:nvSpPr>
-          <p:cNvPr id="2" name="標題 1">
-            <a:extLst>
-              <a:ext uri="{FF2B5EF4-FFF2-40B4-BE49-F238E27FC236}">
-                <a16:creationId xmlns:a16="http://schemas.microsoft.com/office/drawing/2014/main" id="{1765C254-721E-4166-AA1E-F93E7AD9AEF6}"/>
-              </a:ext>
-            </a:extLst>
-          </p:cNvPr>
-          <p:cNvSpPr>
-            <a:spLocks noGrp="1"/>
-          </p:cNvSpPr>
-          <p:nvPr>
-            <p:ph type="title"/>
-          </p:nvPr>
-        </p:nvSpPr>
-        <p:spPr/>
-        <p:txBody>
-          <a:bodyPr/>
-          <a:lstStyle/>
-          <a:p>
-            <a:r>
-              <a:rPr lang="en-US" altLang="zh-TW" dirty="0" err="1"/>
-              <a:t>Async.Waterfall</a:t>
-            </a:r>
-            <a:r>
-              <a:rPr lang="en-US" altLang="zh-TW" dirty="0"/>
-              <a:t> </a:t>
-            </a:r>
-            <a:endParaRPr lang="zh-TW" altLang="en-US" dirty="0"/>
-          </a:p>
-        </p:txBody>
-      </p:sp>
-      <p:sp>
-        <p:nvSpPr>
-          <p:cNvPr id="3" name="內容版面配置區 2">
-            <a:extLst>
-              <a:ext uri="{FF2B5EF4-FFF2-40B4-BE49-F238E27FC236}">
-                <a16:creationId xmlns:a16="http://schemas.microsoft.com/office/drawing/2014/main" id="{6C92636B-C021-4799-85C3-9700D8CBB79B}"/>
-              </a:ext>
-            </a:extLst>
-          </p:cNvPr>
-          <p:cNvSpPr>
-            <a:spLocks noGrp="1"/>
-          </p:cNvSpPr>
-          <p:nvPr>
-            <p:ph idx="1"/>
-          </p:nvPr>
-        </p:nvSpPr>
-        <p:spPr/>
-        <p:txBody>
-          <a:bodyPr/>
-          <a:lstStyle/>
-          <a:p>
-            <a:r>
-              <a:rPr lang="en-US" altLang="zh-TW" dirty="0">
-                <a:sym typeface="Wingdings" panose="05000000000000000000" pitchFamily="2" charset="2"/>
-              </a:rPr>
-              <a:t>/Ehrms2portal_SC/api-auth-acPwdRule.js LINE </a:t>
-            </a:r>
-            <a:r>
-              <a:rPr lang="en-US" altLang="zh-TW" dirty="0">
-                <a:sym typeface="Wingdings" panose="05000000000000000000" pitchFamily="2" charset="2"/>
-                <a:hlinkClick r:id="rId2"/>
-              </a:rPr>
-              <a:t>531</a:t>
-            </a:r>
-            <a:br>
-              <a:rPr lang="en-US" altLang="zh-TW" dirty="0">
-                <a:sym typeface="Wingdings" panose="05000000000000000000" pitchFamily="2" charset="2"/>
-              </a:rPr>
-            </a:br>
-            <a:br>
-              <a:rPr lang="en-US" altLang="zh-TW" dirty="0">
-                <a:sym typeface="Wingdings" panose="05000000000000000000" pitchFamily="2" charset="2"/>
-              </a:rPr>
-            </a:br>
-            <a:endParaRPr lang="en-US" altLang="zh-TW" dirty="0">
-              <a:sym typeface="Wingdings" panose="05000000000000000000" pitchFamily="2" charset="2"/>
-            </a:endParaRPr>
-          </a:p>
-          <a:p>
-            <a:endParaRPr lang="zh-TW" altLang="en-US" dirty="0"/>
-          </a:p>
-        </p:txBody>
-      </p:sp>
-      <p:sp>
-        <p:nvSpPr>
-          <p:cNvPr id="4" name="頁尾版面配置區 3">
-            <a:extLst>
-              <a:ext uri="{FF2B5EF4-FFF2-40B4-BE49-F238E27FC236}">
-                <a16:creationId xmlns:a16="http://schemas.microsoft.com/office/drawing/2014/main" id="{B4E2C0EB-CD7F-4DE2-AAF7-9F290C4E6697}"/>
-              </a:ext>
-            </a:extLst>
-          </p:cNvPr>
-          <p:cNvSpPr>
-            <a:spLocks noGrp="1"/>
-          </p:cNvSpPr>
-          <p:nvPr>
-            <p:ph type="ftr" sz="quarter" idx="11"/>
-          </p:nvPr>
-        </p:nvSpPr>
-        <p:spPr/>
-        <p:txBody>
-          <a:bodyPr/>
-          <a:lstStyle/>
-          <a:p>
-            <a:r>
-              <a:rPr lang="en-US" altLang="zh-TW"/>
-              <a:t>104</a:t>
-            </a:r>
-            <a:r>
-              <a:rPr lang="zh-TW" altLang="en-US"/>
-              <a:t>人資學院  </a:t>
-            </a:r>
-            <a:r>
-              <a:rPr lang="en-US" altLang="zh-TW"/>
-              <a:t>All Rights Reserved</a:t>
-            </a:r>
-            <a:endParaRPr lang="zh-TW" altLang="en-US"/>
-          </a:p>
-        </p:txBody>
-      </p:sp>
-      <p:pic>
-        <p:nvPicPr>
-          <p:cNvPr id="5" name="圖片 4">
-            <a:extLst>
-              <a:ext uri="{FF2B5EF4-FFF2-40B4-BE49-F238E27FC236}">
-                <a16:creationId xmlns:a16="http://schemas.microsoft.com/office/drawing/2014/main" id="{33488B55-F97A-4C63-921A-A7408E2D6A35}"/>
-              </a:ext>
-            </a:extLst>
-          </p:cNvPr>
-          <p:cNvPicPr>
-            <a:picLocks noChangeAspect="1"/>
-          </p:cNvPicPr>
-          <p:nvPr/>
-        </p:nvPicPr>
-        <p:blipFill>
-          <a:blip r:embed="rId3"/>
-          <a:stretch>
-            <a:fillRect/>
-          </a:stretch>
-        </p:blipFill>
-        <p:spPr>
-          <a:xfrm>
-            <a:off x="533005" y="2852936"/>
-            <a:ext cx="8153796" cy="3530848"/>
-          </a:xfrm>
-          <a:prstGeom prst="rect">
-            <a:avLst/>
-          </a:prstGeom>
-        </p:spPr>
-      </p:pic>
-    </p:spTree>
-    <p:extLst>
-      <p:ext uri="{BB962C8B-B14F-4D97-AF65-F5344CB8AC3E}">
-        <p14:creationId xmlns:p14="http://schemas.microsoft.com/office/powerpoint/2010/main" val="1886309669"/>
-      </p:ext>
-    </p:extLst>
-  </p:cSld>
-  <p:clrMapOvr>
-    <a:masterClrMapping/>
-  </p:clrMapOvr>
-</p:sld>
-</file>
-
-<file path=ppt/slides/slide7.xml><?xml version="1.0" encoding="utf-8"?>
-<p:sld xmlns:a="http://schemas.openxmlformats.org/drawingml/2006/main" xmlns:r="http://schemas.openxmlformats.org/officeDocument/2006/relationships" xmlns:p="http://schemas.openxmlformats.org/presentationml/2006/main">
-  <p:cSld>
-    <p:spTree>
-      <p:nvGrpSpPr>
-        <p:cNvPr id="1" name=""/>
-        <p:cNvGrpSpPr/>
-        <p:nvPr/>
-      </p:nvGrpSpPr>
-      <p:grpSpPr>
-        <a:xfrm>
-          <a:off x="0" y="0"/>
-          <a:ext cx="0" cy="0"/>
-          <a:chOff x="0" y="0"/>
-          <a:chExt cx="0" cy="0"/>
-        </a:xfrm>
-      </p:grpSpPr>
-      <p:sp>
-        <p:nvSpPr>
-          <p:cNvPr id="2" name="標題 1">
-            <a:extLst>
-              <a:ext uri="{FF2B5EF4-FFF2-40B4-BE49-F238E27FC236}">
-                <a16:creationId xmlns:a16="http://schemas.microsoft.com/office/drawing/2014/main" id="{647F4C66-668A-4D8A-8F51-F198A2B4C458}"/>
-              </a:ext>
-            </a:extLst>
-          </p:cNvPr>
-          <p:cNvSpPr>
-            <a:spLocks noGrp="1"/>
-          </p:cNvSpPr>
-          <p:nvPr>
-            <p:ph type="title"/>
-          </p:nvPr>
-        </p:nvSpPr>
-        <p:spPr/>
-        <p:txBody>
-          <a:bodyPr/>
-          <a:lstStyle/>
-          <a:p>
-            <a:r>
-              <a:rPr lang="en-US" altLang="zh-TW" dirty="0"/>
-              <a:t>ASYNC</a:t>
-            </a:r>
-            <a:r>
-              <a:rPr lang="zh-TW" altLang="en-US" dirty="0"/>
-              <a:t>整理</a:t>
-            </a:r>
-          </a:p>
-        </p:txBody>
-      </p:sp>
-      <p:sp>
-        <p:nvSpPr>
-          <p:cNvPr id="3" name="內容版面配置區 2">
-            <a:extLst>
-              <a:ext uri="{FF2B5EF4-FFF2-40B4-BE49-F238E27FC236}">
-                <a16:creationId xmlns:a16="http://schemas.microsoft.com/office/drawing/2014/main" id="{67B283EE-D519-443B-B399-B4DAAC0EE76D}"/>
-              </a:ext>
-            </a:extLst>
-          </p:cNvPr>
-          <p:cNvSpPr>
-            <a:spLocks noGrp="1"/>
-          </p:cNvSpPr>
-          <p:nvPr>
-            <p:ph idx="1"/>
-          </p:nvPr>
-        </p:nvSpPr>
-        <p:spPr/>
-        <p:txBody>
-          <a:bodyPr/>
-          <a:lstStyle/>
-          <a:p>
-            <a:r>
-              <a:rPr lang="en-US" altLang="zh-TW" dirty="0" err="1"/>
-              <a:t>CallBack</a:t>
-            </a:r>
-            <a:r>
-              <a:rPr lang="en-US" altLang="zh-TW" dirty="0"/>
-              <a:t> </a:t>
-            </a:r>
-            <a:r>
-              <a:rPr lang="zh-TW" altLang="en-US" dirty="0"/>
-              <a:t>是</a:t>
-            </a:r>
-            <a:r>
-              <a:rPr lang="en-US" altLang="zh-TW" dirty="0" err="1"/>
-              <a:t>js</a:t>
-            </a:r>
-            <a:r>
-              <a:rPr lang="zh-TW" altLang="en-US" dirty="0"/>
-              <a:t>在處理</a:t>
-            </a:r>
-            <a:r>
-              <a:rPr lang="en-US" altLang="zh-TW" dirty="0"/>
-              <a:t>non-</a:t>
-            </a:r>
-            <a:r>
-              <a:rPr lang="en-US" altLang="zh-TW" dirty="0" err="1"/>
-              <a:t>blockin</a:t>
-            </a:r>
-            <a:r>
-              <a:rPr lang="zh-TW" altLang="en-US" dirty="0"/>
-              <a:t>的設計方式</a:t>
-            </a:r>
-            <a:r>
-              <a:rPr lang="en-US" altLang="zh-TW" dirty="0"/>
-              <a:t>(</a:t>
-            </a:r>
-            <a:r>
-              <a:rPr lang="en-US" altLang="zh-TW" dirty="0" err="1"/>
-              <a:t>async</a:t>
-            </a:r>
-            <a:r>
-              <a:rPr lang="en-US" altLang="zh-TW" dirty="0"/>
-              <a:t>)</a:t>
-            </a:r>
-          </a:p>
-          <a:p>
-            <a:r>
-              <a:rPr lang="zh-TW" altLang="en-US" dirty="0"/>
-              <a:t>解決</a:t>
-            </a:r>
-            <a:r>
-              <a:rPr lang="en-US" altLang="zh-TW" dirty="0" err="1"/>
-              <a:t>CallBack</a:t>
-            </a:r>
-            <a:r>
-              <a:rPr lang="zh-TW" altLang="en-US" dirty="0"/>
-              <a:t> </a:t>
-            </a:r>
-            <a:r>
-              <a:rPr lang="en-US" altLang="zh-TW" dirty="0"/>
-              <a:t>Hell</a:t>
-            </a:r>
-          </a:p>
-          <a:p>
-            <a:pPr lvl="1"/>
-            <a:r>
-              <a:rPr lang="en-US" altLang="zh-TW" dirty="0"/>
-              <a:t>ES6 </a:t>
-            </a:r>
-            <a:r>
-              <a:rPr lang="en-US" altLang="zh-TW" dirty="0">
-                <a:sym typeface="Wingdings" panose="05000000000000000000" pitchFamily="2" charset="2"/>
-              </a:rPr>
-              <a:t> </a:t>
-            </a:r>
-            <a:r>
-              <a:rPr lang="en-US" altLang="zh-TW" dirty="0"/>
-              <a:t>promise</a:t>
-            </a:r>
-          </a:p>
-          <a:p>
-            <a:pPr lvl="1"/>
-            <a:r>
-              <a:rPr lang="en-US" altLang="zh-TW" dirty="0" err="1"/>
-              <a:t>Async</a:t>
-            </a:r>
-            <a:r>
-              <a:rPr lang="en-US" altLang="zh-TW" dirty="0"/>
-              <a:t> </a:t>
-            </a:r>
-            <a:r>
-              <a:rPr lang="en-US" altLang="zh-TW" dirty="0">
-                <a:sym typeface="Wingdings" panose="05000000000000000000" pitchFamily="2" charset="2"/>
-              </a:rPr>
-              <a:t> waterfall, each …</a:t>
-            </a:r>
-            <a:endParaRPr lang="en-US" altLang="zh-TW" dirty="0"/>
-          </a:p>
-          <a:p>
-            <a:pPr lvl="1"/>
-            <a:r>
-              <a:rPr lang="en-US" altLang="zh-TW" dirty="0"/>
-              <a:t>ES7 </a:t>
-            </a:r>
-            <a:r>
-              <a:rPr lang="en-US" altLang="zh-TW" dirty="0">
-                <a:sym typeface="Wingdings" panose="05000000000000000000" pitchFamily="2" charset="2"/>
-              </a:rPr>
-              <a:t> </a:t>
-            </a:r>
-            <a:r>
-              <a:rPr lang="en-US" altLang="zh-TW" dirty="0" err="1"/>
-              <a:t>async</a:t>
-            </a:r>
-            <a:r>
-              <a:rPr lang="en-US" altLang="zh-TW" dirty="0"/>
-              <a:t> await</a:t>
-            </a:r>
-          </a:p>
-          <a:p>
-            <a:pPr lvl="1"/>
-            <a:r>
-              <a:rPr lang="en-US" altLang="zh-TW" dirty="0" err="1"/>
-              <a:t>nodejs</a:t>
-            </a:r>
-            <a:r>
-              <a:rPr lang="en-US" altLang="zh-TW" dirty="0">
-                <a:sym typeface="Wingdings" panose="05000000000000000000" pitchFamily="2" charset="2"/>
-              </a:rPr>
-              <a:t>  </a:t>
-            </a:r>
-            <a:r>
-              <a:rPr lang="en-US" altLang="zh-TW" dirty="0" err="1">
-                <a:sym typeface="Wingdings" panose="05000000000000000000" pitchFamily="2" charset="2"/>
-              </a:rPr>
-              <a:t>promisify</a:t>
-            </a:r>
-            <a:endParaRPr lang="en-US" altLang="zh-TW" dirty="0"/>
-          </a:p>
-        </p:txBody>
-      </p:sp>
-      <p:sp>
-        <p:nvSpPr>
-          <p:cNvPr id="4" name="頁尾版面配置區 3">
-            <a:extLst>
-              <a:ext uri="{FF2B5EF4-FFF2-40B4-BE49-F238E27FC236}">
-                <a16:creationId xmlns:a16="http://schemas.microsoft.com/office/drawing/2014/main" id="{06890AFF-36AE-4479-A2BD-6831DAAAB459}"/>
-              </a:ext>
-            </a:extLst>
-          </p:cNvPr>
-          <p:cNvSpPr>
-            <a:spLocks noGrp="1"/>
-          </p:cNvSpPr>
-          <p:nvPr>
-            <p:ph type="ftr" sz="quarter" idx="11"/>
-          </p:nvPr>
-        </p:nvSpPr>
-        <p:spPr/>
-        <p:txBody>
-          <a:bodyPr/>
-          <a:lstStyle/>
-          <a:p>
-            <a:r>
-              <a:rPr lang="en-US" altLang="zh-TW"/>
-              <a:t>104</a:t>
-            </a:r>
-            <a:r>
-              <a:rPr lang="zh-TW" altLang="en-US"/>
-              <a:t>人資學院  </a:t>
-            </a:r>
-            <a:r>
-              <a:rPr lang="en-US" altLang="zh-TW"/>
-              <a:t>All Rights Reserved</a:t>
-            </a:r>
-            <a:endParaRPr lang="zh-TW" altLang="en-US"/>
-          </a:p>
-        </p:txBody>
-      </p:sp>
-    </p:spTree>
-    <p:extLst>
-      <p:ext uri="{BB962C8B-B14F-4D97-AF65-F5344CB8AC3E}">
-        <p14:creationId xmlns:p14="http://schemas.microsoft.com/office/powerpoint/2010/main" val="477108725"/>
-      </p:ext>
-    </p:extLst>
-  </p:cSld>
-  <p:clrMapOvr>
-    <a:masterClrMapping/>
-  </p:clrMapOvr>
-</p:sld>
-</file>
-
-<file path=ppt/slides/slide8.xml><?xml version="1.0" encoding="utf-8"?>
-<p:sld xmlns:a="http://schemas.openxmlformats.org/drawingml/2006/main" xmlns:r="http://schemas.openxmlformats.org/officeDocument/2006/relationships" xmlns:p="http://schemas.openxmlformats.org/presentationml/2006/main">
-  <p:cSld>
-    <p:spTree>
-      <p:nvGrpSpPr>
-        <p:cNvPr id="1" name=""/>
-        <p:cNvGrpSpPr/>
-        <p:nvPr/>
-      </p:nvGrpSpPr>
-      <p:grpSpPr>
-        <a:xfrm>
-          <a:off x="0" y="0"/>
-          <a:ext cx="0" cy="0"/>
-          <a:chOff x="0" y="0"/>
-          <a:chExt cx="0" cy="0"/>
-        </a:xfrm>
-      </p:grpSpPr>
-      <p:sp>
-        <p:nvSpPr>
           <p:cNvPr id="2" name="標題 1">
             <a:extLst>
               <a:ext uri="{FF2B5EF4-FFF2-40B4-BE49-F238E27FC236}">
@@ -5292,7 +4097,7 @@
 </p:sld>
 </file>
 
-<file path=ppt/slides/slide9.xml><?xml version="1.0" encoding="utf-8"?>
+<file path=ppt/slides/slide11.xml><?xml version="1.0" encoding="utf-8"?>
 <p:sld xmlns:a="http://schemas.openxmlformats.org/drawingml/2006/main" xmlns:r="http://schemas.openxmlformats.org/officeDocument/2006/relationships" xmlns:p="http://schemas.openxmlformats.org/presentationml/2006/main">
   <p:cSld>
     <p:spTree>
@@ -5512,6 +4317,1680 @@
     <p:extLst>
       <p:ext uri="{BB962C8B-B14F-4D97-AF65-F5344CB8AC3E}">
         <p14:creationId xmlns:p14="http://schemas.microsoft.com/office/powerpoint/2010/main" val="4002757761"/>
+      </p:ext>
+    </p:extLst>
+  </p:cSld>
+  <p:clrMapOvr>
+    <a:masterClrMapping/>
+  </p:clrMapOvr>
+</p:sld>
+</file>
+
+<file path=ppt/slides/slide2.xml><?xml version="1.0" encoding="utf-8"?>
+<p:sld xmlns:a="http://schemas.openxmlformats.org/drawingml/2006/main" xmlns:r="http://schemas.openxmlformats.org/officeDocument/2006/relationships" xmlns:p="http://schemas.openxmlformats.org/presentationml/2006/main">
+  <p:cSld>
+    <p:spTree>
+      <p:nvGrpSpPr>
+        <p:cNvPr id="1" name=""/>
+        <p:cNvGrpSpPr/>
+        <p:nvPr/>
+      </p:nvGrpSpPr>
+      <p:grpSpPr>
+        <a:xfrm>
+          <a:off x="0" y="0"/>
+          <a:ext cx="0" cy="0"/>
+          <a:chOff x="0" y="0"/>
+          <a:chExt cx="0" cy="0"/>
+        </a:xfrm>
+      </p:grpSpPr>
+      <p:sp>
+        <p:nvSpPr>
+          <p:cNvPr id="2" name="標題 1"/>
+          <p:cNvSpPr>
+            <a:spLocks noGrp="1"/>
+          </p:cNvSpPr>
+          <p:nvPr>
+            <p:ph type="title"/>
+          </p:nvPr>
+        </p:nvSpPr>
+        <p:spPr/>
+        <p:txBody>
+          <a:bodyPr/>
+          <a:lstStyle/>
+          <a:p>
+            <a:r>
+              <a:rPr lang="zh-TW" altLang="en-US" dirty="0"/>
+              <a:t>內容</a:t>
+            </a:r>
+          </a:p>
+        </p:txBody>
+      </p:sp>
+      <p:sp>
+        <p:nvSpPr>
+          <p:cNvPr id="3" name="內容版面配置區 2"/>
+          <p:cNvSpPr>
+            <a:spLocks noGrp="1"/>
+          </p:cNvSpPr>
+          <p:nvPr>
+            <p:ph idx="1"/>
+          </p:nvPr>
+        </p:nvSpPr>
+        <p:spPr>
+          <a:xfrm>
+            <a:off x="457200" y="1628800"/>
+            <a:ext cx="8229600" cy="4525963"/>
+          </a:xfrm>
+        </p:spPr>
+        <p:txBody>
+          <a:bodyPr>
+            <a:normAutofit fontScale="92500" lnSpcReduction="20000"/>
+          </a:bodyPr>
+          <a:lstStyle/>
+          <a:p>
+            <a:r>
+              <a:rPr lang="en-US" altLang="zh-TW" dirty="0"/>
+              <a:t>Git</a:t>
+            </a:r>
+            <a:r>
+              <a:rPr lang="zh-TW" altLang="en-US" dirty="0"/>
+              <a:t>的特性 </a:t>
+            </a:r>
+            <a:r>
+              <a:rPr lang="en-US" altLang="zh-TW" dirty="0"/>
+              <a:t>(</a:t>
+            </a:r>
+            <a:r>
+              <a:rPr lang="en-US" altLang="zh-TW" dirty="0" err="1"/>
+              <a:t>svn</a:t>
+            </a:r>
+            <a:r>
+              <a:rPr lang="en-US" altLang="zh-TW" dirty="0"/>
+              <a:t> -&gt; git)</a:t>
+            </a:r>
+          </a:p>
+          <a:p>
+            <a:r>
+              <a:rPr lang="en-US" altLang="zh-TW" dirty="0"/>
+              <a:t>Git</a:t>
+            </a:r>
+            <a:r>
+              <a:rPr lang="zh-TW" altLang="en-US" dirty="0"/>
+              <a:t> </a:t>
+            </a:r>
+            <a:r>
+              <a:rPr lang="en-US" altLang="zh-TW" dirty="0"/>
+              <a:t>tools</a:t>
+            </a:r>
+            <a:r>
+              <a:rPr lang="zh-TW" altLang="en-US" dirty="0"/>
+              <a:t> </a:t>
+            </a:r>
+            <a:r>
+              <a:rPr lang="en-US" altLang="zh-TW" dirty="0"/>
+              <a:t>(</a:t>
+            </a:r>
+            <a:r>
+              <a:rPr lang="en-US" altLang="zh-TW" dirty="0" err="1"/>
+              <a:t>gitlab</a:t>
+            </a:r>
+            <a:r>
+              <a:rPr lang="en-US" altLang="zh-TW" dirty="0"/>
+              <a:t>, bash, </a:t>
+            </a:r>
+            <a:r>
+              <a:rPr lang="en-US" altLang="zh-TW" dirty="0" err="1"/>
+              <a:t>vscode</a:t>
+            </a:r>
+            <a:r>
+              <a:rPr lang="en-US" altLang="zh-TW" dirty="0"/>
+              <a:t>, </a:t>
+            </a:r>
+            <a:r>
+              <a:rPr lang="en-US" altLang="zh-TW" dirty="0" err="1"/>
+              <a:t>tortoiseGit</a:t>
+            </a:r>
+            <a:r>
+              <a:rPr lang="en-US" altLang="zh-TW" dirty="0"/>
+              <a:t>, </a:t>
+            </a:r>
+            <a:r>
+              <a:rPr lang="en-US" altLang="zh-TW" dirty="0" err="1"/>
+              <a:t>sourceTree</a:t>
+            </a:r>
+            <a:r>
+              <a:rPr lang="en-US" altLang="zh-TW" dirty="0"/>
+              <a:t>)</a:t>
+            </a:r>
+          </a:p>
+          <a:p>
+            <a:r>
+              <a:rPr lang="en-US" altLang="zh-TW" dirty="0"/>
+              <a:t>commit (work-tree/staged, commit with amend)</a:t>
+            </a:r>
+          </a:p>
+          <a:p>
+            <a:r>
+              <a:rPr lang="en-US" altLang="zh-TW" dirty="0"/>
+              <a:t>commit-operator (reset, revert, cherry-pick)</a:t>
+            </a:r>
+          </a:p>
+          <a:p>
+            <a:r>
+              <a:rPr lang="en-US" altLang="zh-TW" dirty="0"/>
+              <a:t>branch (tracking, merge, rebase, pull, push)</a:t>
+            </a:r>
+          </a:p>
+          <a:p>
+            <a:r>
+              <a:rPr lang="en-US" altLang="zh-TW" dirty="0"/>
+              <a:t>Gitlab (issue tracking, branch by issue(?), pull request)</a:t>
+            </a:r>
+          </a:p>
+          <a:p>
+            <a:r>
+              <a:rPr lang="en-US" altLang="zh-TW" dirty="0"/>
+              <a:t>Further (config, ignore, attribute, hook)</a:t>
+            </a:r>
+          </a:p>
+          <a:p>
+            <a:r>
+              <a:rPr lang="en-US" altLang="zh-TW" dirty="0"/>
+              <a:t>Reference</a:t>
+            </a:r>
+          </a:p>
+        </p:txBody>
+      </p:sp>
+      <p:sp>
+        <p:nvSpPr>
+          <p:cNvPr id="5" name="頁尾版面配置區 4"/>
+          <p:cNvSpPr>
+            <a:spLocks noGrp="1"/>
+          </p:cNvSpPr>
+          <p:nvPr>
+            <p:ph type="ftr" sz="quarter" idx="11"/>
+          </p:nvPr>
+        </p:nvSpPr>
+        <p:spPr/>
+        <p:txBody>
+          <a:bodyPr/>
+          <a:lstStyle/>
+          <a:p>
+            <a:r>
+              <a:rPr lang="en-US" altLang="zh-TW"/>
+              <a:t>104</a:t>
+            </a:r>
+            <a:r>
+              <a:rPr lang="zh-TW" altLang="en-US"/>
+              <a:t>人資學院  </a:t>
+            </a:r>
+            <a:r>
+              <a:rPr lang="en-US" altLang="zh-TW"/>
+              <a:t>All Rights Reserved</a:t>
+            </a:r>
+            <a:endParaRPr lang="zh-TW" altLang="en-US"/>
+          </a:p>
+        </p:txBody>
+      </p:sp>
+    </p:spTree>
+    <p:extLst>
+      <p:ext uri="{BB962C8B-B14F-4D97-AF65-F5344CB8AC3E}">
+        <p14:creationId xmlns:p14="http://schemas.microsoft.com/office/powerpoint/2010/main" val="4274691960"/>
+      </p:ext>
+    </p:extLst>
+  </p:cSld>
+  <p:clrMapOvr>
+    <a:masterClrMapping/>
+  </p:clrMapOvr>
+</p:sld>
+</file>
+
+<file path=ppt/slides/slide3.xml><?xml version="1.0" encoding="utf-8"?>
+<p:sld xmlns:a="http://schemas.openxmlformats.org/drawingml/2006/main" xmlns:r="http://schemas.openxmlformats.org/officeDocument/2006/relationships" xmlns:p="http://schemas.openxmlformats.org/presentationml/2006/main">
+  <p:cSld>
+    <p:spTree>
+      <p:nvGrpSpPr>
+        <p:cNvPr id="1" name=""/>
+        <p:cNvGrpSpPr/>
+        <p:nvPr/>
+      </p:nvGrpSpPr>
+      <p:grpSpPr>
+        <a:xfrm>
+          <a:off x="0" y="0"/>
+          <a:ext cx="0" cy="0"/>
+          <a:chOff x="0" y="0"/>
+          <a:chExt cx="0" cy="0"/>
+        </a:xfrm>
+      </p:grpSpPr>
+      <p:sp>
+        <p:nvSpPr>
+          <p:cNvPr id="2" name="標題 1">
+            <a:extLst>
+              <a:ext uri="{FF2B5EF4-FFF2-40B4-BE49-F238E27FC236}">
+                <a16:creationId xmlns:a16="http://schemas.microsoft.com/office/drawing/2014/main" id="{BF6D624E-CCBB-4E03-A8FD-7FC5FEC7B1A9}"/>
+              </a:ext>
+            </a:extLst>
+          </p:cNvPr>
+          <p:cNvSpPr>
+            <a:spLocks noGrp="1"/>
+          </p:cNvSpPr>
+          <p:nvPr>
+            <p:ph type="title"/>
+          </p:nvPr>
+        </p:nvSpPr>
+        <p:spPr/>
+        <p:txBody>
+          <a:bodyPr/>
+          <a:lstStyle/>
+          <a:p>
+            <a:r>
+              <a:rPr lang="en-US" altLang="zh-TW" dirty="0"/>
+              <a:t>SVN</a:t>
+            </a:r>
+            <a:r>
+              <a:rPr lang="zh-TW" altLang="en-US" dirty="0"/>
+              <a:t> 操作流程</a:t>
+            </a:r>
+          </a:p>
+        </p:txBody>
+      </p:sp>
+      <p:pic>
+        <p:nvPicPr>
+          <p:cNvPr id="7" name="內容版面配置區 6">
+            <a:extLst>
+              <a:ext uri="{FF2B5EF4-FFF2-40B4-BE49-F238E27FC236}">
+                <a16:creationId xmlns:a16="http://schemas.microsoft.com/office/drawing/2014/main" id="{F381AE29-6A7C-447C-BDA6-D3E7EA360644}"/>
+              </a:ext>
+            </a:extLst>
+          </p:cNvPr>
+          <p:cNvPicPr>
+            <a:picLocks noGrp="1" noChangeAspect="1"/>
+          </p:cNvPicPr>
+          <p:nvPr>
+            <p:ph idx="1"/>
+          </p:nvPr>
+        </p:nvPicPr>
+        <p:blipFill>
+          <a:blip r:embed="rId2">
+            <a:extLst>
+              <a:ext uri="{28A0092B-C50C-407E-A947-70E740481C1C}">
+                <a14:useLocalDpi xmlns:a14="http://schemas.microsoft.com/office/drawing/2010/main" val="0"/>
+              </a:ext>
+            </a:extLst>
+          </a:blip>
+          <a:stretch>
+            <a:fillRect/>
+          </a:stretch>
+        </p:blipFill>
+        <p:spPr>
+          <a:xfrm>
+            <a:off x="1067191" y="1600200"/>
+            <a:ext cx="7009617" cy="4525963"/>
+          </a:xfrm>
+        </p:spPr>
+      </p:pic>
+      <p:sp>
+        <p:nvSpPr>
+          <p:cNvPr id="4" name="頁尾版面配置區 3">
+            <a:extLst>
+              <a:ext uri="{FF2B5EF4-FFF2-40B4-BE49-F238E27FC236}">
+                <a16:creationId xmlns:a16="http://schemas.microsoft.com/office/drawing/2014/main" id="{906666CF-5A60-4C06-B04C-164D753A21A4}"/>
+              </a:ext>
+            </a:extLst>
+          </p:cNvPr>
+          <p:cNvSpPr>
+            <a:spLocks noGrp="1"/>
+          </p:cNvSpPr>
+          <p:nvPr>
+            <p:ph type="ftr" sz="quarter" idx="11"/>
+          </p:nvPr>
+        </p:nvSpPr>
+        <p:spPr/>
+        <p:txBody>
+          <a:bodyPr/>
+          <a:lstStyle/>
+          <a:p>
+            <a:r>
+              <a:rPr lang="en-US" altLang="zh-TW"/>
+              <a:t>104</a:t>
+            </a:r>
+            <a:r>
+              <a:rPr lang="zh-TW" altLang="en-US"/>
+              <a:t>人資學院  </a:t>
+            </a:r>
+            <a:r>
+              <a:rPr lang="en-US" altLang="zh-TW"/>
+              <a:t>All Rights Reserved</a:t>
+            </a:r>
+            <a:endParaRPr lang="zh-TW" altLang="en-US"/>
+          </a:p>
+        </p:txBody>
+      </p:sp>
+    </p:spTree>
+    <p:extLst>
+      <p:ext uri="{BB962C8B-B14F-4D97-AF65-F5344CB8AC3E}">
+        <p14:creationId xmlns:p14="http://schemas.microsoft.com/office/powerpoint/2010/main" val="423122223"/>
+      </p:ext>
+    </p:extLst>
+  </p:cSld>
+  <p:clrMapOvr>
+    <a:masterClrMapping/>
+  </p:clrMapOvr>
+</p:sld>
+</file>
+
+<file path=ppt/slides/slide4.xml><?xml version="1.0" encoding="utf-8"?>
+<p:sld xmlns:a="http://schemas.openxmlformats.org/drawingml/2006/main" xmlns:r="http://schemas.openxmlformats.org/officeDocument/2006/relationships" xmlns:p="http://schemas.openxmlformats.org/presentationml/2006/main">
+  <p:cSld>
+    <p:spTree>
+      <p:nvGrpSpPr>
+        <p:cNvPr id="1" name=""/>
+        <p:cNvGrpSpPr/>
+        <p:nvPr/>
+      </p:nvGrpSpPr>
+      <p:grpSpPr>
+        <a:xfrm>
+          <a:off x="0" y="0"/>
+          <a:ext cx="0" cy="0"/>
+          <a:chOff x="0" y="0"/>
+          <a:chExt cx="0" cy="0"/>
+        </a:xfrm>
+      </p:grpSpPr>
+      <p:sp>
+        <p:nvSpPr>
+          <p:cNvPr id="2" name="標題 1">
+            <a:extLst>
+              <a:ext uri="{FF2B5EF4-FFF2-40B4-BE49-F238E27FC236}">
+                <a16:creationId xmlns:a16="http://schemas.microsoft.com/office/drawing/2014/main" id="{F88E10E9-D69B-457E-94FC-6C7FBA39086D}"/>
+              </a:ext>
+            </a:extLst>
+          </p:cNvPr>
+          <p:cNvSpPr>
+            <a:spLocks noGrp="1"/>
+          </p:cNvSpPr>
+          <p:nvPr>
+            <p:ph type="title"/>
+          </p:nvPr>
+        </p:nvSpPr>
+        <p:spPr/>
+        <p:txBody>
+          <a:bodyPr/>
+          <a:lstStyle/>
+          <a:p>
+            <a:r>
+              <a:rPr lang="en-US" altLang="zh-TW" dirty="0"/>
+              <a:t>SVN</a:t>
+            </a:r>
+            <a:r>
+              <a:rPr lang="zh-TW" altLang="en-US" dirty="0"/>
+              <a:t> 工作模式</a:t>
+            </a:r>
+          </a:p>
+        </p:txBody>
+      </p:sp>
+      <p:pic>
+        <p:nvPicPr>
+          <p:cNvPr id="6" name="內容版面配置區 5">
+            <a:extLst>
+              <a:ext uri="{FF2B5EF4-FFF2-40B4-BE49-F238E27FC236}">
+                <a16:creationId xmlns:a16="http://schemas.microsoft.com/office/drawing/2014/main" id="{EE64C05D-4C45-4093-8156-1D0C0787ADB0}"/>
+              </a:ext>
+            </a:extLst>
+          </p:cNvPr>
+          <p:cNvPicPr>
+            <a:picLocks noGrp="1" noChangeAspect="1"/>
+          </p:cNvPicPr>
+          <p:nvPr>
+            <p:ph idx="1"/>
+          </p:nvPr>
+        </p:nvPicPr>
+        <p:blipFill>
+          <a:blip r:embed="rId2">
+            <a:extLst>
+              <a:ext uri="{28A0092B-C50C-407E-A947-70E740481C1C}">
+                <a14:useLocalDpi xmlns:a14="http://schemas.microsoft.com/office/drawing/2010/main" val="0"/>
+              </a:ext>
+            </a:extLst>
+          </a:blip>
+          <a:stretch>
+            <a:fillRect/>
+          </a:stretch>
+        </p:blipFill>
+        <p:spPr>
+          <a:xfrm>
+            <a:off x="1187624" y="1206392"/>
+            <a:ext cx="5521271" cy="4525963"/>
+          </a:xfrm>
+        </p:spPr>
+      </p:pic>
+      <p:sp>
+        <p:nvSpPr>
+          <p:cNvPr id="4" name="頁尾版面配置區 3">
+            <a:extLst>
+              <a:ext uri="{FF2B5EF4-FFF2-40B4-BE49-F238E27FC236}">
+                <a16:creationId xmlns:a16="http://schemas.microsoft.com/office/drawing/2014/main" id="{3C19FCBE-9131-4EE2-9AF0-C0EB6A126F9C}"/>
+              </a:ext>
+            </a:extLst>
+          </p:cNvPr>
+          <p:cNvSpPr>
+            <a:spLocks noGrp="1"/>
+          </p:cNvSpPr>
+          <p:nvPr>
+            <p:ph type="ftr" sz="quarter" idx="11"/>
+          </p:nvPr>
+        </p:nvSpPr>
+        <p:spPr/>
+        <p:txBody>
+          <a:bodyPr/>
+          <a:lstStyle/>
+          <a:p>
+            <a:r>
+              <a:rPr lang="en-US" altLang="zh-TW"/>
+              <a:t>104</a:t>
+            </a:r>
+            <a:r>
+              <a:rPr lang="zh-TW" altLang="en-US"/>
+              <a:t>人資學院  </a:t>
+            </a:r>
+            <a:r>
+              <a:rPr lang="en-US" altLang="zh-TW"/>
+              <a:t>All Rights Reserved</a:t>
+            </a:r>
+            <a:endParaRPr lang="zh-TW" altLang="en-US"/>
+          </a:p>
+        </p:txBody>
+      </p:sp>
+      <p:sp>
+        <p:nvSpPr>
+          <p:cNvPr id="9" name="文字方塊 8">
+            <a:extLst>
+              <a:ext uri="{FF2B5EF4-FFF2-40B4-BE49-F238E27FC236}">
+                <a16:creationId xmlns:a16="http://schemas.microsoft.com/office/drawing/2014/main" id="{5112AA7F-A0AE-4B27-8F06-50F5EEE23C4F}"/>
+              </a:ext>
+            </a:extLst>
+          </p:cNvPr>
+          <p:cNvSpPr txBox="1"/>
+          <p:nvPr/>
+        </p:nvSpPr>
+        <p:spPr>
+          <a:xfrm>
+            <a:off x="6156176" y="5832686"/>
+            <a:ext cx="2839239" cy="369332"/>
+          </a:xfrm>
+          <a:prstGeom prst="rect">
+            <a:avLst/>
+          </a:prstGeom>
+          <a:noFill/>
+        </p:spPr>
+        <p:txBody>
+          <a:bodyPr wrap="none" rtlCol="0">
+            <a:spAutoFit/>
+          </a:bodyPr>
+          <a:lstStyle/>
+          <a:p>
+            <a:r>
+              <a:rPr lang="en-US" altLang="zh-TW" dirty="0"/>
+              <a:t>*</a:t>
+            </a:r>
+            <a:r>
+              <a:rPr lang="zh-TW" altLang="en-US" dirty="0"/>
+              <a:t>分支切換等同資料夾切換</a:t>
+            </a:r>
+          </a:p>
+        </p:txBody>
+      </p:sp>
+      <p:sp>
+        <p:nvSpPr>
+          <p:cNvPr id="10" name="文字方塊 9">
+            <a:extLst>
+              <a:ext uri="{FF2B5EF4-FFF2-40B4-BE49-F238E27FC236}">
+                <a16:creationId xmlns:a16="http://schemas.microsoft.com/office/drawing/2014/main" id="{22776831-C75F-4005-B7B8-B4FF5B58DFE8}"/>
+              </a:ext>
+            </a:extLst>
+          </p:cNvPr>
+          <p:cNvSpPr txBox="1"/>
+          <p:nvPr/>
+        </p:nvSpPr>
+        <p:spPr>
+          <a:xfrm>
+            <a:off x="6156176" y="6214030"/>
+            <a:ext cx="2916696" cy="369332"/>
+          </a:xfrm>
+          <a:prstGeom prst="rect">
+            <a:avLst/>
+          </a:prstGeom>
+          <a:noFill/>
+        </p:spPr>
+        <p:txBody>
+          <a:bodyPr wrap="none" rtlCol="0">
+            <a:spAutoFit/>
+          </a:bodyPr>
+          <a:lstStyle/>
+          <a:p>
+            <a:r>
+              <a:rPr lang="en-US" altLang="zh-TW" dirty="0"/>
+              <a:t>*</a:t>
+            </a:r>
+            <a:r>
+              <a:rPr lang="zh-TW" altLang="en-US" dirty="0"/>
+              <a:t>程式比對</a:t>
+            </a:r>
+            <a:r>
+              <a:rPr lang="en-US" altLang="zh-TW" dirty="0"/>
+              <a:t>, beyond compare</a:t>
+            </a:r>
+            <a:endParaRPr lang="zh-TW" altLang="en-US" dirty="0"/>
+          </a:p>
+        </p:txBody>
+      </p:sp>
+    </p:spTree>
+    <p:extLst>
+      <p:ext uri="{BB962C8B-B14F-4D97-AF65-F5344CB8AC3E}">
+        <p14:creationId xmlns:p14="http://schemas.microsoft.com/office/powerpoint/2010/main" val="3782383416"/>
+      </p:ext>
+    </p:extLst>
+  </p:cSld>
+  <p:clrMapOvr>
+    <a:masterClrMapping/>
+  </p:clrMapOvr>
+</p:sld>
+</file>
+
+<file path=ppt/slides/slide5.xml><?xml version="1.0" encoding="utf-8"?>
+<p:sld xmlns:a="http://schemas.openxmlformats.org/drawingml/2006/main" xmlns:r="http://schemas.openxmlformats.org/officeDocument/2006/relationships" xmlns:p="http://schemas.openxmlformats.org/presentationml/2006/main">
+  <p:cSld>
+    <p:spTree>
+      <p:nvGrpSpPr>
+        <p:cNvPr id="1" name=""/>
+        <p:cNvGrpSpPr/>
+        <p:nvPr/>
+      </p:nvGrpSpPr>
+      <p:grpSpPr>
+        <a:xfrm>
+          <a:off x="0" y="0"/>
+          <a:ext cx="0" cy="0"/>
+          <a:chOff x="0" y="0"/>
+          <a:chExt cx="0" cy="0"/>
+        </a:xfrm>
+      </p:grpSpPr>
+      <p:sp>
+        <p:nvSpPr>
+          <p:cNvPr id="2" name="標題 1">
+            <a:extLst>
+              <a:ext uri="{FF2B5EF4-FFF2-40B4-BE49-F238E27FC236}">
+                <a16:creationId xmlns:a16="http://schemas.microsoft.com/office/drawing/2014/main" id="{53999CB7-69DB-4B49-9362-86D8C9322A57}"/>
+              </a:ext>
+            </a:extLst>
+          </p:cNvPr>
+          <p:cNvSpPr>
+            <a:spLocks noGrp="1"/>
+          </p:cNvSpPr>
+          <p:nvPr>
+            <p:ph type="title"/>
+          </p:nvPr>
+        </p:nvSpPr>
+        <p:spPr/>
+        <p:txBody>
+          <a:bodyPr/>
+          <a:lstStyle/>
+          <a:p>
+            <a:r>
+              <a:rPr lang="en-US" altLang="zh-TW" dirty="0"/>
+              <a:t>SVN </a:t>
+            </a:r>
+            <a:r>
+              <a:rPr lang="zh-TW" altLang="en-US" dirty="0"/>
+              <a:t>集中管理</a:t>
+            </a:r>
+          </a:p>
+        </p:txBody>
+      </p:sp>
+      <p:pic>
+        <p:nvPicPr>
+          <p:cNvPr id="6" name="內容版面配置區 5">
+            <a:extLst>
+              <a:ext uri="{FF2B5EF4-FFF2-40B4-BE49-F238E27FC236}">
+                <a16:creationId xmlns:a16="http://schemas.microsoft.com/office/drawing/2014/main" id="{A6DDEF7C-4CBD-49CB-9449-02BF4B3FBE8E}"/>
+              </a:ext>
+            </a:extLst>
+          </p:cNvPr>
+          <p:cNvPicPr>
+            <a:picLocks noGrp="1" noChangeAspect="1"/>
+          </p:cNvPicPr>
+          <p:nvPr>
+            <p:ph idx="1"/>
+          </p:nvPr>
+        </p:nvPicPr>
+        <p:blipFill>
+          <a:blip r:embed="rId2">
+            <a:extLst>
+              <a:ext uri="{28A0092B-C50C-407E-A947-70E740481C1C}">
+                <a14:useLocalDpi xmlns:a14="http://schemas.microsoft.com/office/drawing/2010/main" val="0"/>
+              </a:ext>
+            </a:extLst>
+          </a:blip>
+          <a:stretch>
+            <a:fillRect/>
+          </a:stretch>
+        </p:blipFill>
+        <p:spPr>
+          <a:xfrm>
+            <a:off x="457200" y="1340768"/>
+            <a:ext cx="8229600" cy="3634982"/>
+          </a:xfrm>
+        </p:spPr>
+      </p:pic>
+      <p:sp>
+        <p:nvSpPr>
+          <p:cNvPr id="4" name="頁尾版面配置區 3">
+            <a:extLst>
+              <a:ext uri="{FF2B5EF4-FFF2-40B4-BE49-F238E27FC236}">
+                <a16:creationId xmlns:a16="http://schemas.microsoft.com/office/drawing/2014/main" id="{6719643B-FEEF-410A-BEB2-1BDDAC8BA14B}"/>
+              </a:ext>
+            </a:extLst>
+          </p:cNvPr>
+          <p:cNvSpPr>
+            <a:spLocks noGrp="1"/>
+          </p:cNvSpPr>
+          <p:nvPr>
+            <p:ph type="ftr" sz="quarter" idx="11"/>
+          </p:nvPr>
+        </p:nvSpPr>
+        <p:spPr/>
+        <p:txBody>
+          <a:bodyPr/>
+          <a:lstStyle/>
+          <a:p>
+            <a:r>
+              <a:rPr lang="en-US" altLang="zh-TW"/>
+              <a:t>104</a:t>
+            </a:r>
+            <a:r>
+              <a:rPr lang="zh-TW" altLang="en-US"/>
+              <a:t>人資學院  </a:t>
+            </a:r>
+            <a:r>
+              <a:rPr lang="en-US" altLang="zh-TW"/>
+              <a:t>All Rights Reserved</a:t>
+            </a:r>
+            <a:endParaRPr lang="zh-TW" altLang="en-US"/>
+          </a:p>
+        </p:txBody>
+      </p:sp>
+      <p:sp>
+        <p:nvSpPr>
+          <p:cNvPr id="7" name="文字方塊 6">
+            <a:extLst>
+              <a:ext uri="{FF2B5EF4-FFF2-40B4-BE49-F238E27FC236}">
+                <a16:creationId xmlns:a16="http://schemas.microsoft.com/office/drawing/2014/main" id="{52EAA2B1-FDE0-471A-A906-D3885C8AD42F}"/>
+              </a:ext>
+            </a:extLst>
+          </p:cNvPr>
+          <p:cNvSpPr txBox="1"/>
+          <p:nvPr/>
+        </p:nvSpPr>
+        <p:spPr>
+          <a:xfrm>
+            <a:off x="5705237" y="5279192"/>
+            <a:ext cx="2661306" cy="369332"/>
+          </a:xfrm>
+          <a:prstGeom prst="rect">
+            <a:avLst/>
+          </a:prstGeom>
+          <a:noFill/>
+        </p:spPr>
+        <p:txBody>
+          <a:bodyPr wrap="none" rtlCol="0">
+            <a:spAutoFit/>
+          </a:bodyPr>
+          <a:lstStyle/>
+          <a:p>
+            <a:r>
+              <a:rPr lang="en-US" altLang="zh-TW" dirty="0"/>
+              <a:t>*</a:t>
+            </a:r>
+            <a:r>
+              <a:rPr lang="zh-TW" altLang="en-US" dirty="0"/>
+              <a:t>兩個程式庫</a:t>
+            </a:r>
+            <a:r>
+              <a:rPr lang="en-US" altLang="zh-TW" dirty="0"/>
+              <a:t>(</a:t>
+            </a:r>
+            <a:r>
+              <a:rPr lang="zh-TW" altLang="en-US" dirty="0"/>
+              <a:t>公司</a:t>
+            </a:r>
+            <a:r>
+              <a:rPr lang="en-US" altLang="zh-TW" dirty="0"/>
+              <a:t>/</a:t>
+            </a:r>
+            <a:r>
+              <a:rPr lang="zh-TW" altLang="en-US" dirty="0"/>
+              <a:t>用戶</a:t>
+            </a:r>
+            <a:r>
+              <a:rPr lang="en-US" altLang="zh-TW" dirty="0"/>
+              <a:t>)</a:t>
+            </a:r>
+            <a:endParaRPr lang="zh-TW" altLang="en-US" dirty="0"/>
+          </a:p>
+        </p:txBody>
+      </p:sp>
+      <p:sp>
+        <p:nvSpPr>
+          <p:cNvPr id="8" name="文字方塊 7">
+            <a:extLst>
+              <a:ext uri="{FF2B5EF4-FFF2-40B4-BE49-F238E27FC236}">
+                <a16:creationId xmlns:a16="http://schemas.microsoft.com/office/drawing/2014/main" id="{52ED857D-5E74-478C-A09C-C241CA048932}"/>
+              </a:ext>
+            </a:extLst>
+          </p:cNvPr>
+          <p:cNvSpPr txBox="1"/>
+          <p:nvPr/>
+        </p:nvSpPr>
+        <p:spPr>
+          <a:xfrm>
+            <a:off x="5705237" y="5660536"/>
+            <a:ext cx="3365024" cy="369332"/>
+          </a:xfrm>
+          <a:prstGeom prst="rect">
+            <a:avLst/>
+          </a:prstGeom>
+          <a:noFill/>
+        </p:spPr>
+        <p:txBody>
+          <a:bodyPr wrap="none" rtlCol="0">
+            <a:spAutoFit/>
+          </a:bodyPr>
+          <a:lstStyle/>
+          <a:p>
+            <a:r>
+              <a:rPr lang="en-US" altLang="zh-TW" dirty="0"/>
+              <a:t>*</a:t>
+            </a:r>
+            <a:r>
+              <a:rPr lang="zh-TW" altLang="en-US" dirty="0"/>
+              <a:t>離開</a:t>
+            </a:r>
+            <a:r>
+              <a:rPr lang="en-US" altLang="zh-TW" dirty="0"/>
+              <a:t>SVN</a:t>
+            </a:r>
+            <a:r>
+              <a:rPr lang="zh-TW" altLang="en-US" dirty="0"/>
+              <a:t>後無法作業</a:t>
+            </a:r>
+            <a:r>
+              <a:rPr lang="en-US" altLang="zh-TW" dirty="0"/>
+              <a:t>(</a:t>
+            </a:r>
+            <a:r>
+              <a:rPr lang="zh-TW" altLang="en-US" dirty="0"/>
+              <a:t>無法加班</a:t>
+            </a:r>
+            <a:r>
+              <a:rPr lang="en-US" altLang="zh-TW" dirty="0"/>
+              <a:t>)</a:t>
+            </a:r>
+            <a:endParaRPr lang="zh-TW" altLang="en-US" dirty="0"/>
+          </a:p>
+        </p:txBody>
+      </p:sp>
+      <p:sp>
+        <p:nvSpPr>
+          <p:cNvPr id="9" name="文字方塊 8">
+            <a:extLst>
+              <a:ext uri="{FF2B5EF4-FFF2-40B4-BE49-F238E27FC236}">
+                <a16:creationId xmlns:a16="http://schemas.microsoft.com/office/drawing/2014/main" id="{0FE15FC9-9F51-420B-BD55-C84C26ECF072}"/>
+              </a:ext>
+            </a:extLst>
+          </p:cNvPr>
+          <p:cNvSpPr txBox="1"/>
+          <p:nvPr/>
+        </p:nvSpPr>
+        <p:spPr>
+          <a:xfrm>
+            <a:off x="5705237" y="6041880"/>
+            <a:ext cx="3441968" cy="369332"/>
+          </a:xfrm>
+          <a:prstGeom prst="rect">
+            <a:avLst/>
+          </a:prstGeom>
+          <a:noFill/>
+        </p:spPr>
+        <p:txBody>
+          <a:bodyPr wrap="none" rtlCol="0">
+            <a:spAutoFit/>
+          </a:bodyPr>
+          <a:lstStyle/>
+          <a:p>
+            <a:r>
+              <a:rPr lang="en-US" altLang="zh-TW" dirty="0"/>
+              <a:t>*</a:t>
+            </a:r>
+            <a:r>
+              <a:rPr lang="zh-TW" altLang="en-US" dirty="0"/>
+              <a:t>程式碼錯誤影響作業</a:t>
+            </a:r>
+            <a:r>
+              <a:rPr lang="en-US" altLang="zh-TW" dirty="0"/>
+              <a:t>(</a:t>
+            </a:r>
+            <a:r>
+              <a:rPr lang="zh-TW" altLang="en-US" dirty="0"/>
+              <a:t>個別排除</a:t>
+            </a:r>
+            <a:r>
+              <a:rPr lang="en-US" altLang="zh-TW" dirty="0"/>
+              <a:t>)</a:t>
+            </a:r>
+            <a:endParaRPr lang="zh-TW" altLang="en-US" dirty="0"/>
+          </a:p>
+        </p:txBody>
+      </p:sp>
+    </p:spTree>
+    <p:extLst>
+      <p:ext uri="{BB962C8B-B14F-4D97-AF65-F5344CB8AC3E}">
+        <p14:creationId xmlns:p14="http://schemas.microsoft.com/office/powerpoint/2010/main" val="4135814375"/>
+      </p:ext>
+    </p:extLst>
+  </p:cSld>
+  <p:clrMapOvr>
+    <a:masterClrMapping/>
+  </p:clrMapOvr>
+</p:sld>
+</file>
+
+<file path=ppt/slides/slide6.xml><?xml version="1.0" encoding="utf-8"?>
+<p:sld xmlns:a="http://schemas.openxmlformats.org/drawingml/2006/main" xmlns:r="http://schemas.openxmlformats.org/officeDocument/2006/relationships" xmlns:p="http://schemas.openxmlformats.org/presentationml/2006/main">
+  <p:cSld>
+    <p:spTree>
+      <p:nvGrpSpPr>
+        <p:cNvPr id="1" name=""/>
+        <p:cNvGrpSpPr/>
+        <p:nvPr/>
+      </p:nvGrpSpPr>
+      <p:grpSpPr>
+        <a:xfrm>
+          <a:off x="0" y="0"/>
+          <a:ext cx="0" cy="0"/>
+          <a:chOff x="0" y="0"/>
+          <a:chExt cx="0" cy="0"/>
+        </a:xfrm>
+      </p:grpSpPr>
+      <p:sp>
+        <p:nvSpPr>
+          <p:cNvPr id="2" name="標題 1">
+            <a:extLst>
+              <a:ext uri="{FF2B5EF4-FFF2-40B4-BE49-F238E27FC236}">
+                <a16:creationId xmlns:a16="http://schemas.microsoft.com/office/drawing/2014/main" id="{1F53BFC4-38C1-46A5-8967-4D5F3CB1B717}"/>
+              </a:ext>
+            </a:extLst>
+          </p:cNvPr>
+          <p:cNvSpPr>
+            <a:spLocks noGrp="1"/>
+          </p:cNvSpPr>
+          <p:nvPr>
+            <p:ph type="title"/>
+          </p:nvPr>
+        </p:nvSpPr>
+        <p:spPr/>
+        <p:txBody>
+          <a:bodyPr/>
+          <a:lstStyle/>
+          <a:p>
+            <a:r>
+              <a:rPr lang="en-US" altLang="zh-TW" dirty="0"/>
+              <a:t>Promise </a:t>
+            </a:r>
+            <a:r>
+              <a:rPr lang="en-US" altLang="zh-TW" dirty="0" err="1"/>
+              <a:t>concat</a:t>
+            </a:r>
+            <a:endParaRPr lang="zh-TW" altLang="en-US" dirty="0"/>
+          </a:p>
+        </p:txBody>
+      </p:sp>
+      <p:sp>
+        <p:nvSpPr>
+          <p:cNvPr id="3" name="內容版面配置區 2">
+            <a:extLst>
+              <a:ext uri="{FF2B5EF4-FFF2-40B4-BE49-F238E27FC236}">
+                <a16:creationId xmlns:a16="http://schemas.microsoft.com/office/drawing/2014/main" id="{ED6A5C43-F74E-4DBC-AC33-4FB90C3BE8D6}"/>
+              </a:ext>
+            </a:extLst>
+          </p:cNvPr>
+          <p:cNvSpPr>
+            <a:spLocks noGrp="1"/>
+          </p:cNvSpPr>
+          <p:nvPr>
+            <p:ph idx="1"/>
+          </p:nvPr>
+        </p:nvSpPr>
+        <p:spPr/>
+        <p:txBody>
+          <a:bodyPr/>
+          <a:lstStyle/>
+          <a:p>
+            <a:r>
+              <a:rPr lang="en-US" altLang="zh-TW" dirty="0">
+                <a:sym typeface="Wingdings" panose="05000000000000000000" pitchFamily="2" charset="2"/>
+              </a:rPr>
+              <a:t>/Ehrms2portal_SC/api-auth-acUser.js LINE </a:t>
+            </a:r>
+            <a:r>
+              <a:rPr lang="en-US" altLang="zh-TW" dirty="0">
+                <a:sym typeface="Wingdings" panose="05000000000000000000" pitchFamily="2" charset="2"/>
+                <a:hlinkClick r:id="rId2"/>
+              </a:rPr>
+              <a:t>927</a:t>
+            </a:r>
+            <a:endParaRPr lang="en-US" altLang="zh-TW" dirty="0">
+              <a:sym typeface="Wingdings" panose="05000000000000000000" pitchFamily="2" charset="2"/>
+            </a:endParaRPr>
+          </a:p>
+          <a:p>
+            <a:endParaRPr lang="en-US" altLang="zh-TW" dirty="0">
+              <a:sym typeface="Wingdings" panose="05000000000000000000" pitchFamily="2" charset="2"/>
+            </a:endParaRPr>
+          </a:p>
+        </p:txBody>
+      </p:sp>
+      <p:sp>
+        <p:nvSpPr>
+          <p:cNvPr id="4" name="頁尾版面配置區 3">
+            <a:extLst>
+              <a:ext uri="{FF2B5EF4-FFF2-40B4-BE49-F238E27FC236}">
+                <a16:creationId xmlns:a16="http://schemas.microsoft.com/office/drawing/2014/main" id="{9C15FB9A-0695-4774-8738-81A625865030}"/>
+              </a:ext>
+            </a:extLst>
+          </p:cNvPr>
+          <p:cNvSpPr>
+            <a:spLocks noGrp="1"/>
+          </p:cNvSpPr>
+          <p:nvPr>
+            <p:ph type="ftr" sz="quarter" idx="11"/>
+          </p:nvPr>
+        </p:nvSpPr>
+        <p:spPr/>
+        <p:txBody>
+          <a:bodyPr/>
+          <a:lstStyle/>
+          <a:p>
+            <a:r>
+              <a:rPr lang="en-US" altLang="zh-TW"/>
+              <a:t>104</a:t>
+            </a:r>
+            <a:r>
+              <a:rPr lang="zh-TW" altLang="en-US"/>
+              <a:t>人資學院  </a:t>
+            </a:r>
+            <a:r>
+              <a:rPr lang="en-US" altLang="zh-TW"/>
+              <a:t>All Rights Reserved</a:t>
+            </a:r>
+            <a:endParaRPr lang="zh-TW" altLang="en-US"/>
+          </a:p>
+        </p:txBody>
+      </p:sp>
+      <p:pic>
+        <p:nvPicPr>
+          <p:cNvPr id="5" name="圖片 4">
+            <a:extLst>
+              <a:ext uri="{FF2B5EF4-FFF2-40B4-BE49-F238E27FC236}">
+                <a16:creationId xmlns:a16="http://schemas.microsoft.com/office/drawing/2014/main" id="{58663B3E-3A13-4FFA-B551-C659A514A42A}"/>
+              </a:ext>
+            </a:extLst>
+          </p:cNvPr>
+          <p:cNvPicPr>
+            <a:picLocks noChangeAspect="1"/>
+          </p:cNvPicPr>
+          <p:nvPr/>
+        </p:nvPicPr>
+        <p:blipFill>
+          <a:blip r:embed="rId3"/>
+          <a:stretch>
+            <a:fillRect/>
+          </a:stretch>
+        </p:blipFill>
+        <p:spPr>
+          <a:xfrm>
+            <a:off x="505244" y="2276872"/>
+            <a:ext cx="8269654" cy="4052746"/>
+          </a:xfrm>
+          <a:prstGeom prst="rect">
+            <a:avLst/>
+          </a:prstGeom>
+        </p:spPr>
+      </p:pic>
+    </p:spTree>
+    <p:extLst>
+      <p:ext uri="{BB962C8B-B14F-4D97-AF65-F5344CB8AC3E}">
+        <p14:creationId xmlns:p14="http://schemas.microsoft.com/office/powerpoint/2010/main" val="280376510"/>
+      </p:ext>
+    </p:extLst>
+  </p:cSld>
+  <p:clrMapOvr>
+    <a:masterClrMapping/>
+  </p:clrMapOvr>
+</p:sld>
+</file>
+
+<file path=ppt/slides/slide7.xml><?xml version="1.0" encoding="utf-8"?>
+<p:sld xmlns:a="http://schemas.openxmlformats.org/drawingml/2006/main" xmlns:r="http://schemas.openxmlformats.org/officeDocument/2006/relationships" xmlns:p="http://schemas.openxmlformats.org/presentationml/2006/main">
+  <p:cSld>
+    <p:spTree>
+      <p:nvGrpSpPr>
+        <p:cNvPr id="1" name=""/>
+        <p:cNvGrpSpPr/>
+        <p:nvPr/>
+      </p:nvGrpSpPr>
+      <p:grpSpPr>
+        <a:xfrm>
+          <a:off x="0" y="0"/>
+          <a:ext cx="0" cy="0"/>
+          <a:chOff x="0" y="0"/>
+          <a:chExt cx="0" cy="0"/>
+        </a:xfrm>
+      </p:grpSpPr>
+      <p:sp>
+        <p:nvSpPr>
+          <p:cNvPr id="2" name="標題 1">
+            <a:extLst>
+              <a:ext uri="{FF2B5EF4-FFF2-40B4-BE49-F238E27FC236}">
+                <a16:creationId xmlns:a16="http://schemas.microsoft.com/office/drawing/2014/main" id="{51841209-40F9-48A5-9D1B-ED5369596D62}"/>
+              </a:ext>
+            </a:extLst>
+          </p:cNvPr>
+          <p:cNvSpPr>
+            <a:spLocks noGrp="1"/>
+          </p:cNvSpPr>
+          <p:nvPr>
+            <p:ph type="title"/>
+          </p:nvPr>
+        </p:nvSpPr>
+        <p:spPr/>
+        <p:txBody>
+          <a:bodyPr/>
+          <a:lstStyle/>
+          <a:p>
+            <a:r>
+              <a:rPr lang="en-US" altLang="zh-TW" dirty="0" err="1"/>
+              <a:t>Async</a:t>
+            </a:r>
+            <a:r>
+              <a:rPr lang="en-US" altLang="zh-TW" dirty="0"/>
+              <a:t> try-catch-finally</a:t>
+            </a:r>
+            <a:endParaRPr lang="zh-TW" altLang="en-US" dirty="0"/>
+          </a:p>
+        </p:txBody>
+      </p:sp>
+      <p:sp>
+        <p:nvSpPr>
+          <p:cNvPr id="3" name="內容版面配置區 2">
+            <a:extLst>
+              <a:ext uri="{FF2B5EF4-FFF2-40B4-BE49-F238E27FC236}">
+                <a16:creationId xmlns:a16="http://schemas.microsoft.com/office/drawing/2014/main" id="{F478725F-0E0D-47B3-9E2B-1F4D255BF391}"/>
+              </a:ext>
+            </a:extLst>
+          </p:cNvPr>
+          <p:cNvSpPr>
+            <a:spLocks noGrp="1"/>
+          </p:cNvSpPr>
+          <p:nvPr>
+            <p:ph idx="1"/>
+          </p:nvPr>
+        </p:nvSpPr>
+        <p:spPr/>
+        <p:txBody>
+          <a:bodyPr/>
+          <a:lstStyle/>
+          <a:p>
+            <a:r>
+              <a:rPr lang="en-US" altLang="zh-TW" dirty="0">
+                <a:sym typeface="Wingdings" panose="05000000000000000000" pitchFamily="2" charset="2"/>
+              </a:rPr>
+              <a:t>/Ehrms2portal_SC/api-auth-acUser.js LINE </a:t>
+            </a:r>
+            <a:r>
+              <a:rPr lang="en-US" altLang="zh-TW" dirty="0">
+                <a:sym typeface="Wingdings" panose="05000000000000000000" pitchFamily="2" charset="2"/>
+                <a:hlinkClick r:id="rId2"/>
+              </a:rPr>
+              <a:t>954</a:t>
+            </a:r>
+            <a:br>
+              <a:rPr lang="en-US" altLang="zh-TW" dirty="0">
+                <a:sym typeface="Wingdings" panose="05000000000000000000" pitchFamily="2" charset="2"/>
+              </a:rPr>
+            </a:br>
+            <a:br>
+              <a:rPr lang="en-US" altLang="zh-TW" dirty="0">
+                <a:sym typeface="Wingdings" panose="05000000000000000000" pitchFamily="2" charset="2"/>
+              </a:rPr>
+            </a:br>
+            <a:endParaRPr lang="en-US" altLang="zh-TW" dirty="0">
+              <a:sym typeface="Wingdings" panose="05000000000000000000" pitchFamily="2" charset="2"/>
+            </a:endParaRPr>
+          </a:p>
+        </p:txBody>
+      </p:sp>
+      <p:sp>
+        <p:nvSpPr>
+          <p:cNvPr id="4" name="頁尾版面配置區 3">
+            <a:extLst>
+              <a:ext uri="{FF2B5EF4-FFF2-40B4-BE49-F238E27FC236}">
+                <a16:creationId xmlns:a16="http://schemas.microsoft.com/office/drawing/2014/main" id="{F27157E0-4972-47AE-BAEE-01518FBF20C6}"/>
+              </a:ext>
+            </a:extLst>
+          </p:cNvPr>
+          <p:cNvSpPr>
+            <a:spLocks noGrp="1"/>
+          </p:cNvSpPr>
+          <p:nvPr>
+            <p:ph type="ftr" sz="quarter" idx="11"/>
+          </p:nvPr>
+        </p:nvSpPr>
+        <p:spPr/>
+        <p:txBody>
+          <a:bodyPr/>
+          <a:lstStyle/>
+          <a:p>
+            <a:r>
+              <a:rPr lang="en-US" altLang="zh-TW"/>
+              <a:t>104</a:t>
+            </a:r>
+            <a:r>
+              <a:rPr lang="zh-TW" altLang="en-US"/>
+              <a:t>人資學院  </a:t>
+            </a:r>
+            <a:r>
+              <a:rPr lang="en-US" altLang="zh-TW"/>
+              <a:t>All Rights Reserved</a:t>
+            </a:r>
+            <a:endParaRPr lang="zh-TW" altLang="en-US"/>
+          </a:p>
+        </p:txBody>
+      </p:sp>
+      <p:pic>
+        <p:nvPicPr>
+          <p:cNvPr id="5" name="圖片 4">
+            <a:extLst>
+              <a:ext uri="{FF2B5EF4-FFF2-40B4-BE49-F238E27FC236}">
+                <a16:creationId xmlns:a16="http://schemas.microsoft.com/office/drawing/2014/main" id="{35A7F754-E147-45E8-8627-5B09F096336F}"/>
+              </a:ext>
+            </a:extLst>
+          </p:cNvPr>
+          <p:cNvPicPr>
+            <a:picLocks noChangeAspect="1"/>
+          </p:cNvPicPr>
+          <p:nvPr/>
+        </p:nvPicPr>
+        <p:blipFill>
+          <a:blip r:embed="rId3"/>
+          <a:stretch>
+            <a:fillRect/>
+          </a:stretch>
+        </p:blipFill>
+        <p:spPr>
+          <a:xfrm>
+            <a:off x="228158" y="2564904"/>
+            <a:ext cx="8645615" cy="3743821"/>
+          </a:xfrm>
+          <a:prstGeom prst="rect">
+            <a:avLst/>
+          </a:prstGeom>
+        </p:spPr>
+      </p:pic>
+    </p:spTree>
+    <p:extLst>
+      <p:ext uri="{BB962C8B-B14F-4D97-AF65-F5344CB8AC3E}">
+        <p14:creationId xmlns:p14="http://schemas.microsoft.com/office/powerpoint/2010/main" val="909642701"/>
+      </p:ext>
+    </p:extLst>
+  </p:cSld>
+  <p:clrMapOvr>
+    <a:masterClrMapping/>
+  </p:clrMapOvr>
+</p:sld>
+</file>
+
+<file path=ppt/slides/slide8.xml><?xml version="1.0" encoding="utf-8"?>
+<p:sld xmlns:a="http://schemas.openxmlformats.org/drawingml/2006/main" xmlns:r="http://schemas.openxmlformats.org/officeDocument/2006/relationships" xmlns:p="http://schemas.openxmlformats.org/presentationml/2006/main">
+  <p:cSld>
+    <p:spTree>
+      <p:nvGrpSpPr>
+        <p:cNvPr id="1" name=""/>
+        <p:cNvGrpSpPr/>
+        <p:nvPr/>
+      </p:nvGrpSpPr>
+      <p:grpSpPr>
+        <a:xfrm>
+          <a:off x="0" y="0"/>
+          <a:ext cx="0" cy="0"/>
+          <a:chOff x="0" y="0"/>
+          <a:chExt cx="0" cy="0"/>
+        </a:xfrm>
+      </p:grpSpPr>
+      <p:sp>
+        <p:nvSpPr>
+          <p:cNvPr id="2" name="標題 1">
+            <a:extLst>
+              <a:ext uri="{FF2B5EF4-FFF2-40B4-BE49-F238E27FC236}">
+                <a16:creationId xmlns:a16="http://schemas.microsoft.com/office/drawing/2014/main" id="{1765C254-721E-4166-AA1E-F93E7AD9AEF6}"/>
+              </a:ext>
+            </a:extLst>
+          </p:cNvPr>
+          <p:cNvSpPr>
+            <a:spLocks noGrp="1"/>
+          </p:cNvSpPr>
+          <p:nvPr>
+            <p:ph type="title"/>
+          </p:nvPr>
+        </p:nvSpPr>
+        <p:spPr/>
+        <p:txBody>
+          <a:bodyPr/>
+          <a:lstStyle/>
+          <a:p>
+            <a:r>
+              <a:rPr lang="en-US" altLang="zh-TW" dirty="0" err="1"/>
+              <a:t>Async.Waterfall</a:t>
+            </a:r>
+            <a:r>
+              <a:rPr lang="en-US" altLang="zh-TW" dirty="0"/>
+              <a:t> </a:t>
+            </a:r>
+            <a:endParaRPr lang="zh-TW" altLang="en-US" dirty="0"/>
+          </a:p>
+        </p:txBody>
+      </p:sp>
+      <p:sp>
+        <p:nvSpPr>
+          <p:cNvPr id="3" name="內容版面配置區 2">
+            <a:extLst>
+              <a:ext uri="{FF2B5EF4-FFF2-40B4-BE49-F238E27FC236}">
+                <a16:creationId xmlns:a16="http://schemas.microsoft.com/office/drawing/2014/main" id="{6C92636B-C021-4799-85C3-9700D8CBB79B}"/>
+              </a:ext>
+            </a:extLst>
+          </p:cNvPr>
+          <p:cNvSpPr>
+            <a:spLocks noGrp="1"/>
+          </p:cNvSpPr>
+          <p:nvPr>
+            <p:ph idx="1"/>
+          </p:nvPr>
+        </p:nvSpPr>
+        <p:spPr/>
+        <p:txBody>
+          <a:bodyPr/>
+          <a:lstStyle/>
+          <a:p>
+            <a:r>
+              <a:rPr lang="en-US" altLang="zh-TW" dirty="0">
+                <a:sym typeface="Wingdings" panose="05000000000000000000" pitchFamily="2" charset="2"/>
+              </a:rPr>
+              <a:t>/Ehrms2portal_SC/api-auth-acPwdRule.js LINE </a:t>
+            </a:r>
+            <a:r>
+              <a:rPr lang="en-US" altLang="zh-TW" dirty="0">
+                <a:sym typeface="Wingdings" panose="05000000000000000000" pitchFamily="2" charset="2"/>
+                <a:hlinkClick r:id="rId2"/>
+              </a:rPr>
+              <a:t>531</a:t>
+            </a:r>
+            <a:br>
+              <a:rPr lang="en-US" altLang="zh-TW" dirty="0">
+                <a:sym typeface="Wingdings" panose="05000000000000000000" pitchFamily="2" charset="2"/>
+              </a:rPr>
+            </a:br>
+            <a:br>
+              <a:rPr lang="en-US" altLang="zh-TW" dirty="0">
+                <a:sym typeface="Wingdings" panose="05000000000000000000" pitchFamily="2" charset="2"/>
+              </a:rPr>
+            </a:br>
+            <a:endParaRPr lang="en-US" altLang="zh-TW" dirty="0">
+              <a:sym typeface="Wingdings" panose="05000000000000000000" pitchFamily="2" charset="2"/>
+            </a:endParaRPr>
+          </a:p>
+          <a:p>
+            <a:endParaRPr lang="zh-TW" altLang="en-US" dirty="0"/>
+          </a:p>
+        </p:txBody>
+      </p:sp>
+      <p:sp>
+        <p:nvSpPr>
+          <p:cNvPr id="4" name="頁尾版面配置區 3">
+            <a:extLst>
+              <a:ext uri="{FF2B5EF4-FFF2-40B4-BE49-F238E27FC236}">
+                <a16:creationId xmlns:a16="http://schemas.microsoft.com/office/drawing/2014/main" id="{B4E2C0EB-CD7F-4DE2-AAF7-9F290C4E6697}"/>
+              </a:ext>
+            </a:extLst>
+          </p:cNvPr>
+          <p:cNvSpPr>
+            <a:spLocks noGrp="1"/>
+          </p:cNvSpPr>
+          <p:nvPr>
+            <p:ph type="ftr" sz="quarter" idx="11"/>
+          </p:nvPr>
+        </p:nvSpPr>
+        <p:spPr/>
+        <p:txBody>
+          <a:bodyPr/>
+          <a:lstStyle/>
+          <a:p>
+            <a:r>
+              <a:rPr lang="en-US" altLang="zh-TW"/>
+              <a:t>104</a:t>
+            </a:r>
+            <a:r>
+              <a:rPr lang="zh-TW" altLang="en-US"/>
+              <a:t>人資學院  </a:t>
+            </a:r>
+            <a:r>
+              <a:rPr lang="en-US" altLang="zh-TW"/>
+              <a:t>All Rights Reserved</a:t>
+            </a:r>
+            <a:endParaRPr lang="zh-TW" altLang="en-US"/>
+          </a:p>
+        </p:txBody>
+      </p:sp>
+      <p:pic>
+        <p:nvPicPr>
+          <p:cNvPr id="5" name="圖片 4">
+            <a:extLst>
+              <a:ext uri="{FF2B5EF4-FFF2-40B4-BE49-F238E27FC236}">
+                <a16:creationId xmlns:a16="http://schemas.microsoft.com/office/drawing/2014/main" id="{33488B55-F97A-4C63-921A-A7408E2D6A35}"/>
+              </a:ext>
+            </a:extLst>
+          </p:cNvPr>
+          <p:cNvPicPr>
+            <a:picLocks noChangeAspect="1"/>
+          </p:cNvPicPr>
+          <p:nvPr/>
+        </p:nvPicPr>
+        <p:blipFill>
+          <a:blip r:embed="rId3"/>
+          <a:stretch>
+            <a:fillRect/>
+          </a:stretch>
+        </p:blipFill>
+        <p:spPr>
+          <a:xfrm>
+            <a:off x="533005" y="2852936"/>
+            <a:ext cx="8153796" cy="3530848"/>
+          </a:xfrm>
+          <a:prstGeom prst="rect">
+            <a:avLst/>
+          </a:prstGeom>
+        </p:spPr>
+      </p:pic>
+    </p:spTree>
+    <p:extLst>
+      <p:ext uri="{BB962C8B-B14F-4D97-AF65-F5344CB8AC3E}">
+        <p14:creationId xmlns:p14="http://schemas.microsoft.com/office/powerpoint/2010/main" val="1886309669"/>
+      </p:ext>
+    </p:extLst>
+  </p:cSld>
+  <p:clrMapOvr>
+    <a:masterClrMapping/>
+  </p:clrMapOvr>
+</p:sld>
+</file>
+
+<file path=ppt/slides/slide9.xml><?xml version="1.0" encoding="utf-8"?>
+<p:sld xmlns:a="http://schemas.openxmlformats.org/drawingml/2006/main" xmlns:r="http://schemas.openxmlformats.org/officeDocument/2006/relationships" xmlns:p="http://schemas.openxmlformats.org/presentationml/2006/main">
+  <p:cSld>
+    <p:spTree>
+      <p:nvGrpSpPr>
+        <p:cNvPr id="1" name=""/>
+        <p:cNvGrpSpPr/>
+        <p:nvPr/>
+      </p:nvGrpSpPr>
+      <p:grpSpPr>
+        <a:xfrm>
+          <a:off x="0" y="0"/>
+          <a:ext cx="0" cy="0"/>
+          <a:chOff x="0" y="0"/>
+          <a:chExt cx="0" cy="0"/>
+        </a:xfrm>
+      </p:grpSpPr>
+      <p:sp>
+        <p:nvSpPr>
+          <p:cNvPr id="2" name="標題 1">
+            <a:extLst>
+              <a:ext uri="{FF2B5EF4-FFF2-40B4-BE49-F238E27FC236}">
+                <a16:creationId xmlns:a16="http://schemas.microsoft.com/office/drawing/2014/main" id="{647F4C66-668A-4D8A-8F51-F198A2B4C458}"/>
+              </a:ext>
+            </a:extLst>
+          </p:cNvPr>
+          <p:cNvSpPr>
+            <a:spLocks noGrp="1"/>
+          </p:cNvSpPr>
+          <p:nvPr>
+            <p:ph type="title"/>
+          </p:nvPr>
+        </p:nvSpPr>
+        <p:spPr/>
+        <p:txBody>
+          <a:bodyPr/>
+          <a:lstStyle/>
+          <a:p>
+            <a:r>
+              <a:rPr lang="en-US" altLang="zh-TW" dirty="0"/>
+              <a:t>ASYNC</a:t>
+            </a:r>
+            <a:r>
+              <a:rPr lang="zh-TW" altLang="en-US" dirty="0"/>
+              <a:t>整理</a:t>
+            </a:r>
+          </a:p>
+        </p:txBody>
+      </p:sp>
+      <p:sp>
+        <p:nvSpPr>
+          <p:cNvPr id="3" name="內容版面配置區 2">
+            <a:extLst>
+              <a:ext uri="{FF2B5EF4-FFF2-40B4-BE49-F238E27FC236}">
+                <a16:creationId xmlns:a16="http://schemas.microsoft.com/office/drawing/2014/main" id="{67B283EE-D519-443B-B399-B4DAAC0EE76D}"/>
+              </a:ext>
+            </a:extLst>
+          </p:cNvPr>
+          <p:cNvSpPr>
+            <a:spLocks noGrp="1"/>
+          </p:cNvSpPr>
+          <p:nvPr>
+            <p:ph idx="1"/>
+          </p:nvPr>
+        </p:nvSpPr>
+        <p:spPr/>
+        <p:txBody>
+          <a:bodyPr/>
+          <a:lstStyle/>
+          <a:p>
+            <a:r>
+              <a:rPr lang="en-US" altLang="zh-TW" dirty="0" err="1"/>
+              <a:t>CallBack</a:t>
+            </a:r>
+            <a:r>
+              <a:rPr lang="en-US" altLang="zh-TW" dirty="0"/>
+              <a:t> </a:t>
+            </a:r>
+            <a:r>
+              <a:rPr lang="zh-TW" altLang="en-US" dirty="0"/>
+              <a:t>是</a:t>
+            </a:r>
+            <a:r>
+              <a:rPr lang="en-US" altLang="zh-TW" dirty="0" err="1"/>
+              <a:t>js</a:t>
+            </a:r>
+            <a:r>
+              <a:rPr lang="zh-TW" altLang="en-US" dirty="0"/>
+              <a:t>在處理</a:t>
+            </a:r>
+            <a:r>
+              <a:rPr lang="en-US" altLang="zh-TW" dirty="0"/>
+              <a:t>non-</a:t>
+            </a:r>
+            <a:r>
+              <a:rPr lang="en-US" altLang="zh-TW" dirty="0" err="1"/>
+              <a:t>blockin</a:t>
+            </a:r>
+            <a:r>
+              <a:rPr lang="zh-TW" altLang="en-US" dirty="0"/>
+              <a:t>的設計方式</a:t>
+            </a:r>
+            <a:r>
+              <a:rPr lang="en-US" altLang="zh-TW" dirty="0"/>
+              <a:t>(</a:t>
+            </a:r>
+            <a:r>
+              <a:rPr lang="en-US" altLang="zh-TW" dirty="0" err="1"/>
+              <a:t>async</a:t>
+            </a:r>
+            <a:r>
+              <a:rPr lang="en-US" altLang="zh-TW" dirty="0"/>
+              <a:t>)</a:t>
+            </a:r>
+          </a:p>
+          <a:p>
+            <a:r>
+              <a:rPr lang="zh-TW" altLang="en-US" dirty="0"/>
+              <a:t>解決</a:t>
+            </a:r>
+            <a:r>
+              <a:rPr lang="en-US" altLang="zh-TW" dirty="0" err="1"/>
+              <a:t>CallBack</a:t>
+            </a:r>
+            <a:r>
+              <a:rPr lang="zh-TW" altLang="en-US" dirty="0"/>
+              <a:t> </a:t>
+            </a:r>
+            <a:r>
+              <a:rPr lang="en-US" altLang="zh-TW" dirty="0"/>
+              <a:t>Hell</a:t>
+            </a:r>
+          </a:p>
+          <a:p>
+            <a:pPr lvl="1"/>
+            <a:r>
+              <a:rPr lang="en-US" altLang="zh-TW" dirty="0"/>
+              <a:t>ES6 </a:t>
+            </a:r>
+            <a:r>
+              <a:rPr lang="en-US" altLang="zh-TW" dirty="0">
+                <a:sym typeface="Wingdings" panose="05000000000000000000" pitchFamily="2" charset="2"/>
+              </a:rPr>
+              <a:t> </a:t>
+            </a:r>
+            <a:r>
+              <a:rPr lang="en-US" altLang="zh-TW" dirty="0"/>
+              <a:t>promise</a:t>
+            </a:r>
+          </a:p>
+          <a:p>
+            <a:pPr lvl="1"/>
+            <a:r>
+              <a:rPr lang="en-US" altLang="zh-TW" dirty="0" err="1"/>
+              <a:t>Async</a:t>
+            </a:r>
+            <a:r>
+              <a:rPr lang="en-US" altLang="zh-TW" dirty="0"/>
+              <a:t> </a:t>
+            </a:r>
+            <a:r>
+              <a:rPr lang="en-US" altLang="zh-TW" dirty="0">
+                <a:sym typeface="Wingdings" panose="05000000000000000000" pitchFamily="2" charset="2"/>
+              </a:rPr>
+              <a:t> waterfall, each …</a:t>
+            </a:r>
+            <a:endParaRPr lang="en-US" altLang="zh-TW" dirty="0"/>
+          </a:p>
+          <a:p>
+            <a:pPr lvl="1"/>
+            <a:r>
+              <a:rPr lang="en-US" altLang="zh-TW" dirty="0"/>
+              <a:t>ES7 </a:t>
+            </a:r>
+            <a:r>
+              <a:rPr lang="en-US" altLang="zh-TW" dirty="0">
+                <a:sym typeface="Wingdings" panose="05000000000000000000" pitchFamily="2" charset="2"/>
+              </a:rPr>
+              <a:t> </a:t>
+            </a:r>
+            <a:r>
+              <a:rPr lang="en-US" altLang="zh-TW" dirty="0" err="1"/>
+              <a:t>async</a:t>
+            </a:r>
+            <a:r>
+              <a:rPr lang="en-US" altLang="zh-TW" dirty="0"/>
+              <a:t> await</a:t>
+            </a:r>
+          </a:p>
+          <a:p>
+            <a:pPr lvl="1"/>
+            <a:r>
+              <a:rPr lang="en-US" altLang="zh-TW" dirty="0" err="1"/>
+              <a:t>nodejs</a:t>
+            </a:r>
+            <a:r>
+              <a:rPr lang="en-US" altLang="zh-TW" dirty="0">
+                <a:sym typeface="Wingdings" panose="05000000000000000000" pitchFamily="2" charset="2"/>
+              </a:rPr>
+              <a:t>  </a:t>
+            </a:r>
+            <a:r>
+              <a:rPr lang="en-US" altLang="zh-TW" dirty="0" err="1">
+                <a:sym typeface="Wingdings" panose="05000000000000000000" pitchFamily="2" charset="2"/>
+              </a:rPr>
+              <a:t>promisify</a:t>
+            </a:r>
+            <a:endParaRPr lang="en-US" altLang="zh-TW" dirty="0"/>
+          </a:p>
+        </p:txBody>
+      </p:sp>
+      <p:sp>
+        <p:nvSpPr>
+          <p:cNvPr id="4" name="頁尾版面配置區 3">
+            <a:extLst>
+              <a:ext uri="{FF2B5EF4-FFF2-40B4-BE49-F238E27FC236}">
+                <a16:creationId xmlns:a16="http://schemas.microsoft.com/office/drawing/2014/main" id="{06890AFF-36AE-4479-A2BD-6831DAAAB459}"/>
+              </a:ext>
+            </a:extLst>
+          </p:cNvPr>
+          <p:cNvSpPr>
+            <a:spLocks noGrp="1"/>
+          </p:cNvSpPr>
+          <p:nvPr>
+            <p:ph type="ftr" sz="quarter" idx="11"/>
+          </p:nvPr>
+        </p:nvSpPr>
+        <p:spPr/>
+        <p:txBody>
+          <a:bodyPr/>
+          <a:lstStyle/>
+          <a:p>
+            <a:r>
+              <a:rPr lang="en-US" altLang="zh-TW"/>
+              <a:t>104</a:t>
+            </a:r>
+            <a:r>
+              <a:rPr lang="zh-TW" altLang="en-US"/>
+              <a:t>人資學院  </a:t>
+            </a:r>
+            <a:r>
+              <a:rPr lang="en-US" altLang="zh-TW"/>
+              <a:t>All Rights Reserved</a:t>
+            </a:r>
+            <a:endParaRPr lang="zh-TW" altLang="en-US"/>
+          </a:p>
+        </p:txBody>
+      </p:sp>
+    </p:spTree>
+    <p:extLst>
+      <p:ext uri="{BB962C8B-B14F-4D97-AF65-F5344CB8AC3E}">
+        <p14:creationId xmlns:p14="http://schemas.microsoft.com/office/powerpoint/2010/main" val="477108725"/>
       </p:ext>
     </p:extLst>
   </p:cSld>

</xml_diff>

<commit_message>
short sha & count
</commit_message>
<xml_diff>
--- a/2019_0627_Git_Share_HA.pptx
+++ b/2019_0627_Git_Share_HA.pptx
@@ -5,7 +5,7 @@
     <p:sldMasterId id="2147483648" r:id="rId1"/>
   </p:sldMasterIdLst>
   <p:notesMasterIdLst>
-    <p:notesMasterId r:id="rId13"/>
+    <p:notesMasterId r:id="rId16"/>
   </p:notesMasterIdLst>
   <p:sldIdLst>
     <p:sldId id="256" r:id="rId2"/>
@@ -13,12 +13,15 @@
     <p:sldId id="259" r:id="rId4"/>
     <p:sldId id="265" r:id="rId5"/>
     <p:sldId id="266" r:id="rId6"/>
-    <p:sldId id="260" r:id="rId7"/>
-    <p:sldId id="261" r:id="rId8"/>
-    <p:sldId id="262" r:id="rId9"/>
-    <p:sldId id="264" r:id="rId10"/>
-    <p:sldId id="263" r:id="rId11"/>
-    <p:sldId id="258" r:id="rId12"/>
+    <p:sldId id="267" r:id="rId7"/>
+    <p:sldId id="268" r:id="rId8"/>
+    <p:sldId id="269" r:id="rId9"/>
+    <p:sldId id="260" r:id="rId10"/>
+    <p:sldId id="261" r:id="rId11"/>
+    <p:sldId id="262" r:id="rId12"/>
+    <p:sldId id="264" r:id="rId13"/>
+    <p:sldId id="263" r:id="rId14"/>
+    <p:sldId id="258" r:id="rId15"/>
   </p:sldIdLst>
   <p:sldSz cx="9144000" cy="6858000" type="screen4x3"/>
   <p:notesSz cx="6858000" cy="9144000"/>
@@ -3890,6 +3893,630 @@
           <p:cNvPr id="2" name="標題 1">
             <a:extLst>
               <a:ext uri="{FF2B5EF4-FFF2-40B4-BE49-F238E27FC236}">
+                <a16:creationId xmlns:a16="http://schemas.microsoft.com/office/drawing/2014/main" id="{51841209-40F9-48A5-9D1B-ED5369596D62}"/>
+              </a:ext>
+            </a:extLst>
+          </p:cNvPr>
+          <p:cNvSpPr>
+            <a:spLocks noGrp="1"/>
+          </p:cNvSpPr>
+          <p:nvPr>
+            <p:ph type="title"/>
+          </p:nvPr>
+        </p:nvSpPr>
+        <p:spPr/>
+        <p:txBody>
+          <a:bodyPr/>
+          <a:lstStyle/>
+          <a:p>
+            <a:r>
+              <a:rPr lang="en-US" altLang="zh-TW" dirty="0" err="1"/>
+              <a:t>Async</a:t>
+            </a:r>
+            <a:r>
+              <a:rPr lang="en-US" altLang="zh-TW" dirty="0"/>
+              <a:t> try-catch-finally</a:t>
+            </a:r>
+            <a:endParaRPr lang="zh-TW" altLang="en-US" dirty="0"/>
+          </a:p>
+        </p:txBody>
+      </p:sp>
+      <p:sp>
+        <p:nvSpPr>
+          <p:cNvPr id="3" name="內容版面配置區 2">
+            <a:extLst>
+              <a:ext uri="{FF2B5EF4-FFF2-40B4-BE49-F238E27FC236}">
+                <a16:creationId xmlns:a16="http://schemas.microsoft.com/office/drawing/2014/main" id="{F478725F-0E0D-47B3-9E2B-1F4D255BF391}"/>
+              </a:ext>
+            </a:extLst>
+          </p:cNvPr>
+          <p:cNvSpPr>
+            <a:spLocks noGrp="1"/>
+          </p:cNvSpPr>
+          <p:nvPr>
+            <p:ph idx="1"/>
+          </p:nvPr>
+        </p:nvSpPr>
+        <p:spPr/>
+        <p:txBody>
+          <a:bodyPr/>
+          <a:lstStyle/>
+          <a:p>
+            <a:r>
+              <a:rPr lang="en-US" altLang="zh-TW" dirty="0">
+                <a:sym typeface="Wingdings" panose="05000000000000000000" pitchFamily="2" charset="2"/>
+              </a:rPr>
+              <a:t>/Ehrms2portal_SC/api-auth-acUser.js LINE </a:t>
+            </a:r>
+            <a:r>
+              <a:rPr lang="en-US" altLang="zh-TW" dirty="0">
+                <a:sym typeface="Wingdings" panose="05000000000000000000" pitchFamily="2" charset="2"/>
+                <a:hlinkClick r:id="rId2"/>
+              </a:rPr>
+              <a:t>954</a:t>
+            </a:r>
+            <a:br>
+              <a:rPr lang="en-US" altLang="zh-TW" dirty="0">
+                <a:sym typeface="Wingdings" panose="05000000000000000000" pitchFamily="2" charset="2"/>
+              </a:rPr>
+            </a:br>
+            <a:br>
+              <a:rPr lang="en-US" altLang="zh-TW" dirty="0">
+                <a:sym typeface="Wingdings" panose="05000000000000000000" pitchFamily="2" charset="2"/>
+              </a:rPr>
+            </a:br>
+            <a:endParaRPr lang="en-US" altLang="zh-TW" dirty="0">
+              <a:sym typeface="Wingdings" panose="05000000000000000000" pitchFamily="2" charset="2"/>
+            </a:endParaRPr>
+          </a:p>
+        </p:txBody>
+      </p:sp>
+      <p:sp>
+        <p:nvSpPr>
+          <p:cNvPr id="4" name="頁尾版面配置區 3">
+            <a:extLst>
+              <a:ext uri="{FF2B5EF4-FFF2-40B4-BE49-F238E27FC236}">
+                <a16:creationId xmlns:a16="http://schemas.microsoft.com/office/drawing/2014/main" id="{F27157E0-4972-47AE-BAEE-01518FBF20C6}"/>
+              </a:ext>
+            </a:extLst>
+          </p:cNvPr>
+          <p:cNvSpPr>
+            <a:spLocks noGrp="1"/>
+          </p:cNvSpPr>
+          <p:nvPr>
+            <p:ph type="ftr" sz="quarter" idx="11"/>
+          </p:nvPr>
+        </p:nvSpPr>
+        <p:spPr/>
+        <p:txBody>
+          <a:bodyPr/>
+          <a:lstStyle/>
+          <a:p>
+            <a:r>
+              <a:rPr lang="en-US" altLang="zh-TW"/>
+              <a:t>104</a:t>
+            </a:r>
+            <a:r>
+              <a:rPr lang="zh-TW" altLang="en-US"/>
+              <a:t>人資學院  </a:t>
+            </a:r>
+            <a:r>
+              <a:rPr lang="en-US" altLang="zh-TW"/>
+              <a:t>All Rights Reserved</a:t>
+            </a:r>
+            <a:endParaRPr lang="zh-TW" altLang="en-US"/>
+          </a:p>
+        </p:txBody>
+      </p:sp>
+      <p:pic>
+        <p:nvPicPr>
+          <p:cNvPr id="5" name="圖片 4">
+            <a:extLst>
+              <a:ext uri="{FF2B5EF4-FFF2-40B4-BE49-F238E27FC236}">
+                <a16:creationId xmlns:a16="http://schemas.microsoft.com/office/drawing/2014/main" id="{35A7F754-E147-45E8-8627-5B09F096336F}"/>
+              </a:ext>
+            </a:extLst>
+          </p:cNvPr>
+          <p:cNvPicPr>
+            <a:picLocks noChangeAspect="1"/>
+          </p:cNvPicPr>
+          <p:nvPr/>
+        </p:nvPicPr>
+        <p:blipFill>
+          <a:blip r:embed="rId3"/>
+          <a:stretch>
+            <a:fillRect/>
+          </a:stretch>
+        </p:blipFill>
+        <p:spPr>
+          <a:xfrm>
+            <a:off x="228158" y="2564904"/>
+            <a:ext cx="8645615" cy="3743821"/>
+          </a:xfrm>
+          <a:prstGeom prst="rect">
+            <a:avLst/>
+          </a:prstGeom>
+        </p:spPr>
+      </p:pic>
+    </p:spTree>
+    <p:extLst>
+      <p:ext uri="{BB962C8B-B14F-4D97-AF65-F5344CB8AC3E}">
+        <p14:creationId xmlns:p14="http://schemas.microsoft.com/office/powerpoint/2010/main" val="909642701"/>
+      </p:ext>
+    </p:extLst>
+  </p:cSld>
+  <p:clrMapOvr>
+    <a:masterClrMapping/>
+  </p:clrMapOvr>
+</p:sld>
+</file>
+
+<file path=ppt/slides/slide11.xml><?xml version="1.0" encoding="utf-8"?>
+<p:sld xmlns:a="http://schemas.openxmlformats.org/drawingml/2006/main" xmlns:r="http://schemas.openxmlformats.org/officeDocument/2006/relationships" xmlns:p="http://schemas.openxmlformats.org/presentationml/2006/main">
+  <p:cSld>
+    <p:spTree>
+      <p:nvGrpSpPr>
+        <p:cNvPr id="1" name=""/>
+        <p:cNvGrpSpPr/>
+        <p:nvPr/>
+      </p:nvGrpSpPr>
+      <p:grpSpPr>
+        <a:xfrm>
+          <a:off x="0" y="0"/>
+          <a:ext cx="0" cy="0"/>
+          <a:chOff x="0" y="0"/>
+          <a:chExt cx="0" cy="0"/>
+        </a:xfrm>
+      </p:grpSpPr>
+      <p:sp>
+        <p:nvSpPr>
+          <p:cNvPr id="2" name="標題 1">
+            <a:extLst>
+              <a:ext uri="{FF2B5EF4-FFF2-40B4-BE49-F238E27FC236}">
+                <a16:creationId xmlns:a16="http://schemas.microsoft.com/office/drawing/2014/main" id="{1765C254-721E-4166-AA1E-F93E7AD9AEF6}"/>
+              </a:ext>
+            </a:extLst>
+          </p:cNvPr>
+          <p:cNvSpPr>
+            <a:spLocks noGrp="1"/>
+          </p:cNvSpPr>
+          <p:nvPr>
+            <p:ph type="title"/>
+          </p:nvPr>
+        </p:nvSpPr>
+        <p:spPr/>
+        <p:txBody>
+          <a:bodyPr/>
+          <a:lstStyle/>
+          <a:p>
+            <a:r>
+              <a:rPr lang="en-US" altLang="zh-TW" dirty="0" err="1"/>
+              <a:t>Async.Waterfall</a:t>
+            </a:r>
+            <a:r>
+              <a:rPr lang="en-US" altLang="zh-TW" dirty="0"/>
+              <a:t> </a:t>
+            </a:r>
+            <a:endParaRPr lang="zh-TW" altLang="en-US" dirty="0"/>
+          </a:p>
+        </p:txBody>
+      </p:sp>
+      <p:sp>
+        <p:nvSpPr>
+          <p:cNvPr id="3" name="內容版面配置區 2">
+            <a:extLst>
+              <a:ext uri="{FF2B5EF4-FFF2-40B4-BE49-F238E27FC236}">
+                <a16:creationId xmlns:a16="http://schemas.microsoft.com/office/drawing/2014/main" id="{6C92636B-C021-4799-85C3-9700D8CBB79B}"/>
+              </a:ext>
+            </a:extLst>
+          </p:cNvPr>
+          <p:cNvSpPr>
+            <a:spLocks noGrp="1"/>
+          </p:cNvSpPr>
+          <p:nvPr>
+            <p:ph idx="1"/>
+          </p:nvPr>
+        </p:nvSpPr>
+        <p:spPr/>
+        <p:txBody>
+          <a:bodyPr/>
+          <a:lstStyle/>
+          <a:p>
+            <a:r>
+              <a:rPr lang="en-US" altLang="zh-TW" dirty="0">
+                <a:sym typeface="Wingdings" panose="05000000000000000000" pitchFamily="2" charset="2"/>
+              </a:rPr>
+              <a:t>/Ehrms2portal_SC/api-auth-acPwdRule.js LINE </a:t>
+            </a:r>
+            <a:r>
+              <a:rPr lang="en-US" altLang="zh-TW" dirty="0">
+                <a:sym typeface="Wingdings" panose="05000000000000000000" pitchFamily="2" charset="2"/>
+                <a:hlinkClick r:id="rId2"/>
+              </a:rPr>
+              <a:t>531</a:t>
+            </a:r>
+            <a:br>
+              <a:rPr lang="en-US" altLang="zh-TW" dirty="0">
+                <a:sym typeface="Wingdings" panose="05000000000000000000" pitchFamily="2" charset="2"/>
+              </a:rPr>
+            </a:br>
+            <a:br>
+              <a:rPr lang="en-US" altLang="zh-TW" dirty="0">
+                <a:sym typeface="Wingdings" panose="05000000000000000000" pitchFamily="2" charset="2"/>
+              </a:rPr>
+            </a:br>
+            <a:endParaRPr lang="en-US" altLang="zh-TW" dirty="0">
+              <a:sym typeface="Wingdings" panose="05000000000000000000" pitchFamily="2" charset="2"/>
+            </a:endParaRPr>
+          </a:p>
+          <a:p>
+            <a:endParaRPr lang="zh-TW" altLang="en-US" dirty="0"/>
+          </a:p>
+        </p:txBody>
+      </p:sp>
+      <p:sp>
+        <p:nvSpPr>
+          <p:cNvPr id="4" name="頁尾版面配置區 3">
+            <a:extLst>
+              <a:ext uri="{FF2B5EF4-FFF2-40B4-BE49-F238E27FC236}">
+                <a16:creationId xmlns:a16="http://schemas.microsoft.com/office/drawing/2014/main" id="{B4E2C0EB-CD7F-4DE2-AAF7-9F290C4E6697}"/>
+              </a:ext>
+            </a:extLst>
+          </p:cNvPr>
+          <p:cNvSpPr>
+            <a:spLocks noGrp="1"/>
+          </p:cNvSpPr>
+          <p:nvPr>
+            <p:ph type="ftr" sz="quarter" idx="11"/>
+          </p:nvPr>
+        </p:nvSpPr>
+        <p:spPr/>
+        <p:txBody>
+          <a:bodyPr/>
+          <a:lstStyle/>
+          <a:p>
+            <a:r>
+              <a:rPr lang="en-US" altLang="zh-TW"/>
+              <a:t>104</a:t>
+            </a:r>
+            <a:r>
+              <a:rPr lang="zh-TW" altLang="en-US"/>
+              <a:t>人資學院  </a:t>
+            </a:r>
+            <a:r>
+              <a:rPr lang="en-US" altLang="zh-TW"/>
+              <a:t>All Rights Reserved</a:t>
+            </a:r>
+            <a:endParaRPr lang="zh-TW" altLang="en-US"/>
+          </a:p>
+        </p:txBody>
+      </p:sp>
+      <p:pic>
+        <p:nvPicPr>
+          <p:cNvPr id="5" name="圖片 4">
+            <a:extLst>
+              <a:ext uri="{FF2B5EF4-FFF2-40B4-BE49-F238E27FC236}">
+                <a16:creationId xmlns:a16="http://schemas.microsoft.com/office/drawing/2014/main" id="{33488B55-F97A-4C63-921A-A7408E2D6A35}"/>
+              </a:ext>
+            </a:extLst>
+          </p:cNvPr>
+          <p:cNvPicPr>
+            <a:picLocks noChangeAspect="1"/>
+          </p:cNvPicPr>
+          <p:nvPr/>
+        </p:nvPicPr>
+        <p:blipFill>
+          <a:blip r:embed="rId3"/>
+          <a:stretch>
+            <a:fillRect/>
+          </a:stretch>
+        </p:blipFill>
+        <p:spPr>
+          <a:xfrm>
+            <a:off x="533005" y="2852936"/>
+            <a:ext cx="8153796" cy="3530848"/>
+          </a:xfrm>
+          <a:prstGeom prst="rect">
+            <a:avLst/>
+          </a:prstGeom>
+        </p:spPr>
+      </p:pic>
+    </p:spTree>
+    <p:extLst>
+      <p:ext uri="{BB962C8B-B14F-4D97-AF65-F5344CB8AC3E}">
+        <p14:creationId xmlns:p14="http://schemas.microsoft.com/office/powerpoint/2010/main" val="1886309669"/>
+      </p:ext>
+    </p:extLst>
+  </p:cSld>
+  <p:clrMapOvr>
+    <a:masterClrMapping/>
+  </p:clrMapOvr>
+</p:sld>
+</file>
+
+<file path=ppt/slides/slide12.xml><?xml version="1.0" encoding="utf-8"?>
+<p:sld xmlns:a="http://schemas.openxmlformats.org/drawingml/2006/main" xmlns:r="http://schemas.openxmlformats.org/officeDocument/2006/relationships" xmlns:p="http://schemas.openxmlformats.org/presentationml/2006/main">
+  <p:cSld>
+    <p:spTree>
+      <p:nvGrpSpPr>
+        <p:cNvPr id="1" name=""/>
+        <p:cNvGrpSpPr/>
+        <p:nvPr/>
+      </p:nvGrpSpPr>
+      <p:grpSpPr>
+        <a:xfrm>
+          <a:off x="0" y="0"/>
+          <a:ext cx="0" cy="0"/>
+          <a:chOff x="0" y="0"/>
+          <a:chExt cx="0" cy="0"/>
+        </a:xfrm>
+      </p:grpSpPr>
+      <p:sp>
+        <p:nvSpPr>
+          <p:cNvPr id="2" name="標題 1">
+            <a:extLst>
+              <a:ext uri="{FF2B5EF4-FFF2-40B4-BE49-F238E27FC236}">
+                <a16:creationId xmlns:a16="http://schemas.microsoft.com/office/drawing/2014/main" id="{647F4C66-668A-4D8A-8F51-F198A2B4C458}"/>
+              </a:ext>
+            </a:extLst>
+          </p:cNvPr>
+          <p:cNvSpPr>
+            <a:spLocks noGrp="1"/>
+          </p:cNvSpPr>
+          <p:nvPr>
+            <p:ph type="title"/>
+          </p:nvPr>
+        </p:nvSpPr>
+        <p:spPr/>
+        <p:txBody>
+          <a:bodyPr/>
+          <a:lstStyle/>
+          <a:p>
+            <a:r>
+              <a:rPr lang="en-US" altLang="zh-TW" dirty="0"/>
+              <a:t>ASYNC</a:t>
+            </a:r>
+            <a:r>
+              <a:rPr lang="zh-TW" altLang="en-US" dirty="0"/>
+              <a:t>整理</a:t>
+            </a:r>
+          </a:p>
+        </p:txBody>
+      </p:sp>
+      <p:sp>
+        <p:nvSpPr>
+          <p:cNvPr id="3" name="內容版面配置區 2">
+            <a:extLst>
+              <a:ext uri="{FF2B5EF4-FFF2-40B4-BE49-F238E27FC236}">
+                <a16:creationId xmlns:a16="http://schemas.microsoft.com/office/drawing/2014/main" id="{67B283EE-D519-443B-B399-B4DAAC0EE76D}"/>
+              </a:ext>
+            </a:extLst>
+          </p:cNvPr>
+          <p:cNvSpPr>
+            <a:spLocks noGrp="1"/>
+          </p:cNvSpPr>
+          <p:nvPr>
+            <p:ph idx="1"/>
+          </p:nvPr>
+        </p:nvSpPr>
+        <p:spPr/>
+        <p:txBody>
+          <a:bodyPr/>
+          <a:lstStyle/>
+          <a:p>
+            <a:r>
+              <a:rPr lang="en-US" altLang="zh-TW" dirty="0" err="1"/>
+              <a:t>CallBack</a:t>
+            </a:r>
+            <a:r>
+              <a:rPr lang="en-US" altLang="zh-TW" dirty="0"/>
+              <a:t> </a:t>
+            </a:r>
+            <a:r>
+              <a:rPr lang="zh-TW" altLang="en-US" dirty="0"/>
+              <a:t>是</a:t>
+            </a:r>
+            <a:r>
+              <a:rPr lang="en-US" altLang="zh-TW" dirty="0" err="1"/>
+              <a:t>js</a:t>
+            </a:r>
+            <a:r>
+              <a:rPr lang="zh-TW" altLang="en-US" dirty="0"/>
+              <a:t>在處理</a:t>
+            </a:r>
+            <a:r>
+              <a:rPr lang="en-US" altLang="zh-TW" dirty="0"/>
+              <a:t>non-</a:t>
+            </a:r>
+            <a:r>
+              <a:rPr lang="en-US" altLang="zh-TW" dirty="0" err="1"/>
+              <a:t>blockin</a:t>
+            </a:r>
+            <a:r>
+              <a:rPr lang="zh-TW" altLang="en-US" dirty="0"/>
+              <a:t>的設計方式</a:t>
+            </a:r>
+            <a:r>
+              <a:rPr lang="en-US" altLang="zh-TW" dirty="0"/>
+              <a:t>(</a:t>
+            </a:r>
+            <a:r>
+              <a:rPr lang="en-US" altLang="zh-TW" dirty="0" err="1"/>
+              <a:t>async</a:t>
+            </a:r>
+            <a:r>
+              <a:rPr lang="en-US" altLang="zh-TW" dirty="0"/>
+              <a:t>)</a:t>
+            </a:r>
+          </a:p>
+          <a:p>
+            <a:r>
+              <a:rPr lang="zh-TW" altLang="en-US" dirty="0"/>
+              <a:t>解決</a:t>
+            </a:r>
+            <a:r>
+              <a:rPr lang="en-US" altLang="zh-TW" dirty="0" err="1"/>
+              <a:t>CallBack</a:t>
+            </a:r>
+            <a:r>
+              <a:rPr lang="zh-TW" altLang="en-US" dirty="0"/>
+              <a:t> </a:t>
+            </a:r>
+            <a:r>
+              <a:rPr lang="en-US" altLang="zh-TW" dirty="0"/>
+              <a:t>Hell</a:t>
+            </a:r>
+          </a:p>
+          <a:p>
+            <a:pPr lvl="1"/>
+            <a:r>
+              <a:rPr lang="en-US" altLang="zh-TW" dirty="0"/>
+              <a:t>ES6 </a:t>
+            </a:r>
+            <a:r>
+              <a:rPr lang="en-US" altLang="zh-TW" dirty="0">
+                <a:sym typeface="Wingdings" panose="05000000000000000000" pitchFamily="2" charset="2"/>
+              </a:rPr>
+              <a:t> </a:t>
+            </a:r>
+            <a:r>
+              <a:rPr lang="en-US" altLang="zh-TW" dirty="0"/>
+              <a:t>promise</a:t>
+            </a:r>
+          </a:p>
+          <a:p>
+            <a:pPr lvl="1"/>
+            <a:r>
+              <a:rPr lang="en-US" altLang="zh-TW" dirty="0" err="1"/>
+              <a:t>Async</a:t>
+            </a:r>
+            <a:r>
+              <a:rPr lang="en-US" altLang="zh-TW" dirty="0"/>
+              <a:t> </a:t>
+            </a:r>
+            <a:r>
+              <a:rPr lang="en-US" altLang="zh-TW" dirty="0">
+                <a:sym typeface="Wingdings" panose="05000000000000000000" pitchFamily="2" charset="2"/>
+              </a:rPr>
+              <a:t> waterfall, each …</a:t>
+            </a:r>
+            <a:endParaRPr lang="en-US" altLang="zh-TW" dirty="0"/>
+          </a:p>
+          <a:p>
+            <a:pPr lvl="1"/>
+            <a:r>
+              <a:rPr lang="en-US" altLang="zh-TW" dirty="0"/>
+              <a:t>ES7 </a:t>
+            </a:r>
+            <a:r>
+              <a:rPr lang="en-US" altLang="zh-TW" dirty="0">
+                <a:sym typeface="Wingdings" panose="05000000000000000000" pitchFamily="2" charset="2"/>
+              </a:rPr>
+              <a:t> </a:t>
+            </a:r>
+            <a:r>
+              <a:rPr lang="en-US" altLang="zh-TW" dirty="0" err="1"/>
+              <a:t>async</a:t>
+            </a:r>
+            <a:r>
+              <a:rPr lang="en-US" altLang="zh-TW" dirty="0"/>
+              <a:t> await</a:t>
+            </a:r>
+          </a:p>
+          <a:p>
+            <a:pPr lvl="1"/>
+            <a:r>
+              <a:rPr lang="en-US" altLang="zh-TW" dirty="0" err="1"/>
+              <a:t>nodejs</a:t>
+            </a:r>
+            <a:r>
+              <a:rPr lang="en-US" altLang="zh-TW" dirty="0">
+                <a:sym typeface="Wingdings" panose="05000000000000000000" pitchFamily="2" charset="2"/>
+              </a:rPr>
+              <a:t>  </a:t>
+            </a:r>
+            <a:r>
+              <a:rPr lang="en-US" altLang="zh-TW" dirty="0" err="1">
+                <a:sym typeface="Wingdings" panose="05000000000000000000" pitchFamily="2" charset="2"/>
+              </a:rPr>
+              <a:t>promisify</a:t>
+            </a:r>
+            <a:endParaRPr lang="en-US" altLang="zh-TW" dirty="0"/>
+          </a:p>
+        </p:txBody>
+      </p:sp>
+      <p:sp>
+        <p:nvSpPr>
+          <p:cNvPr id="4" name="頁尾版面配置區 3">
+            <a:extLst>
+              <a:ext uri="{FF2B5EF4-FFF2-40B4-BE49-F238E27FC236}">
+                <a16:creationId xmlns:a16="http://schemas.microsoft.com/office/drawing/2014/main" id="{06890AFF-36AE-4479-A2BD-6831DAAAB459}"/>
+              </a:ext>
+            </a:extLst>
+          </p:cNvPr>
+          <p:cNvSpPr>
+            <a:spLocks noGrp="1"/>
+          </p:cNvSpPr>
+          <p:nvPr>
+            <p:ph type="ftr" sz="quarter" idx="11"/>
+          </p:nvPr>
+        </p:nvSpPr>
+        <p:spPr/>
+        <p:txBody>
+          <a:bodyPr/>
+          <a:lstStyle/>
+          <a:p>
+            <a:r>
+              <a:rPr lang="en-US" altLang="zh-TW"/>
+              <a:t>104</a:t>
+            </a:r>
+            <a:r>
+              <a:rPr lang="zh-TW" altLang="en-US"/>
+              <a:t>人資學院  </a:t>
+            </a:r>
+            <a:r>
+              <a:rPr lang="en-US" altLang="zh-TW"/>
+              <a:t>All Rights Reserved</a:t>
+            </a:r>
+            <a:endParaRPr lang="zh-TW" altLang="en-US"/>
+          </a:p>
+        </p:txBody>
+      </p:sp>
+    </p:spTree>
+    <p:extLst>
+      <p:ext uri="{BB962C8B-B14F-4D97-AF65-F5344CB8AC3E}">
+        <p14:creationId xmlns:p14="http://schemas.microsoft.com/office/powerpoint/2010/main" val="477108725"/>
+      </p:ext>
+    </p:extLst>
+  </p:cSld>
+  <p:clrMapOvr>
+    <a:masterClrMapping/>
+  </p:clrMapOvr>
+</p:sld>
+</file>
+
+<file path=ppt/slides/slide13.xml><?xml version="1.0" encoding="utf-8"?>
+<p:sld xmlns:a="http://schemas.openxmlformats.org/drawingml/2006/main" xmlns:r="http://schemas.openxmlformats.org/officeDocument/2006/relationships" xmlns:p="http://schemas.openxmlformats.org/presentationml/2006/main">
+  <p:cSld>
+    <p:spTree>
+      <p:nvGrpSpPr>
+        <p:cNvPr id="1" name=""/>
+        <p:cNvGrpSpPr/>
+        <p:nvPr/>
+      </p:nvGrpSpPr>
+      <p:grpSpPr>
+        <a:xfrm>
+          <a:off x="0" y="0"/>
+          <a:ext cx="0" cy="0"/>
+          <a:chOff x="0" y="0"/>
+          <a:chExt cx="0" cy="0"/>
+        </a:xfrm>
+      </p:grpSpPr>
+      <p:sp>
+        <p:nvSpPr>
+          <p:cNvPr id="2" name="標題 1">
+            <a:extLst>
+              <a:ext uri="{FF2B5EF4-FFF2-40B4-BE49-F238E27FC236}">
                 <a16:creationId xmlns:a16="http://schemas.microsoft.com/office/drawing/2014/main" id="{50FD158A-3005-4C2F-9E0B-172513459AB0}"/>
               </a:ext>
             </a:extLst>
@@ -4097,7 +4724,7 @@
 </p:sld>
 </file>
 
-<file path=ppt/slides/slide11.xml><?xml version="1.0" encoding="utf-8"?>
+<file path=ppt/slides/slide14.xml><?xml version="1.0" encoding="utf-8"?>
 <p:sld xmlns:a="http://schemas.openxmlformats.org/drawingml/2006/main" xmlns:r="http://schemas.openxmlformats.org/officeDocument/2006/relationships" xmlns:p="http://schemas.openxmlformats.org/presentationml/2006/main">
   <p:cSld>
     <p:spTree>
@@ -5223,6 +5850,471 @@
           <p:cNvPr id="2" name="標題 1">
             <a:extLst>
               <a:ext uri="{FF2B5EF4-FFF2-40B4-BE49-F238E27FC236}">
+                <a16:creationId xmlns:a16="http://schemas.microsoft.com/office/drawing/2014/main" id="{881671FE-17FB-4B91-8D15-9FF4FD321A79}"/>
+              </a:ext>
+            </a:extLst>
+          </p:cNvPr>
+          <p:cNvSpPr>
+            <a:spLocks noGrp="1"/>
+          </p:cNvSpPr>
+          <p:nvPr>
+            <p:ph type="title"/>
+          </p:nvPr>
+        </p:nvSpPr>
+        <p:spPr/>
+        <p:txBody>
+          <a:bodyPr/>
+          <a:lstStyle/>
+          <a:p>
+            <a:r>
+              <a:rPr lang="en-US" altLang="zh-TW" dirty="0"/>
+              <a:t>Git</a:t>
+            </a:r>
+            <a:r>
+              <a:rPr lang="zh-TW" altLang="en-US" dirty="0"/>
+              <a:t> 分散式管理</a:t>
+            </a:r>
+          </a:p>
+        </p:txBody>
+      </p:sp>
+      <p:pic>
+        <p:nvPicPr>
+          <p:cNvPr id="6" name="內容版面配置區 5">
+            <a:extLst>
+              <a:ext uri="{FF2B5EF4-FFF2-40B4-BE49-F238E27FC236}">
+                <a16:creationId xmlns:a16="http://schemas.microsoft.com/office/drawing/2014/main" id="{98AFC50C-92E5-49F7-A878-A917E0F6A6F4}"/>
+              </a:ext>
+            </a:extLst>
+          </p:cNvPr>
+          <p:cNvPicPr>
+            <a:picLocks noGrp="1" noChangeAspect="1"/>
+          </p:cNvPicPr>
+          <p:nvPr>
+            <p:ph idx="1"/>
+          </p:nvPr>
+        </p:nvPicPr>
+        <p:blipFill>
+          <a:blip r:embed="rId2" cstate="print">
+            <a:extLst>
+              <a:ext uri="{28A0092B-C50C-407E-A947-70E740481C1C}">
+                <a14:useLocalDpi xmlns:a14="http://schemas.microsoft.com/office/drawing/2010/main" val="0"/>
+              </a:ext>
+            </a:extLst>
+          </a:blip>
+          <a:stretch>
+            <a:fillRect/>
+          </a:stretch>
+        </p:blipFill>
+        <p:spPr>
+          <a:xfrm>
+            <a:off x="294150" y="2060848"/>
+            <a:ext cx="8555700" cy="2913296"/>
+          </a:xfrm>
+        </p:spPr>
+      </p:pic>
+      <p:sp>
+        <p:nvSpPr>
+          <p:cNvPr id="4" name="頁尾版面配置區 3">
+            <a:extLst>
+              <a:ext uri="{FF2B5EF4-FFF2-40B4-BE49-F238E27FC236}">
+                <a16:creationId xmlns:a16="http://schemas.microsoft.com/office/drawing/2014/main" id="{9AD946C6-9CE2-4E85-957B-A0FBA129C022}"/>
+              </a:ext>
+            </a:extLst>
+          </p:cNvPr>
+          <p:cNvSpPr>
+            <a:spLocks noGrp="1"/>
+          </p:cNvSpPr>
+          <p:nvPr>
+            <p:ph type="ftr" sz="quarter" idx="11"/>
+          </p:nvPr>
+        </p:nvSpPr>
+        <p:spPr/>
+        <p:txBody>
+          <a:bodyPr/>
+          <a:lstStyle/>
+          <a:p>
+            <a:r>
+              <a:rPr lang="en-US" altLang="zh-TW"/>
+              <a:t>104</a:t>
+            </a:r>
+            <a:r>
+              <a:rPr lang="zh-TW" altLang="en-US"/>
+              <a:t>人資學院  </a:t>
+            </a:r>
+            <a:r>
+              <a:rPr lang="en-US" altLang="zh-TW"/>
+              <a:t>All Rights Reserved</a:t>
+            </a:r>
+            <a:endParaRPr lang="zh-TW" altLang="en-US"/>
+          </a:p>
+        </p:txBody>
+      </p:sp>
+    </p:spTree>
+    <p:extLst>
+      <p:ext uri="{BB962C8B-B14F-4D97-AF65-F5344CB8AC3E}">
+        <p14:creationId xmlns:p14="http://schemas.microsoft.com/office/powerpoint/2010/main" val="1778109297"/>
+      </p:ext>
+    </p:extLst>
+  </p:cSld>
+  <p:clrMapOvr>
+    <a:masterClrMapping/>
+  </p:clrMapOvr>
+</p:sld>
+</file>
+
+<file path=ppt/slides/slide7.xml><?xml version="1.0" encoding="utf-8"?>
+<p:sld xmlns:a="http://schemas.openxmlformats.org/drawingml/2006/main" xmlns:r="http://schemas.openxmlformats.org/officeDocument/2006/relationships" xmlns:p="http://schemas.openxmlformats.org/presentationml/2006/main">
+  <p:cSld>
+    <p:spTree>
+      <p:nvGrpSpPr>
+        <p:cNvPr id="1" name=""/>
+        <p:cNvGrpSpPr/>
+        <p:nvPr/>
+      </p:nvGrpSpPr>
+      <p:grpSpPr>
+        <a:xfrm>
+          <a:off x="0" y="0"/>
+          <a:ext cx="0" cy="0"/>
+          <a:chOff x="0" y="0"/>
+          <a:chExt cx="0" cy="0"/>
+        </a:xfrm>
+      </p:grpSpPr>
+      <p:sp>
+        <p:nvSpPr>
+          <p:cNvPr id="2" name="標題 1">
+            <a:extLst>
+              <a:ext uri="{FF2B5EF4-FFF2-40B4-BE49-F238E27FC236}">
+                <a16:creationId xmlns:a16="http://schemas.microsoft.com/office/drawing/2014/main" id="{0EFEFC5F-A149-46BF-A6D3-71032B891A76}"/>
+              </a:ext>
+            </a:extLst>
+          </p:cNvPr>
+          <p:cNvSpPr>
+            <a:spLocks noGrp="1"/>
+          </p:cNvSpPr>
+          <p:nvPr>
+            <p:ph type="title"/>
+          </p:nvPr>
+        </p:nvSpPr>
+        <p:spPr/>
+        <p:txBody>
+          <a:bodyPr/>
+          <a:lstStyle/>
+          <a:p>
+            <a:r>
+              <a:rPr lang="en-US" altLang="zh-TW" dirty="0"/>
+              <a:t>Git Branch</a:t>
+            </a:r>
+            <a:endParaRPr lang="zh-TW" altLang="en-US" dirty="0"/>
+          </a:p>
+        </p:txBody>
+      </p:sp>
+      <p:sp>
+        <p:nvSpPr>
+          <p:cNvPr id="4" name="頁尾版面配置區 3">
+            <a:extLst>
+              <a:ext uri="{FF2B5EF4-FFF2-40B4-BE49-F238E27FC236}">
+                <a16:creationId xmlns:a16="http://schemas.microsoft.com/office/drawing/2014/main" id="{FEBC89AA-B2FE-4B55-9B27-E16F0E3B9B0B}"/>
+              </a:ext>
+            </a:extLst>
+          </p:cNvPr>
+          <p:cNvSpPr>
+            <a:spLocks noGrp="1"/>
+          </p:cNvSpPr>
+          <p:nvPr>
+            <p:ph type="ftr" sz="quarter" idx="11"/>
+          </p:nvPr>
+        </p:nvSpPr>
+        <p:spPr/>
+        <p:txBody>
+          <a:bodyPr/>
+          <a:lstStyle/>
+          <a:p>
+            <a:r>
+              <a:rPr lang="en-US" altLang="zh-TW"/>
+              <a:t>104</a:t>
+            </a:r>
+            <a:r>
+              <a:rPr lang="zh-TW" altLang="en-US"/>
+              <a:t>人資學院  </a:t>
+            </a:r>
+            <a:r>
+              <a:rPr lang="en-US" altLang="zh-TW"/>
+              <a:t>All Rights Reserved</a:t>
+            </a:r>
+            <a:endParaRPr lang="zh-TW" altLang="en-US"/>
+          </a:p>
+        </p:txBody>
+      </p:sp>
+      <p:pic>
+        <p:nvPicPr>
+          <p:cNvPr id="6" name="內容版面配置區 5">
+            <a:extLst>
+              <a:ext uri="{FF2B5EF4-FFF2-40B4-BE49-F238E27FC236}">
+                <a16:creationId xmlns:a16="http://schemas.microsoft.com/office/drawing/2014/main" id="{51BB6CCA-66CF-4617-958B-CD4934199EF3}"/>
+              </a:ext>
+            </a:extLst>
+          </p:cNvPr>
+          <p:cNvPicPr>
+            <a:picLocks noGrp="1" noChangeAspect="1"/>
+          </p:cNvPicPr>
+          <p:nvPr>
+            <p:ph idx="1"/>
+          </p:nvPr>
+        </p:nvPicPr>
+        <p:blipFill>
+          <a:blip r:embed="rId2">
+            <a:extLst>
+              <a:ext uri="{28A0092B-C50C-407E-A947-70E740481C1C}">
+                <a14:useLocalDpi xmlns:a14="http://schemas.microsoft.com/office/drawing/2010/main" val="0"/>
+              </a:ext>
+            </a:extLst>
+          </a:blip>
+          <a:stretch>
+            <a:fillRect/>
+          </a:stretch>
+        </p:blipFill>
+        <p:spPr>
+          <a:xfrm>
+            <a:off x="1594869" y="1417638"/>
+            <a:ext cx="5436102" cy="1306076"/>
+          </a:xfrm>
+        </p:spPr>
+      </p:pic>
+      <p:pic>
+        <p:nvPicPr>
+          <p:cNvPr id="10" name="圖片 9">
+            <a:extLst>
+              <a:ext uri="{FF2B5EF4-FFF2-40B4-BE49-F238E27FC236}">
+                <a16:creationId xmlns:a16="http://schemas.microsoft.com/office/drawing/2014/main" id="{BB7D2301-2FCF-4E50-B12C-3A24DF060276}"/>
+              </a:ext>
+            </a:extLst>
+          </p:cNvPr>
+          <p:cNvPicPr>
+            <a:picLocks noChangeAspect="1"/>
+          </p:cNvPicPr>
+          <p:nvPr/>
+        </p:nvPicPr>
+        <p:blipFill>
+          <a:blip r:embed="rId3">
+            <a:extLst>
+              <a:ext uri="{28A0092B-C50C-407E-A947-70E740481C1C}">
+                <a14:useLocalDpi xmlns:a14="http://schemas.microsoft.com/office/drawing/2010/main" val="0"/>
+              </a:ext>
+            </a:extLst>
+          </a:blip>
+          <a:stretch>
+            <a:fillRect/>
+          </a:stretch>
+        </p:blipFill>
+        <p:spPr>
+          <a:xfrm>
+            <a:off x="1979712" y="3068960"/>
+            <a:ext cx="4666416" cy="3149831"/>
+          </a:xfrm>
+          <a:prstGeom prst="rect">
+            <a:avLst/>
+          </a:prstGeom>
+        </p:spPr>
+      </p:pic>
+    </p:spTree>
+    <p:extLst>
+      <p:ext uri="{BB962C8B-B14F-4D97-AF65-F5344CB8AC3E}">
+        <p14:creationId xmlns:p14="http://schemas.microsoft.com/office/powerpoint/2010/main" val="3891178806"/>
+      </p:ext>
+    </p:extLst>
+  </p:cSld>
+  <p:clrMapOvr>
+    <a:masterClrMapping/>
+  </p:clrMapOvr>
+</p:sld>
+</file>
+
+<file path=ppt/slides/slide8.xml><?xml version="1.0" encoding="utf-8"?>
+<p:sld xmlns:a="http://schemas.openxmlformats.org/drawingml/2006/main" xmlns:r="http://schemas.openxmlformats.org/officeDocument/2006/relationships" xmlns:p="http://schemas.openxmlformats.org/presentationml/2006/main">
+  <p:cSld>
+    <p:spTree>
+      <p:nvGrpSpPr>
+        <p:cNvPr id="1" name=""/>
+        <p:cNvGrpSpPr/>
+        <p:nvPr/>
+      </p:nvGrpSpPr>
+      <p:grpSpPr>
+        <a:xfrm>
+          <a:off x="0" y="0"/>
+          <a:ext cx="0" cy="0"/>
+          <a:chOff x="0" y="0"/>
+          <a:chExt cx="0" cy="0"/>
+        </a:xfrm>
+      </p:grpSpPr>
+      <p:sp>
+        <p:nvSpPr>
+          <p:cNvPr id="2" name="標題 1">
+            <a:extLst>
+              <a:ext uri="{FF2B5EF4-FFF2-40B4-BE49-F238E27FC236}">
+                <a16:creationId xmlns:a16="http://schemas.microsoft.com/office/drawing/2014/main" id="{9A83B037-71A1-404A-84BF-15AA5488A60F}"/>
+              </a:ext>
+            </a:extLst>
+          </p:cNvPr>
+          <p:cNvSpPr>
+            <a:spLocks noGrp="1"/>
+          </p:cNvSpPr>
+          <p:nvPr>
+            <p:ph type="title"/>
+          </p:nvPr>
+        </p:nvSpPr>
+        <p:spPr/>
+        <p:txBody>
+          <a:bodyPr/>
+          <a:lstStyle/>
+          <a:p>
+            <a:r>
+              <a:rPr lang="en-US" altLang="zh-TW" dirty="0"/>
+              <a:t>Git clone</a:t>
+            </a:r>
+            <a:endParaRPr lang="zh-TW" altLang="en-US" dirty="0"/>
+          </a:p>
+        </p:txBody>
+      </p:sp>
+      <p:sp>
+        <p:nvSpPr>
+          <p:cNvPr id="3" name="內容版面配置區 2">
+            <a:extLst>
+              <a:ext uri="{FF2B5EF4-FFF2-40B4-BE49-F238E27FC236}">
+                <a16:creationId xmlns:a16="http://schemas.microsoft.com/office/drawing/2014/main" id="{2CF5E14C-CA2E-4EC8-A498-C612918104A1}"/>
+              </a:ext>
+            </a:extLst>
+          </p:cNvPr>
+          <p:cNvSpPr>
+            <a:spLocks noGrp="1"/>
+          </p:cNvSpPr>
+          <p:nvPr>
+            <p:ph idx="1"/>
+          </p:nvPr>
+        </p:nvSpPr>
+        <p:spPr/>
+        <p:txBody>
+          <a:bodyPr>
+            <a:normAutofit/>
+          </a:bodyPr>
+          <a:lstStyle/>
+          <a:p>
+            <a:r>
+              <a:rPr lang="en-US" altLang="zh-TW" dirty="0"/>
+              <a:t>git clone &lt;path&gt;</a:t>
+            </a:r>
+          </a:p>
+          <a:p>
+            <a:endParaRPr lang="en-US" altLang="zh-TW" dirty="0"/>
+          </a:p>
+          <a:p>
+            <a:r>
+              <a:rPr lang="en-US" altLang="zh-TW" dirty="0"/>
+              <a:t>git </a:t>
+            </a:r>
+            <a:r>
+              <a:rPr lang="en-US" altLang="zh-TW" dirty="0" err="1"/>
+              <a:t>init</a:t>
+            </a:r>
+            <a:endParaRPr lang="en-US" altLang="zh-TW" dirty="0"/>
+          </a:p>
+          <a:p>
+            <a:r>
+              <a:rPr lang="en-US" altLang="zh-TW" dirty="0"/>
+              <a:t>git remote add origin &lt;path&gt;</a:t>
+            </a:r>
+          </a:p>
+          <a:p>
+            <a:r>
+              <a:rPr lang="en-US" altLang="zh-TW" dirty="0"/>
+              <a:t>git checkout –b master</a:t>
+            </a:r>
+          </a:p>
+          <a:p>
+            <a:r>
+              <a:rPr lang="en-US" altLang="zh-TW" dirty="0"/>
+              <a:t>git branch –u origin master</a:t>
+            </a:r>
+          </a:p>
+          <a:p>
+            <a:r>
+              <a:rPr lang="en-US" altLang="zh-TW" dirty="0"/>
+              <a:t>git pull</a:t>
+            </a:r>
+          </a:p>
+        </p:txBody>
+      </p:sp>
+      <p:sp>
+        <p:nvSpPr>
+          <p:cNvPr id="4" name="頁尾版面配置區 3">
+            <a:extLst>
+              <a:ext uri="{FF2B5EF4-FFF2-40B4-BE49-F238E27FC236}">
+                <a16:creationId xmlns:a16="http://schemas.microsoft.com/office/drawing/2014/main" id="{0A2E904B-9214-4F78-A947-A210A6AB43B2}"/>
+              </a:ext>
+            </a:extLst>
+          </p:cNvPr>
+          <p:cNvSpPr>
+            <a:spLocks noGrp="1"/>
+          </p:cNvSpPr>
+          <p:nvPr>
+            <p:ph type="ftr" sz="quarter" idx="11"/>
+          </p:nvPr>
+        </p:nvSpPr>
+        <p:spPr/>
+        <p:txBody>
+          <a:bodyPr/>
+          <a:lstStyle/>
+          <a:p>
+            <a:r>
+              <a:rPr lang="en-US" altLang="zh-TW"/>
+              <a:t>104</a:t>
+            </a:r>
+            <a:r>
+              <a:rPr lang="zh-TW" altLang="en-US"/>
+              <a:t>人資學院  </a:t>
+            </a:r>
+            <a:r>
+              <a:rPr lang="en-US" altLang="zh-TW"/>
+              <a:t>All Rights Reserved</a:t>
+            </a:r>
+            <a:endParaRPr lang="zh-TW" altLang="en-US"/>
+          </a:p>
+        </p:txBody>
+      </p:sp>
+    </p:spTree>
+    <p:extLst>
+      <p:ext uri="{BB962C8B-B14F-4D97-AF65-F5344CB8AC3E}">
+        <p14:creationId xmlns:p14="http://schemas.microsoft.com/office/powerpoint/2010/main" val="947446790"/>
+      </p:ext>
+    </p:extLst>
+  </p:cSld>
+  <p:clrMapOvr>
+    <a:masterClrMapping/>
+  </p:clrMapOvr>
+</p:sld>
+</file>
+
+<file path=ppt/slides/slide9.xml><?xml version="1.0" encoding="utf-8"?>
+<p:sld xmlns:a="http://schemas.openxmlformats.org/drawingml/2006/main" xmlns:r="http://schemas.openxmlformats.org/officeDocument/2006/relationships" xmlns:p="http://schemas.openxmlformats.org/presentationml/2006/main">
+  <p:cSld>
+    <p:spTree>
+      <p:nvGrpSpPr>
+        <p:cNvPr id="1" name=""/>
+        <p:cNvGrpSpPr/>
+        <p:nvPr/>
+      </p:nvGrpSpPr>
+      <p:grpSpPr>
+        <a:xfrm>
+          <a:off x="0" y="0"/>
+          <a:ext cx="0" cy="0"/>
+          <a:chOff x="0" y="0"/>
+          <a:chExt cx="0" cy="0"/>
+        </a:xfrm>
+      </p:grpSpPr>
+      <p:sp>
+        <p:nvSpPr>
+          <p:cNvPr id="2" name="標題 1">
+            <a:extLst>
+              <a:ext uri="{FF2B5EF4-FFF2-40B4-BE49-F238E27FC236}">
                 <a16:creationId xmlns:a16="http://schemas.microsoft.com/office/drawing/2014/main" id="{1F53BFC4-38C1-46A5-8967-4D5F3CB1B717}"/>
               </a:ext>
             </a:extLst>
@@ -5367,630 +6459,6 @@
     <p:extLst>
       <p:ext uri="{BB962C8B-B14F-4D97-AF65-F5344CB8AC3E}">
         <p14:creationId xmlns:p14="http://schemas.microsoft.com/office/powerpoint/2010/main" val="280376510"/>
-      </p:ext>
-    </p:extLst>
-  </p:cSld>
-  <p:clrMapOvr>
-    <a:masterClrMapping/>
-  </p:clrMapOvr>
-</p:sld>
-</file>
-
-<file path=ppt/slides/slide7.xml><?xml version="1.0" encoding="utf-8"?>
-<p:sld xmlns:a="http://schemas.openxmlformats.org/drawingml/2006/main" xmlns:r="http://schemas.openxmlformats.org/officeDocument/2006/relationships" xmlns:p="http://schemas.openxmlformats.org/presentationml/2006/main">
-  <p:cSld>
-    <p:spTree>
-      <p:nvGrpSpPr>
-        <p:cNvPr id="1" name=""/>
-        <p:cNvGrpSpPr/>
-        <p:nvPr/>
-      </p:nvGrpSpPr>
-      <p:grpSpPr>
-        <a:xfrm>
-          <a:off x="0" y="0"/>
-          <a:ext cx="0" cy="0"/>
-          <a:chOff x="0" y="0"/>
-          <a:chExt cx="0" cy="0"/>
-        </a:xfrm>
-      </p:grpSpPr>
-      <p:sp>
-        <p:nvSpPr>
-          <p:cNvPr id="2" name="標題 1">
-            <a:extLst>
-              <a:ext uri="{FF2B5EF4-FFF2-40B4-BE49-F238E27FC236}">
-                <a16:creationId xmlns:a16="http://schemas.microsoft.com/office/drawing/2014/main" id="{51841209-40F9-48A5-9D1B-ED5369596D62}"/>
-              </a:ext>
-            </a:extLst>
-          </p:cNvPr>
-          <p:cNvSpPr>
-            <a:spLocks noGrp="1"/>
-          </p:cNvSpPr>
-          <p:nvPr>
-            <p:ph type="title"/>
-          </p:nvPr>
-        </p:nvSpPr>
-        <p:spPr/>
-        <p:txBody>
-          <a:bodyPr/>
-          <a:lstStyle/>
-          <a:p>
-            <a:r>
-              <a:rPr lang="en-US" altLang="zh-TW" dirty="0" err="1"/>
-              <a:t>Async</a:t>
-            </a:r>
-            <a:r>
-              <a:rPr lang="en-US" altLang="zh-TW" dirty="0"/>
-              <a:t> try-catch-finally</a:t>
-            </a:r>
-            <a:endParaRPr lang="zh-TW" altLang="en-US" dirty="0"/>
-          </a:p>
-        </p:txBody>
-      </p:sp>
-      <p:sp>
-        <p:nvSpPr>
-          <p:cNvPr id="3" name="內容版面配置區 2">
-            <a:extLst>
-              <a:ext uri="{FF2B5EF4-FFF2-40B4-BE49-F238E27FC236}">
-                <a16:creationId xmlns:a16="http://schemas.microsoft.com/office/drawing/2014/main" id="{F478725F-0E0D-47B3-9E2B-1F4D255BF391}"/>
-              </a:ext>
-            </a:extLst>
-          </p:cNvPr>
-          <p:cNvSpPr>
-            <a:spLocks noGrp="1"/>
-          </p:cNvSpPr>
-          <p:nvPr>
-            <p:ph idx="1"/>
-          </p:nvPr>
-        </p:nvSpPr>
-        <p:spPr/>
-        <p:txBody>
-          <a:bodyPr/>
-          <a:lstStyle/>
-          <a:p>
-            <a:r>
-              <a:rPr lang="en-US" altLang="zh-TW" dirty="0">
-                <a:sym typeface="Wingdings" panose="05000000000000000000" pitchFamily="2" charset="2"/>
-              </a:rPr>
-              <a:t>/Ehrms2portal_SC/api-auth-acUser.js LINE </a:t>
-            </a:r>
-            <a:r>
-              <a:rPr lang="en-US" altLang="zh-TW" dirty="0">
-                <a:sym typeface="Wingdings" panose="05000000000000000000" pitchFamily="2" charset="2"/>
-                <a:hlinkClick r:id="rId2"/>
-              </a:rPr>
-              <a:t>954</a:t>
-            </a:r>
-            <a:br>
-              <a:rPr lang="en-US" altLang="zh-TW" dirty="0">
-                <a:sym typeface="Wingdings" panose="05000000000000000000" pitchFamily="2" charset="2"/>
-              </a:rPr>
-            </a:br>
-            <a:br>
-              <a:rPr lang="en-US" altLang="zh-TW" dirty="0">
-                <a:sym typeface="Wingdings" panose="05000000000000000000" pitchFamily="2" charset="2"/>
-              </a:rPr>
-            </a:br>
-            <a:endParaRPr lang="en-US" altLang="zh-TW" dirty="0">
-              <a:sym typeface="Wingdings" panose="05000000000000000000" pitchFamily="2" charset="2"/>
-            </a:endParaRPr>
-          </a:p>
-        </p:txBody>
-      </p:sp>
-      <p:sp>
-        <p:nvSpPr>
-          <p:cNvPr id="4" name="頁尾版面配置區 3">
-            <a:extLst>
-              <a:ext uri="{FF2B5EF4-FFF2-40B4-BE49-F238E27FC236}">
-                <a16:creationId xmlns:a16="http://schemas.microsoft.com/office/drawing/2014/main" id="{F27157E0-4972-47AE-BAEE-01518FBF20C6}"/>
-              </a:ext>
-            </a:extLst>
-          </p:cNvPr>
-          <p:cNvSpPr>
-            <a:spLocks noGrp="1"/>
-          </p:cNvSpPr>
-          <p:nvPr>
-            <p:ph type="ftr" sz="quarter" idx="11"/>
-          </p:nvPr>
-        </p:nvSpPr>
-        <p:spPr/>
-        <p:txBody>
-          <a:bodyPr/>
-          <a:lstStyle/>
-          <a:p>
-            <a:r>
-              <a:rPr lang="en-US" altLang="zh-TW"/>
-              <a:t>104</a:t>
-            </a:r>
-            <a:r>
-              <a:rPr lang="zh-TW" altLang="en-US"/>
-              <a:t>人資學院  </a:t>
-            </a:r>
-            <a:r>
-              <a:rPr lang="en-US" altLang="zh-TW"/>
-              <a:t>All Rights Reserved</a:t>
-            </a:r>
-            <a:endParaRPr lang="zh-TW" altLang="en-US"/>
-          </a:p>
-        </p:txBody>
-      </p:sp>
-      <p:pic>
-        <p:nvPicPr>
-          <p:cNvPr id="5" name="圖片 4">
-            <a:extLst>
-              <a:ext uri="{FF2B5EF4-FFF2-40B4-BE49-F238E27FC236}">
-                <a16:creationId xmlns:a16="http://schemas.microsoft.com/office/drawing/2014/main" id="{35A7F754-E147-45E8-8627-5B09F096336F}"/>
-              </a:ext>
-            </a:extLst>
-          </p:cNvPr>
-          <p:cNvPicPr>
-            <a:picLocks noChangeAspect="1"/>
-          </p:cNvPicPr>
-          <p:nvPr/>
-        </p:nvPicPr>
-        <p:blipFill>
-          <a:blip r:embed="rId3"/>
-          <a:stretch>
-            <a:fillRect/>
-          </a:stretch>
-        </p:blipFill>
-        <p:spPr>
-          <a:xfrm>
-            <a:off x="228158" y="2564904"/>
-            <a:ext cx="8645615" cy="3743821"/>
-          </a:xfrm>
-          <a:prstGeom prst="rect">
-            <a:avLst/>
-          </a:prstGeom>
-        </p:spPr>
-      </p:pic>
-    </p:spTree>
-    <p:extLst>
-      <p:ext uri="{BB962C8B-B14F-4D97-AF65-F5344CB8AC3E}">
-        <p14:creationId xmlns:p14="http://schemas.microsoft.com/office/powerpoint/2010/main" val="909642701"/>
-      </p:ext>
-    </p:extLst>
-  </p:cSld>
-  <p:clrMapOvr>
-    <a:masterClrMapping/>
-  </p:clrMapOvr>
-</p:sld>
-</file>
-
-<file path=ppt/slides/slide8.xml><?xml version="1.0" encoding="utf-8"?>
-<p:sld xmlns:a="http://schemas.openxmlformats.org/drawingml/2006/main" xmlns:r="http://schemas.openxmlformats.org/officeDocument/2006/relationships" xmlns:p="http://schemas.openxmlformats.org/presentationml/2006/main">
-  <p:cSld>
-    <p:spTree>
-      <p:nvGrpSpPr>
-        <p:cNvPr id="1" name=""/>
-        <p:cNvGrpSpPr/>
-        <p:nvPr/>
-      </p:nvGrpSpPr>
-      <p:grpSpPr>
-        <a:xfrm>
-          <a:off x="0" y="0"/>
-          <a:ext cx="0" cy="0"/>
-          <a:chOff x="0" y="0"/>
-          <a:chExt cx="0" cy="0"/>
-        </a:xfrm>
-      </p:grpSpPr>
-      <p:sp>
-        <p:nvSpPr>
-          <p:cNvPr id="2" name="標題 1">
-            <a:extLst>
-              <a:ext uri="{FF2B5EF4-FFF2-40B4-BE49-F238E27FC236}">
-                <a16:creationId xmlns:a16="http://schemas.microsoft.com/office/drawing/2014/main" id="{1765C254-721E-4166-AA1E-F93E7AD9AEF6}"/>
-              </a:ext>
-            </a:extLst>
-          </p:cNvPr>
-          <p:cNvSpPr>
-            <a:spLocks noGrp="1"/>
-          </p:cNvSpPr>
-          <p:nvPr>
-            <p:ph type="title"/>
-          </p:nvPr>
-        </p:nvSpPr>
-        <p:spPr/>
-        <p:txBody>
-          <a:bodyPr/>
-          <a:lstStyle/>
-          <a:p>
-            <a:r>
-              <a:rPr lang="en-US" altLang="zh-TW" dirty="0" err="1"/>
-              <a:t>Async.Waterfall</a:t>
-            </a:r>
-            <a:r>
-              <a:rPr lang="en-US" altLang="zh-TW" dirty="0"/>
-              <a:t> </a:t>
-            </a:r>
-            <a:endParaRPr lang="zh-TW" altLang="en-US" dirty="0"/>
-          </a:p>
-        </p:txBody>
-      </p:sp>
-      <p:sp>
-        <p:nvSpPr>
-          <p:cNvPr id="3" name="內容版面配置區 2">
-            <a:extLst>
-              <a:ext uri="{FF2B5EF4-FFF2-40B4-BE49-F238E27FC236}">
-                <a16:creationId xmlns:a16="http://schemas.microsoft.com/office/drawing/2014/main" id="{6C92636B-C021-4799-85C3-9700D8CBB79B}"/>
-              </a:ext>
-            </a:extLst>
-          </p:cNvPr>
-          <p:cNvSpPr>
-            <a:spLocks noGrp="1"/>
-          </p:cNvSpPr>
-          <p:nvPr>
-            <p:ph idx="1"/>
-          </p:nvPr>
-        </p:nvSpPr>
-        <p:spPr/>
-        <p:txBody>
-          <a:bodyPr/>
-          <a:lstStyle/>
-          <a:p>
-            <a:r>
-              <a:rPr lang="en-US" altLang="zh-TW" dirty="0">
-                <a:sym typeface="Wingdings" panose="05000000000000000000" pitchFamily="2" charset="2"/>
-              </a:rPr>
-              <a:t>/Ehrms2portal_SC/api-auth-acPwdRule.js LINE </a:t>
-            </a:r>
-            <a:r>
-              <a:rPr lang="en-US" altLang="zh-TW" dirty="0">
-                <a:sym typeface="Wingdings" panose="05000000000000000000" pitchFamily="2" charset="2"/>
-                <a:hlinkClick r:id="rId2"/>
-              </a:rPr>
-              <a:t>531</a:t>
-            </a:r>
-            <a:br>
-              <a:rPr lang="en-US" altLang="zh-TW" dirty="0">
-                <a:sym typeface="Wingdings" panose="05000000000000000000" pitchFamily="2" charset="2"/>
-              </a:rPr>
-            </a:br>
-            <a:br>
-              <a:rPr lang="en-US" altLang="zh-TW" dirty="0">
-                <a:sym typeface="Wingdings" panose="05000000000000000000" pitchFamily="2" charset="2"/>
-              </a:rPr>
-            </a:br>
-            <a:endParaRPr lang="en-US" altLang="zh-TW" dirty="0">
-              <a:sym typeface="Wingdings" panose="05000000000000000000" pitchFamily="2" charset="2"/>
-            </a:endParaRPr>
-          </a:p>
-          <a:p>
-            <a:endParaRPr lang="zh-TW" altLang="en-US" dirty="0"/>
-          </a:p>
-        </p:txBody>
-      </p:sp>
-      <p:sp>
-        <p:nvSpPr>
-          <p:cNvPr id="4" name="頁尾版面配置區 3">
-            <a:extLst>
-              <a:ext uri="{FF2B5EF4-FFF2-40B4-BE49-F238E27FC236}">
-                <a16:creationId xmlns:a16="http://schemas.microsoft.com/office/drawing/2014/main" id="{B4E2C0EB-CD7F-4DE2-AAF7-9F290C4E6697}"/>
-              </a:ext>
-            </a:extLst>
-          </p:cNvPr>
-          <p:cNvSpPr>
-            <a:spLocks noGrp="1"/>
-          </p:cNvSpPr>
-          <p:nvPr>
-            <p:ph type="ftr" sz="quarter" idx="11"/>
-          </p:nvPr>
-        </p:nvSpPr>
-        <p:spPr/>
-        <p:txBody>
-          <a:bodyPr/>
-          <a:lstStyle/>
-          <a:p>
-            <a:r>
-              <a:rPr lang="en-US" altLang="zh-TW"/>
-              <a:t>104</a:t>
-            </a:r>
-            <a:r>
-              <a:rPr lang="zh-TW" altLang="en-US"/>
-              <a:t>人資學院  </a:t>
-            </a:r>
-            <a:r>
-              <a:rPr lang="en-US" altLang="zh-TW"/>
-              <a:t>All Rights Reserved</a:t>
-            </a:r>
-            <a:endParaRPr lang="zh-TW" altLang="en-US"/>
-          </a:p>
-        </p:txBody>
-      </p:sp>
-      <p:pic>
-        <p:nvPicPr>
-          <p:cNvPr id="5" name="圖片 4">
-            <a:extLst>
-              <a:ext uri="{FF2B5EF4-FFF2-40B4-BE49-F238E27FC236}">
-                <a16:creationId xmlns:a16="http://schemas.microsoft.com/office/drawing/2014/main" id="{33488B55-F97A-4C63-921A-A7408E2D6A35}"/>
-              </a:ext>
-            </a:extLst>
-          </p:cNvPr>
-          <p:cNvPicPr>
-            <a:picLocks noChangeAspect="1"/>
-          </p:cNvPicPr>
-          <p:nvPr/>
-        </p:nvPicPr>
-        <p:blipFill>
-          <a:blip r:embed="rId3"/>
-          <a:stretch>
-            <a:fillRect/>
-          </a:stretch>
-        </p:blipFill>
-        <p:spPr>
-          <a:xfrm>
-            <a:off x="533005" y="2852936"/>
-            <a:ext cx="8153796" cy="3530848"/>
-          </a:xfrm>
-          <a:prstGeom prst="rect">
-            <a:avLst/>
-          </a:prstGeom>
-        </p:spPr>
-      </p:pic>
-    </p:spTree>
-    <p:extLst>
-      <p:ext uri="{BB962C8B-B14F-4D97-AF65-F5344CB8AC3E}">
-        <p14:creationId xmlns:p14="http://schemas.microsoft.com/office/powerpoint/2010/main" val="1886309669"/>
-      </p:ext>
-    </p:extLst>
-  </p:cSld>
-  <p:clrMapOvr>
-    <a:masterClrMapping/>
-  </p:clrMapOvr>
-</p:sld>
-</file>
-
-<file path=ppt/slides/slide9.xml><?xml version="1.0" encoding="utf-8"?>
-<p:sld xmlns:a="http://schemas.openxmlformats.org/drawingml/2006/main" xmlns:r="http://schemas.openxmlformats.org/officeDocument/2006/relationships" xmlns:p="http://schemas.openxmlformats.org/presentationml/2006/main">
-  <p:cSld>
-    <p:spTree>
-      <p:nvGrpSpPr>
-        <p:cNvPr id="1" name=""/>
-        <p:cNvGrpSpPr/>
-        <p:nvPr/>
-      </p:nvGrpSpPr>
-      <p:grpSpPr>
-        <a:xfrm>
-          <a:off x="0" y="0"/>
-          <a:ext cx="0" cy="0"/>
-          <a:chOff x="0" y="0"/>
-          <a:chExt cx="0" cy="0"/>
-        </a:xfrm>
-      </p:grpSpPr>
-      <p:sp>
-        <p:nvSpPr>
-          <p:cNvPr id="2" name="標題 1">
-            <a:extLst>
-              <a:ext uri="{FF2B5EF4-FFF2-40B4-BE49-F238E27FC236}">
-                <a16:creationId xmlns:a16="http://schemas.microsoft.com/office/drawing/2014/main" id="{647F4C66-668A-4D8A-8F51-F198A2B4C458}"/>
-              </a:ext>
-            </a:extLst>
-          </p:cNvPr>
-          <p:cNvSpPr>
-            <a:spLocks noGrp="1"/>
-          </p:cNvSpPr>
-          <p:nvPr>
-            <p:ph type="title"/>
-          </p:nvPr>
-        </p:nvSpPr>
-        <p:spPr/>
-        <p:txBody>
-          <a:bodyPr/>
-          <a:lstStyle/>
-          <a:p>
-            <a:r>
-              <a:rPr lang="en-US" altLang="zh-TW" dirty="0"/>
-              <a:t>ASYNC</a:t>
-            </a:r>
-            <a:r>
-              <a:rPr lang="zh-TW" altLang="en-US" dirty="0"/>
-              <a:t>整理</a:t>
-            </a:r>
-          </a:p>
-        </p:txBody>
-      </p:sp>
-      <p:sp>
-        <p:nvSpPr>
-          <p:cNvPr id="3" name="內容版面配置區 2">
-            <a:extLst>
-              <a:ext uri="{FF2B5EF4-FFF2-40B4-BE49-F238E27FC236}">
-                <a16:creationId xmlns:a16="http://schemas.microsoft.com/office/drawing/2014/main" id="{67B283EE-D519-443B-B399-B4DAAC0EE76D}"/>
-              </a:ext>
-            </a:extLst>
-          </p:cNvPr>
-          <p:cNvSpPr>
-            <a:spLocks noGrp="1"/>
-          </p:cNvSpPr>
-          <p:nvPr>
-            <p:ph idx="1"/>
-          </p:nvPr>
-        </p:nvSpPr>
-        <p:spPr/>
-        <p:txBody>
-          <a:bodyPr/>
-          <a:lstStyle/>
-          <a:p>
-            <a:r>
-              <a:rPr lang="en-US" altLang="zh-TW" dirty="0" err="1"/>
-              <a:t>CallBack</a:t>
-            </a:r>
-            <a:r>
-              <a:rPr lang="en-US" altLang="zh-TW" dirty="0"/>
-              <a:t> </a:t>
-            </a:r>
-            <a:r>
-              <a:rPr lang="zh-TW" altLang="en-US" dirty="0"/>
-              <a:t>是</a:t>
-            </a:r>
-            <a:r>
-              <a:rPr lang="en-US" altLang="zh-TW" dirty="0" err="1"/>
-              <a:t>js</a:t>
-            </a:r>
-            <a:r>
-              <a:rPr lang="zh-TW" altLang="en-US" dirty="0"/>
-              <a:t>在處理</a:t>
-            </a:r>
-            <a:r>
-              <a:rPr lang="en-US" altLang="zh-TW" dirty="0"/>
-              <a:t>non-</a:t>
-            </a:r>
-            <a:r>
-              <a:rPr lang="en-US" altLang="zh-TW" dirty="0" err="1"/>
-              <a:t>blockin</a:t>
-            </a:r>
-            <a:r>
-              <a:rPr lang="zh-TW" altLang="en-US" dirty="0"/>
-              <a:t>的設計方式</a:t>
-            </a:r>
-            <a:r>
-              <a:rPr lang="en-US" altLang="zh-TW" dirty="0"/>
-              <a:t>(</a:t>
-            </a:r>
-            <a:r>
-              <a:rPr lang="en-US" altLang="zh-TW" dirty="0" err="1"/>
-              <a:t>async</a:t>
-            </a:r>
-            <a:r>
-              <a:rPr lang="en-US" altLang="zh-TW" dirty="0"/>
-              <a:t>)</a:t>
-            </a:r>
-          </a:p>
-          <a:p>
-            <a:r>
-              <a:rPr lang="zh-TW" altLang="en-US" dirty="0"/>
-              <a:t>解決</a:t>
-            </a:r>
-            <a:r>
-              <a:rPr lang="en-US" altLang="zh-TW" dirty="0" err="1"/>
-              <a:t>CallBack</a:t>
-            </a:r>
-            <a:r>
-              <a:rPr lang="zh-TW" altLang="en-US" dirty="0"/>
-              <a:t> </a:t>
-            </a:r>
-            <a:r>
-              <a:rPr lang="en-US" altLang="zh-TW" dirty="0"/>
-              <a:t>Hell</a:t>
-            </a:r>
-          </a:p>
-          <a:p>
-            <a:pPr lvl="1"/>
-            <a:r>
-              <a:rPr lang="en-US" altLang="zh-TW" dirty="0"/>
-              <a:t>ES6 </a:t>
-            </a:r>
-            <a:r>
-              <a:rPr lang="en-US" altLang="zh-TW" dirty="0">
-                <a:sym typeface="Wingdings" panose="05000000000000000000" pitchFamily="2" charset="2"/>
-              </a:rPr>
-              <a:t> </a:t>
-            </a:r>
-            <a:r>
-              <a:rPr lang="en-US" altLang="zh-TW" dirty="0"/>
-              <a:t>promise</a:t>
-            </a:r>
-          </a:p>
-          <a:p>
-            <a:pPr lvl="1"/>
-            <a:r>
-              <a:rPr lang="en-US" altLang="zh-TW" dirty="0" err="1"/>
-              <a:t>Async</a:t>
-            </a:r>
-            <a:r>
-              <a:rPr lang="en-US" altLang="zh-TW" dirty="0"/>
-              <a:t> </a:t>
-            </a:r>
-            <a:r>
-              <a:rPr lang="en-US" altLang="zh-TW" dirty="0">
-                <a:sym typeface="Wingdings" panose="05000000000000000000" pitchFamily="2" charset="2"/>
-              </a:rPr>
-              <a:t> waterfall, each …</a:t>
-            </a:r>
-            <a:endParaRPr lang="en-US" altLang="zh-TW" dirty="0"/>
-          </a:p>
-          <a:p>
-            <a:pPr lvl="1"/>
-            <a:r>
-              <a:rPr lang="en-US" altLang="zh-TW" dirty="0"/>
-              <a:t>ES7 </a:t>
-            </a:r>
-            <a:r>
-              <a:rPr lang="en-US" altLang="zh-TW" dirty="0">
-                <a:sym typeface="Wingdings" panose="05000000000000000000" pitchFamily="2" charset="2"/>
-              </a:rPr>
-              <a:t> </a:t>
-            </a:r>
-            <a:r>
-              <a:rPr lang="en-US" altLang="zh-TW" dirty="0" err="1"/>
-              <a:t>async</a:t>
-            </a:r>
-            <a:r>
-              <a:rPr lang="en-US" altLang="zh-TW" dirty="0"/>
-              <a:t> await</a:t>
-            </a:r>
-          </a:p>
-          <a:p>
-            <a:pPr lvl="1"/>
-            <a:r>
-              <a:rPr lang="en-US" altLang="zh-TW" dirty="0" err="1"/>
-              <a:t>nodejs</a:t>
-            </a:r>
-            <a:r>
-              <a:rPr lang="en-US" altLang="zh-TW" dirty="0">
-                <a:sym typeface="Wingdings" panose="05000000000000000000" pitchFamily="2" charset="2"/>
-              </a:rPr>
-              <a:t>  </a:t>
-            </a:r>
-            <a:r>
-              <a:rPr lang="en-US" altLang="zh-TW" dirty="0" err="1">
-                <a:sym typeface="Wingdings" panose="05000000000000000000" pitchFamily="2" charset="2"/>
-              </a:rPr>
-              <a:t>promisify</a:t>
-            </a:r>
-            <a:endParaRPr lang="en-US" altLang="zh-TW" dirty="0"/>
-          </a:p>
-        </p:txBody>
-      </p:sp>
-      <p:sp>
-        <p:nvSpPr>
-          <p:cNvPr id="4" name="頁尾版面配置區 3">
-            <a:extLst>
-              <a:ext uri="{FF2B5EF4-FFF2-40B4-BE49-F238E27FC236}">
-                <a16:creationId xmlns:a16="http://schemas.microsoft.com/office/drawing/2014/main" id="{06890AFF-36AE-4479-A2BD-6831DAAAB459}"/>
-              </a:ext>
-            </a:extLst>
-          </p:cNvPr>
-          <p:cNvSpPr>
-            <a:spLocks noGrp="1"/>
-          </p:cNvSpPr>
-          <p:nvPr>
-            <p:ph type="ftr" sz="quarter" idx="11"/>
-          </p:nvPr>
-        </p:nvSpPr>
-        <p:spPr/>
-        <p:txBody>
-          <a:bodyPr/>
-          <a:lstStyle/>
-          <a:p>
-            <a:r>
-              <a:rPr lang="en-US" altLang="zh-TW"/>
-              <a:t>104</a:t>
-            </a:r>
-            <a:r>
-              <a:rPr lang="zh-TW" altLang="en-US"/>
-              <a:t>人資學院  </a:t>
-            </a:r>
-            <a:r>
-              <a:rPr lang="en-US" altLang="zh-TW"/>
-              <a:t>All Rights Reserved</a:t>
-            </a:r>
-            <a:endParaRPr lang="zh-TW" altLang="en-US"/>
-          </a:p>
-        </p:txBody>
-      </p:sp>
-    </p:spTree>
-    <p:extLst>
-      <p:ext uri="{BB962C8B-B14F-4D97-AF65-F5344CB8AC3E}">
-        <p14:creationId xmlns:p14="http://schemas.microsoft.com/office/powerpoint/2010/main" val="477108725"/>
       </p:ext>
     </p:extLst>
   </p:cSld>

</xml_diff>

<commit_message>
save, prepare testing rm cache
</commit_message>
<xml_diff>
--- a/2019_0627_Git_Share_HA.pptx
+++ b/2019_0627_Git_Share_HA.pptx
@@ -5,7 +5,7 @@
     <p:sldMasterId id="2147483648" r:id="rId1"/>
   </p:sldMasterIdLst>
   <p:notesMasterIdLst>
-    <p:notesMasterId r:id="rId18"/>
+    <p:notesMasterId r:id="rId16"/>
   </p:notesMasterIdLst>
   <p:sldIdLst>
     <p:sldId id="256" r:id="rId2"/>
@@ -18,12 +18,10 @@
     <p:sldId id="269" r:id="rId9"/>
     <p:sldId id="270" r:id="rId10"/>
     <p:sldId id="271" r:id="rId11"/>
-    <p:sldId id="260" r:id="rId12"/>
-    <p:sldId id="261" r:id="rId13"/>
-    <p:sldId id="262" r:id="rId14"/>
-    <p:sldId id="264" r:id="rId15"/>
-    <p:sldId id="263" r:id="rId16"/>
-    <p:sldId id="258" r:id="rId17"/>
+    <p:sldId id="272" r:id="rId12"/>
+    <p:sldId id="273" r:id="rId13"/>
+    <p:sldId id="263" r:id="rId14"/>
+    <p:sldId id="258" r:id="rId15"/>
   </p:sldIdLst>
   <p:sldSz cx="9144000" cy="6858000" type="screen4x3"/>
   <p:notesSz cx="6858000" cy="9144000"/>
@@ -3919,21 +3917,90 @@
           </a:p>
         </p:txBody>
       </p:sp>
+      <p:sp>
+        <p:nvSpPr>
+          <p:cNvPr id="4" name="頁尾版面配置區 3">
+            <a:extLst>
+              <a:ext uri="{FF2B5EF4-FFF2-40B4-BE49-F238E27FC236}">
+                <a16:creationId xmlns:a16="http://schemas.microsoft.com/office/drawing/2014/main" id="{F22D0A4E-9104-421C-B2EC-E5932C5BF52D}"/>
+              </a:ext>
+            </a:extLst>
+          </p:cNvPr>
+          <p:cNvSpPr>
+            <a:spLocks noGrp="1"/>
+          </p:cNvSpPr>
+          <p:nvPr>
+            <p:ph type="ftr" sz="quarter" idx="11"/>
+          </p:nvPr>
+        </p:nvSpPr>
+        <p:spPr/>
+        <p:txBody>
+          <a:bodyPr/>
+          <a:lstStyle/>
+          <a:p>
+            <a:r>
+              <a:rPr lang="en-US" altLang="zh-TW"/>
+              <a:t>104</a:t>
+            </a:r>
+            <a:r>
+              <a:rPr lang="zh-TW" altLang="en-US"/>
+              <a:t>人資學院  </a:t>
+            </a:r>
+            <a:r>
+              <a:rPr lang="en-US" altLang="zh-TW"/>
+              <a:t>All Rights Reserved</a:t>
+            </a:r>
+            <a:endParaRPr lang="zh-TW" altLang="en-US"/>
+          </a:p>
+        </p:txBody>
+      </p:sp>
+      <p:sp>
+        <p:nvSpPr>
+          <p:cNvPr id="8" name="內容版面配置區 7">
+            <a:extLst>
+              <a:ext uri="{FF2B5EF4-FFF2-40B4-BE49-F238E27FC236}">
+                <a16:creationId xmlns:a16="http://schemas.microsoft.com/office/drawing/2014/main" id="{E657D714-AC9F-4963-9721-E48B1BD94B3D}"/>
+              </a:ext>
+            </a:extLst>
+          </p:cNvPr>
+          <p:cNvSpPr>
+            <a:spLocks noGrp="1"/>
+          </p:cNvSpPr>
+          <p:nvPr>
+            <p:ph idx="1"/>
+          </p:nvPr>
+        </p:nvSpPr>
+        <p:spPr/>
+        <p:txBody>
+          <a:bodyPr/>
+          <a:lstStyle/>
+          <a:p>
+            <a:r>
+              <a:rPr lang="en-US" altLang="zh-TW" dirty="0"/>
+              <a:t>git add &lt;file&gt; / git reset -- &lt;file&gt;</a:t>
+            </a:r>
+          </a:p>
+          <a:p>
+            <a:r>
+              <a:rPr lang="en-US" altLang="zh-TW" dirty="0"/>
+              <a:t>git commit / git reset HEAD^</a:t>
+            </a:r>
+          </a:p>
+        </p:txBody>
+      </p:sp>
       <p:pic>
         <p:nvPicPr>
-          <p:cNvPr id="6" name="內容版面配置區 5">
+          <p:cNvPr id="10" name="圖片 9">
             <a:extLst>
               <a:ext uri="{FF2B5EF4-FFF2-40B4-BE49-F238E27FC236}">
-                <a16:creationId xmlns:a16="http://schemas.microsoft.com/office/drawing/2014/main" id="{F20E7E57-F871-4A50-99C2-39C61EF9AABE}"/>
+                <a16:creationId xmlns:a16="http://schemas.microsoft.com/office/drawing/2014/main" id="{E8F073B9-3951-4DF2-AB89-270F11395BF4}"/>
               </a:ext>
             </a:extLst>
           </p:cNvPr>
           <p:cNvPicPr>
-            <a:picLocks noGrp="1" noChangeAspect="1"/>
+            <a:picLocks noChangeAspect="1"/>
           </p:cNvPicPr>
-          <p:nvPr>
-            <p:ph idx="1"/>
-          </p:nvPr>
+          <p:nvPr/>
         </p:nvPicPr>
         <p:blipFill>
           <a:blip r:embed="rId2">
@@ -3949,48 +4016,14 @@
         </p:blipFill>
         <p:spPr>
           <a:xfrm>
-            <a:off x="799573" y="2243705"/>
-            <a:ext cx="7544853" cy="3238952"/>
+            <a:off x="1367644" y="2996952"/>
+            <a:ext cx="6408712" cy="2751214"/>
           </a:xfrm>
+          <a:prstGeom prst="rect">
+            <a:avLst/>
+          </a:prstGeom>
         </p:spPr>
       </p:pic>
-      <p:sp>
-        <p:nvSpPr>
-          <p:cNvPr id="4" name="頁尾版面配置區 3">
-            <a:extLst>
-              <a:ext uri="{FF2B5EF4-FFF2-40B4-BE49-F238E27FC236}">
-                <a16:creationId xmlns:a16="http://schemas.microsoft.com/office/drawing/2014/main" id="{F22D0A4E-9104-421C-B2EC-E5932C5BF52D}"/>
-              </a:ext>
-            </a:extLst>
-          </p:cNvPr>
-          <p:cNvSpPr>
-            <a:spLocks noGrp="1"/>
-          </p:cNvSpPr>
-          <p:nvPr>
-            <p:ph type="ftr" sz="quarter" idx="11"/>
-          </p:nvPr>
-        </p:nvSpPr>
-        <p:spPr/>
-        <p:txBody>
-          <a:bodyPr/>
-          <a:lstStyle/>
-          <a:p>
-            <a:r>
-              <a:rPr lang="en-US" altLang="zh-TW"/>
-              <a:t>104</a:t>
-            </a:r>
-            <a:r>
-              <a:rPr lang="zh-TW" altLang="en-US"/>
-              <a:t>人資學院  </a:t>
-            </a:r>
-            <a:r>
-              <a:rPr lang="en-US" altLang="zh-TW"/>
-              <a:t>All Rights Reserved</a:t>
-            </a:r>
-            <a:endParaRPr lang="zh-TW" altLang="en-US"/>
-          </a:p>
-        </p:txBody>
-      </p:sp>
     </p:spTree>
     <p:extLst>
       <p:ext uri="{BB962C8B-B14F-4D97-AF65-F5344CB8AC3E}">
@@ -4026,7 +4059,7 @@
           <p:cNvPr id="2" name="標題 1">
             <a:extLst>
               <a:ext uri="{FF2B5EF4-FFF2-40B4-BE49-F238E27FC236}">
-                <a16:creationId xmlns:a16="http://schemas.microsoft.com/office/drawing/2014/main" id="{1F53BFC4-38C1-46A5-8967-4D5F3CB1B717}"/>
+                <a16:creationId xmlns:a16="http://schemas.microsoft.com/office/drawing/2014/main" id="{8D10DC92-7764-4D0E-8724-C70EE87849CE}"/>
               </a:ext>
             </a:extLst>
           </p:cNvPr>
@@ -4044,13 +4077,12 @@
           <a:p>
             <a:r>
               <a:rPr lang="en-US" altLang="zh-TW" dirty="0"/>
-              <a:t>Promise </a:t>
-            </a:r>
-            <a:r>
-              <a:rPr lang="en-US" altLang="zh-TW" dirty="0" err="1"/>
-              <a:t>concat</a:t>
-            </a:r>
-            <a:endParaRPr lang="zh-TW" altLang="en-US" dirty="0"/>
+              <a:t>Git</a:t>
+            </a:r>
+            <a:r>
+              <a:rPr lang="zh-TW" altLang="en-US" dirty="0"/>
+              <a:t>移除追蹤的檔案</a:t>
+            </a:r>
           </a:p>
         </p:txBody>
       </p:sp>
@@ -4059,7 +4091,7 @@
           <p:cNvPr id="3" name="內容版面配置區 2">
             <a:extLst>
               <a:ext uri="{FF2B5EF4-FFF2-40B4-BE49-F238E27FC236}">
-                <a16:creationId xmlns:a16="http://schemas.microsoft.com/office/drawing/2014/main" id="{ED6A5C43-F74E-4DBC-AC33-4FB90C3BE8D6}"/>
+                <a16:creationId xmlns:a16="http://schemas.microsoft.com/office/drawing/2014/main" id="{E7F92427-39A5-4749-AABB-3AC4001068E9}"/>
               </a:ext>
             </a:extLst>
           </p:cNvPr>
@@ -4076,26 +4108,10 @@
           <a:lstStyle/>
           <a:p>
             <a:r>
-              <a:rPr lang="en-US" altLang="zh-TW" dirty="0">
-                <a:sym typeface="Wingdings" panose="05000000000000000000" pitchFamily="2" charset="2"/>
-              </a:rPr>
-              <a:t>/Ehrms2portal_SC/api-auth-acUser.js LINE </a:t>
-            </a:r>
-            <a:r>
-              <a:rPr lang="en-US" altLang="zh-TW" dirty="0">
-                <a:sym typeface="Wingdings" panose="05000000000000000000" pitchFamily="2" charset="2"/>
-                <a:hlinkClick r:id="rId2"/>
-              </a:rPr>
-              <a:t>927</a:t>
-            </a:r>
-            <a:endParaRPr lang="en-US" altLang="zh-TW" dirty="0">
-              <a:sym typeface="Wingdings" panose="05000000000000000000" pitchFamily="2" charset="2"/>
-            </a:endParaRPr>
-          </a:p>
-          <a:p>
-            <a:endParaRPr lang="en-US" altLang="zh-TW" dirty="0">
-              <a:sym typeface="Wingdings" panose="05000000000000000000" pitchFamily="2" charset="2"/>
-            </a:endParaRPr>
+              <a:rPr lang="en-US" altLang="zh-TW" dirty="0"/>
+              <a:t>assume-unchanged</a:t>
+            </a:r>
+            <a:endParaRPr lang="zh-TW" altLang="en-US" dirty="0"/>
           </a:p>
         </p:txBody>
       </p:sp>
@@ -4104,7 +4120,7 @@
           <p:cNvPr id="4" name="頁尾版面配置區 3">
             <a:extLst>
               <a:ext uri="{FF2B5EF4-FFF2-40B4-BE49-F238E27FC236}">
-                <a16:creationId xmlns:a16="http://schemas.microsoft.com/office/drawing/2014/main" id="{9C15FB9A-0695-4774-8738-81A625865030}"/>
+                <a16:creationId xmlns:a16="http://schemas.microsoft.com/office/drawing/2014/main" id="{B0ED7CF5-5849-4879-A573-65C6280A8671}"/>
               </a:ext>
             </a:extLst>
           </p:cNvPr>
@@ -4136,40 +4152,10 @@
           </a:p>
         </p:txBody>
       </p:sp>
-      <p:pic>
-        <p:nvPicPr>
-          <p:cNvPr id="5" name="圖片 4">
-            <a:extLst>
-              <a:ext uri="{FF2B5EF4-FFF2-40B4-BE49-F238E27FC236}">
-                <a16:creationId xmlns:a16="http://schemas.microsoft.com/office/drawing/2014/main" id="{58663B3E-3A13-4FFA-B551-C659A514A42A}"/>
-              </a:ext>
-            </a:extLst>
-          </p:cNvPr>
-          <p:cNvPicPr>
-            <a:picLocks noChangeAspect="1"/>
-          </p:cNvPicPr>
-          <p:nvPr/>
-        </p:nvPicPr>
-        <p:blipFill>
-          <a:blip r:embed="rId3"/>
-          <a:stretch>
-            <a:fillRect/>
-          </a:stretch>
-        </p:blipFill>
-        <p:spPr>
-          <a:xfrm>
-            <a:off x="505244" y="2276872"/>
-            <a:ext cx="8269654" cy="4052746"/>
-          </a:xfrm>
-          <a:prstGeom prst="rect">
-            <a:avLst/>
-          </a:prstGeom>
-        </p:spPr>
-      </p:pic>
     </p:spTree>
     <p:extLst>
       <p:ext uri="{BB962C8B-B14F-4D97-AF65-F5344CB8AC3E}">
-        <p14:creationId xmlns:p14="http://schemas.microsoft.com/office/powerpoint/2010/main" val="280376510"/>
+        <p14:creationId xmlns:p14="http://schemas.microsoft.com/office/powerpoint/2010/main" val="4183670075"/>
       </p:ext>
     </p:extLst>
   </p:cSld>
@@ -4201,7 +4187,7 @@
           <p:cNvPr id="2" name="標題 1">
             <a:extLst>
               <a:ext uri="{FF2B5EF4-FFF2-40B4-BE49-F238E27FC236}">
-                <a16:creationId xmlns:a16="http://schemas.microsoft.com/office/drawing/2014/main" id="{51841209-40F9-48A5-9D1B-ED5369596D62}"/>
+                <a16:creationId xmlns:a16="http://schemas.microsoft.com/office/drawing/2014/main" id="{D1D9ED34-5D42-4500-842D-89CB8051F884}"/>
               </a:ext>
             </a:extLst>
           </p:cNvPr>
@@ -4218,12 +4204,8 @@
           <a:lstStyle/>
           <a:p>
             <a:r>
-              <a:rPr lang="en-US" altLang="zh-TW" dirty="0" err="1"/>
-              <a:t>Async</a:t>
-            </a:r>
-            <a:r>
               <a:rPr lang="en-US" altLang="zh-TW" dirty="0"/>
-              <a:t> try-catch-finally</a:t>
+              <a:t>Commit operator</a:t>
             </a:r>
             <a:endParaRPr lang="zh-TW" altLang="en-US" dirty="0"/>
           </a:p>
@@ -4234,7 +4216,7 @@
           <p:cNvPr id="3" name="內容版面配置區 2">
             <a:extLst>
               <a:ext uri="{FF2B5EF4-FFF2-40B4-BE49-F238E27FC236}">
-                <a16:creationId xmlns:a16="http://schemas.microsoft.com/office/drawing/2014/main" id="{F478725F-0E0D-47B3-9E2B-1F4D255BF391}"/>
+                <a16:creationId xmlns:a16="http://schemas.microsoft.com/office/drawing/2014/main" id="{D57A5CF3-D76B-495C-B30E-9B19AFF6026C}"/>
               </a:ext>
             </a:extLst>
           </p:cNvPr>
@@ -4250,32 +4232,7 @@
           <a:bodyPr/>
           <a:lstStyle/>
           <a:p>
-            <a:r>
-              <a:rPr lang="en-US" altLang="zh-TW" dirty="0">
-                <a:sym typeface="Wingdings" panose="05000000000000000000" pitchFamily="2" charset="2"/>
-              </a:rPr>
-              <a:t>/Ehrms2portal_SC/api-auth-acUser.js LINE </a:t>
-            </a:r>
-            <a:r>
-              <a:rPr lang="en-US" altLang="zh-TW" dirty="0">
-                <a:sym typeface="Wingdings" panose="05000000000000000000" pitchFamily="2" charset="2"/>
-                <a:hlinkClick r:id="rId2"/>
-              </a:rPr>
-              <a:t>954</a:t>
-            </a:r>
-            <a:br>
-              <a:rPr lang="en-US" altLang="zh-TW" dirty="0">
-                <a:sym typeface="Wingdings" panose="05000000000000000000" pitchFamily="2" charset="2"/>
-              </a:rPr>
-            </a:br>
-            <a:br>
-              <a:rPr lang="en-US" altLang="zh-TW" dirty="0">
-                <a:sym typeface="Wingdings" panose="05000000000000000000" pitchFamily="2" charset="2"/>
-              </a:rPr>
-            </a:br>
-            <a:endParaRPr lang="en-US" altLang="zh-TW" dirty="0">
-              <a:sym typeface="Wingdings" panose="05000000000000000000" pitchFamily="2" charset="2"/>
-            </a:endParaRPr>
+            <a:endParaRPr lang="zh-TW" altLang="en-US" dirty="0"/>
           </a:p>
         </p:txBody>
       </p:sp>
@@ -4284,7 +4241,7 @@
           <p:cNvPr id="4" name="頁尾版面配置區 3">
             <a:extLst>
               <a:ext uri="{FF2B5EF4-FFF2-40B4-BE49-F238E27FC236}">
-                <a16:creationId xmlns:a16="http://schemas.microsoft.com/office/drawing/2014/main" id="{F27157E0-4972-47AE-BAEE-01518FBF20C6}"/>
+                <a16:creationId xmlns:a16="http://schemas.microsoft.com/office/drawing/2014/main" id="{0D8B14B7-D929-4FC7-9AC6-F3A563AC18CA}"/>
               </a:ext>
             </a:extLst>
           </p:cNvPr>
@@ -4316,40 +4273,10 @@
           </a:p>
         </p:txBody>
       </p:sp>
-      <p:pic>
-        <p:nvPicPr>
-          <p:cNvPr id="5" name="圖片 4">
-            <a:extLst>
-              <a:ext uri="{FF2B5EF4-FFF2-40B4-BE49-F238E27FC236}">
-                <a16:creationId xmlns:a16="http://schemas.microsoft.com/office/drawing/2014/main" id="{35A7F754-E147-45E8-8627-5B09F096336F}"/>
-              </a:ext>
-            </a:extLst>
-          </p:cNvPr>
-          <p:cNvPicPr>
-            <a:picLocks noChangeAspect="1"/>
-          </p:cNvPicPr>
-          <p:nvPr/>
-        </p:nvPicPr>
-        <p:blipFill>
-          <a:blip r:embed="rId3"/>
-          <a:stretch>
-            <a:fillRect/>
-          </a:stretch>
-        </p:blipFill>
-        <p:spPr>
-          <a:xfrm>
-            <a:off x="228158" y="2564904"/>
-            <a:ext cx="8645615" cy="3743821"/>
-          </a:xfrm>
-          <a:prstGeom prst="rect">
-            <a:avLst/>
-          </a:prstGeom>
-        </p:spPr>
-      </p:pic>
     </p:spTree>
     <p:extLst>
       <p:ext uri="{BB962C8B-B14F-4D97-AF65-F5344CB8AC3E}">
-        <p14:creationId xmlns:p14="http://schemas.microsoft.com/office/powerpoint/2010/main" val="909642701"/>
+        <p14:creationId xmlns:p14="http://schemas.microsoft.com/office/powerpoint/2010/main" val="762188724"/>
       </p:ext>
     </p:extLst>
   </p:cSld>
@@ -4381,450 +4308,6 @@
           <p:cNvPr id="2" name="標題 1">
             <a:extLst>
               <a:ext uri="{FF2B5EF4-FFF2-40B4-BE49-F238E27FC236}">
-                <a16:creationId xmlns:a16="http://schemas.microsoft.com/office/drawing/2014/main" id="{1765C254-721E-4166-AA1E-F93E7AD9AEF6}"/>
-              </a:ext>
-            </a:extLst>
-          </p:cNvPr>
-          <p:cNvSpPr>
-            <a:spLocks noGrp="1"/>
-          </p:cNvSpPr>
-          <p:nvPr>
-            <p:ph type="title"/>
-          </p:nvPr>
-        </p:nvSpPr>
-        <p:spPr/>
-        <p:txBody>
-          <a:bodyPr/>
-          <a:lstStyle/>
-          <a:p>
-            <a:r>
-              <a:rPr lang="en-US" altLang="zh-TW" dirty="0" err="1"/>
-              <a:t>Async.Waterfall</a:t>
-            </a:r>
-            <a:r>
-              <a:rPr lang="en-US" altLang="zh-TW" dirty="0"/>
-              <a:t> </a:t>
-            </a:r>
-            <a:endParaRPr lang="zh-TW" altLang="en-US" dirty="0"/>
-          </a:p>
-        </p:txBody>
-      </p:sp>
-      <p:sp>
-        <p:nvSpPr>
-          <p:cNvPr id="3" name="內容版面配置區 2">
-            <a:extLst>
-              <a:ext uri="{FF2B5EF4-FFF2-40B4-BE49-F238E27FC236}">
-                <a16:creationId xmlns:a16="http://schemas.microsoft.com/office/drawing/2014/main" id="{6C92636B-C021-4799-85C3-9700D8CBB79B}"/>
-              </a:ext>
-            </a:extLst>
-          </p:cNvPr>
-          <p:cNvSpPr>
-            <a:spLocks noGrp="1"/>
-          </p:cNvSpPr>
-          <p:nvPr>
-            <p:ph idx="1"/>
-          </p:nvPr>
-        </p:nvSpPr>
-        <p:spPr/>
-        <p:txBody>
-          <a:bodyPr/>
-          <a:lstStyle/>
-          <a:p>
-            <a:r>
-              <a:rPr lang="en-US" altLang="zh-TW" dirty="0">
-                <a:sym typeface="Wingdings" panose="05000000000000000000" pitchFamily="2" charset="2"/>
-              </a:rPr>
-              <a:t>/Ehrms2portal_SC/api-auth-acPwdRule.js LINE </a:t>
-            </a:r>
-            <a:r>
-              <a:rPr lang="en-US" altLang="zh-TW" dirty="0">
-                <a:sym typeface="Wingdings" panose="05000000000000000000" pitchFamily="2" charset="2"/>
-                <a:hlinkClick r:id="rId2"/>
-              </a:rPr>
-              <a:t>531</a:t>
-            </a:r>
-            <a:br>
-              <a:rPr lang="en-US" altLang="zh-TW" dirty="0">
-                <a:sym typeface="Wingdings" panose="05000000000000000000" pitchFamily="2" charset="2"/>
-              </a:rPr>
-            </a:br>
-            <a:br>
-              <a:rPr lang="en-US" altLang="zh-TW" dirty="0">
-                <a:sym typeface="Wingdings" panose="05000000000000000000" pitchFamily="2" charset="2"/>
-              </a:rPr>
-            </a:br>
-            <a:endParaRPr lang="en-US" altLang="zh-TW" dirty="0">
-              <a:sym typeface="Wingdings" panose="05000000000000000000" pitchFamily="2" charset="2"/>
-            </a:endParaRPr>
-          </a:p>
-          <a:p>
-            <a:endParaRPr lang="zh-TW" altLang="en-US" dirty="0"/>
-          </a:p>
-        </p:txBody>
-      </p:sp>
-      <p:sp>
-        <p:nvSpPr>
-          <p:cNvPr id="4" name="頁尾版面配置區 3">
-            <a:extLst>
-              <a:ext uri="{FF2B5EF4-FFF2-40B4-BE49-F238E27FC236}">
-                <a16:creationId xmlns:a16="http://schemas.microsoft.com/office/drawing/2014/main" id="{B4E2C0EB-CD7F-4DE2-AAF7-9F290C4E6697}"/>
-              </a:ext>
-            </a:extLst>
-          </p:cNvPr>
-          <p:cNvSpPr>
-            <a:spLocks noGrp="1"/>
-          </p:cNvSpPr>
-          <p:nvPr>
-            <p:ph type="ftr" sz="quarter" idx="11"/>
-          </p:nvPr>
-        </p:nvSpPr>
-        <p:spPr/>
-        <p:txBody>
-          <a:bodyPr/>
-          <a:lstStyle/>
-          <a:p>
-            <a:r>
-              <a:rPr lang="en-US" altLang="zh-TW"/>
-              <a:t>104</a:t>
-            </a:r>
-            <a:r>
-              <a:rPr lang="zh-TW" altLang="en-US"/>
-              <a:t>人資學院  </a:t>
-            </a:r>
-            <a:r>
-              <a:rPr lang="en-US" altLang="zh-TW"/>
-              <a:t>All Rights Reserved</a:t>
-            </a:r>
-            <a:endParaRPr lang="zh-TW" altLang="en-US"/>
-          </a:p>
-        </p:txBody>
-      </p:sp>
-      <p:pic>
-        <p:nvPicPr>
-          <p:cNvPr id="5" name="圖片 4">
-            <a:extLst>
-              <a:ext uri="{FF2B5EF4-FFF2-40B4-BE49-F238E27FC236}">
-                <a16:creationId xmlns:a16="http://schemas.microsoft.com/office/drawing/2014/main" id="{33488B55-F97A-4C63-921A-A7408E2D6A35}"/>
-              </a:ext>
-            </a:extLst>
-          </p:cNvPr>
-          <p:cNvPicPr>
-            <a:picLocks noChangeAspect="1"/>
-          </p:cNvPicPr>
-          <p:nvPr/>
-        </p:nvPicPr>
-        <p:blipFill>
-          <a:blip r:embed="rId3"/>
-          <a:stretch>
-            <a:fillRect/>
-          </a:stretch>
-        </p:blipFill>
-        <p:spPr>
-          <a:xfrm>
-            <a:off x="533005" y="2852936"/>
-            <a:ext cx="8153796" cy="3530848"/>
-          </a:xfrm>
-          <a:prstGeom prst="rect">
-            <a:avLst/>
-          </a:prstGeom>
-        </p:spPr>
-      </p:pic>
-    </p:spTree>
-    <p:extLst>
-      <p:ext uri="{BB962C8B-B14F-4D97-AF65-F5344CB8AC3E}">
-        <p14:creationId xmlns:p14="http://schemas.microsoft.com/office/powerpoint/2010/main" val="1886309669"/>
-      </p:ext>
-    </p:extLst>
-  </p:cSld>
-  <p:clrMapOvr>
-    <a:masterClrMapping/>
-  </p:clrMapOvr>
-</p:sld>
-</file>
-
-<file path=ppt/slides/slide14.xml><?xml version="1.0" encoding="utf-8"?>
-<p:sld xmlns:a="http://schemas.openxmlformats.org/drawingml/2006/main" xmlns:r="http://schemas.openxmlformats.org/officeDocument/2006/relationships" xmlns:p="http://schemas.openxmlformats.org/presentationml/2006/main">
-  <p:cSld>
-    <p:spTree>
-      <p:nvGrpSpPr>
-        <p:cNvPr id="1" name=""/>
-        <p:cNvGrpSpPr/>
-        <p:nvPr/>
-      </p:nvGrpSpPr>
-      <p:grpSpPr>
-        <a:xfrm>
-          <a:off x="0" y="0"/>
-          <a:ext cx="0" cy="0"/>
-          <a:chOff x="0" y="0"/>
-          <a:chExt cx="0" cy="0"/>
-        </a:xfrm>
-      </p:grpSpPr>
-      <p:sp>
-        <p:nvSpPr>
-          <p:cNvPr id="2" name="標題 1">
-            <a:extLst>
-              <a:ext uri="{FF2B5EF4-FFF2-40B4-BE49-F238E27FC236}">
-                <a16:creationId xmlns:a16="http://schemas.microsoft.com/office/drawing/2014/main" id="{647F4C66-668A-4D8A-8F51-F198A2B4C458}"/>
-              </a:ext>
-            </a:extLst>
-          </p:cNvPr>
-          <p:cNvSpPr>
-            <a:spLocks noGrp="1"/>
-          </p:cNvSpPr>
-          <p:nvPr>
-            <p:ph type="title"/>
-          </p:nvPr>
-        </p:nvSpPr>
-        <p:spPr/>
-        <p:txBody>
-          <a:bodyPr/>
-          <a:lstStyle/>
-          <a:p>
-            <a:r>
-              <a:rPr lang="en-US" altLang="zh-TW" dirty="0"/>
-              <a:t>ASYNC</a:t>
-            </a:r>
-            <a:r>
-              <a:rPr lang="zh-TW" altLang="en-US" dirty="0"/>
-              <a:t>整理</a:t>
-            </a:r>
-          </a:p>
-        </p:txBody>
-      </p:sp>
-      <p:sp>
-        <p:nvSpPr>
-          <p:cNvPr id="3" name="內容版面配置區 2">
-            <a:extLst>
-              <a:ext uri="{FF2B5EF4-FFF2-40B4-BE49-F238E27FC236}">
-                <a16:creationId xmlns:a16="http://schemas.microsoft.com/office/drawing/2014/main" id="{67B283EE-D519-443B-B399-B4DAAC0EE76D}"/>
-              </a:ext>
-            </a:extLst>
-          </p:cNvPr>
-          <p:cNvSpPr>
-            <a:spLocks noGrp="1"/>
-          </p:cNvSpPr>
-          <p:nvPr>
-            <p:ph idx="1"/>
-          </p:nvPr>
-        </p:nvSpPr>
-        <p:spPr/>
-        <p:txBody>
-          <a:bodyPr/>
-          <a:lstStyle/>
-          <a:p>
-            <a:r>
-              <a:rPr lang="en-US" altLang="zh-TW" dirty="0" err="1"/>
-              <a:t>CallBack</a:t>
-            </a:r>
-            <a:r>
-              <a:rPr lang="en-US" altLang="zh-TW" dirty="0"/>
-              <a:t> </a:t>
-            </a:r>
-            <a:r>
-              <a:rPr lang="zh-TW" altLang="en-US" dirty="0"/>
-              <a:t>是</a:t>
-            </a:r>
-            <a:r>
-              <a:rPr lang="en-US" altLang="zh-TW" dirty="0" err="1"/>
-              <a:t>js</a:t>
-            </a:r>
-            <a:r>
-              <a:rPr lang="zh-TW" altLang="en-US" dirty="0"/>
-              <a:t>在處理</a:t>
-            </a:r>
-            <a:r>
-              <a:rPr lang="en-US" altLang="zh-TW" dirty="0"/>
-              <a:t>non-</a:t>
-            </a:r>
-            <a:r>
-              <a:rPr lang="en-US" altLang="zh-TW" dirty="0" err="1"/>
-              <a:t>blockin</a:t>
-            </a:r>
-            <a:r>
-              <a:rPr lang="zh-TW" altLang="en-US" dirty="0"/>
-              <a:t>的設計方式</a:t>
-            </a:r>
-            <a:r>
-              <a:rPr lang="en-US" altLang="zh-TW" dirty="0"/>
-              <a:t>(</a:t>
-            </a:r>
-            <a:r>
-              <a:rPr lang="en-US" altLang="zh-TW" dirty="0" err="1"/>
-              <a:t>async</a:t>
-            </a:r>
-            <a:r>
-              <a:rPr lang="en-US" altLang="zh-TW" dirty="0"/>
-              <a:t>)</a:t>
-            </a:r>
-          </a:p>
-          <a:p>
-            <a:r>
-              <a:rPr lang="zh-TW" altLang="en-US" dirty="0"/>
-              <a:t>解決</a:t>
-            </a:r>
-            <a:r>
-              <a:rPr lang="en-US" altLang="zh-TW" dirty="0" err="1"/>
-              <a:t>CallBack</a:t>
-            </a:r>
-            <a:r>
-              <a:rPr lang="zh-TW" altLang="en-US" dirty="0"/>
-              <a:t> </a:t>
-            </a:r>
-            <a:r>
-              <a:rPr lang="en-US" altLang="zh-TW" dirty="0"/>
-              <a:t>Hell</a:t>
-            </a:r>
-          </a:p>
-          <a:p>
-            <a:pPr lvl="1"/>
-            <a:r>
-              <a:rPr lang="en-US" altLang="zh-TW" dirty="0"/>
-              <a:t>ES6 </a:t>
-            </a:r>
-            <a:r>
-              <a:rPr lang="en-US" altLang="zh-TW" dirty="0">
-                <a:sym typeface="Wingdings" panose="05000000000000000000" pitchFamily="2" charset="2"/>
-              </a:rPr>
-              <a:t> </a:t>
-            </a:r>
-            <a:r>
-              <a:rPr lang="en-US" altLang="zh-TW" dirty="0"/>
-              <a:t>promise</a:t>
-            </a:r>
-          </a:p>
-          <a:p>
-            <a:pPr lvl="1"/>
-            <a:r>
-              <a:rPr lang="en-US" altLang="zh-TW" dirty="0" err="1"/>
-              <a:t>Async</a:t>
-            </a:r>
-            <a:r>
-              <a:rPr lang="en-US" altLang="zh-TW" dirty="0"/>
-              <a:t> </a:t>
-            </a:r>
-            <a:r>
-              <a:rPr lang="en-US" altLang="zh-TW" dirty="0">
-                <a:sym typeface="Wingdings" panose="05000000000000000000" pitchFamily="2" charset="2"/>
-              </a:rPr>
-              <a:t> waterfall, each …</a:t>
-            </a:r>
-            <a:endParaRPr lang="en-US" altLang="zh-TW" dirty="0"/>
-          </a:p>
-          <a:p>
-            <a:pPr lvl="1"/>
-            <a:r>
-              <a:rPr lang="en-US" altLang="zh-TW" dirty="0"/>
-              <a:t>ES7 </a:t>
-            </a:r>
-            <a:r>
-              <a:rPr lang="en-US" altLang="zh-TW" dirty="0">
-                <a:sym typeface="Wingdings" panose="05000000000000000000" pitchFamily="2" charset="2"/>
-              </a:rPr>
-              <a:t> </a:t>
-            </a:r>
-            <a:r>
-              <a:rPr lang="en-US" altLang="zh-TW" dirty="0" err="1"/>
-              <a:t>async</a:t>
-            </a:r>
-            <a:r>
-              <a:rPr lang="en-US" altLang="zh-TW" dirty="0"/>
-              <a:t> await</a:t>
-            </a:r>
-          </a:p>
-          <a:p>
-            <a:pPr lvl="1"/>
-            <a:r>
-              <a:rPr lang="en-US" altLang="zh-TW" dirty="0" err="1"/>
-              <a:t>nodejs</a:t>
-            </a:r>
-            <a:r>
-              <a:rPr lang="en-US" altLang="zh-TW" dirty="0">
-                <a:sym typeface="Wingdings" panose="05000000000000000000" pitchFamily="2" charset="2"/>
-              </a:rPr>
-              <a:t>  </a:t>
-            </a:r>
-            <a:r>
-              <a:rPr lang="en-US" altLang="zh-TW" dirty="0" err="1">
-                <a:sym typeface="Wingdings" panose="05000000000000000000" pitchFamily="2" charset="2"/>
-              </a:rPr>
-              <a:t>promisify</a:t>
-            </a:r>
-            <a:endParaRPr lang="en-US" altLang="zh-TW" dirty="0"/>
-          </a:p>
-        </p:txBody>
-      </p:sp>
-      <p:sp>
-        <p:nvSpPr>
-          <p:cNvPr id="4" name="頁尾版面配置區 3">
-            <a:extLst>
-              <a:ext uri="{FF2B5EF4-FFF2-40B4-BE49-F238E27FC236}">
-                <a16:creationId xmlns:a16="http://schemas.microsoft.com/office/drawing/2014/main" id="{06890AFF-36AE-4479-A2BD-6831DAAAB459}"/>
-              </a:ext>
-            </a:extLst>
-          </p:cNvPr>
-          <p:cNvSpPr>
-            <a:spLocks noGrp="1"/>
-          </p:cNvSpPr>
-          <p:nvPr>
-            <p:ph type="ftr" sz="quarter" idx="11"/>
-          </p:nvPr>
-        </p:nvSpPr>
-        <p:spPr/>
-        <p:txBody>
-          <a:bodyPr/>
-          <a:lstStyle/>
-          <a:p>
-            <a:r>
-              <a:rPr lang="en-US" altLang="zh-TW"/>
-              <a:t>104</a:t>
-            </a:r>
-            <a:r>
-              <a:rPr lang="zh-TW" altLang="en-US"/>
-              <a:t>人資學院  </a:t>
-            </a:r>
-            <a:r>
-              <a:rPr lang="en-US" altLang="zh-TW"/>
-              <a:t>All Rights Reserved</a:t>
-            </a:r>
-            <a:endParaRPr lang="zh-TW" altLang="en-US"/>
-          </a:p>
-        </p:txBody>
-      </p:sp>
-    </p:spTree>
-    <p:extLst>
-      <p:ext uri="{BB962C8B-B14F-4D97-AF65-F5344CB8AC3E}">
-        <p14:creationId xmlns:p14="http://schemas.microsoft.com/office/powerpoint/2010/main" val="477108725"/>
-      </p:ext>
-    </p:extLst>
-  </p:cSld>
-  <p:clrMapOvr>
-    <a:masterClrMapping/>
-  </p:clrMapOvr>
-</p:sld>
-</file>
-
-<file path=ppt/slides/slide15.xml><?xml version="1.0" encoding="utf-8"?>
-<p:sld xmlns:a="http://schemas.openxmlformats.org/drawingml/2006/main" xmlns:r="http://schemas.openxmlformats.org/officeDocument/2006/relationships" xmlns:p="http://schemas.openxmlformats.org/presentationml/2006/main">
-  <p:cSld>
-    <p:spTree>
-      <p:nvGrpSpPr>
-        <p:cNvPr id="1" name=""/>
-        <p:cNvGrpSpPr/>
-        <p:nvPr/>
-      </p:nvGrpSpPr>
-      <p:grpSpPr>
-        <a:xfrm>
-          <a:off x="0" y="0"/>
-          <a:ext cx="0" cy="0"/>
-          <a:chOff x="0" y="0"/>
-          <a:chExt cx="0" cy="0"/>
-        </a:xfrm>
-      </p:grpSpPr>
-      <p:sp>
-        <p:nvSpPr>
-          <p:cNvPr id="2" name="標題 1">
-            <a:extLst>
-              <a:ext uri="{FF2B5EF4-FFF2-40B4-BE49-F238E27FC236}">
                 <a16:creationId xmlns:a16="http://schemas.microsoft.com/office/drawing/2014/main" id="{50FD158A-3005-4C2F-9E0B-172513459AB0}"/>
               </a:ext>
             </a:extLst>
@@ -5032,7 +4515,7 @@
 </p:sld>
 </file>
 
-<file path=ppt/slides/slide16.xml><?xml version="1.0" encoding="utf-8"?>
+<file path=ppt/slides/slide14.xml><?xml version="1.0" encoding="utf-8"?>
 <p:sld xmlns:a="http://schemas.openxmlformats.org/drawingml/2006/main" xmlns:r="http://schemas.openxmlformats.org/officeDocument/2006/relationships" xmlns:p="http://schemas.openxmlformats.org/presentationml/2006/main">
   <p:cSld>
     <p:spTree>

</xml_diff>

<commit_message>
add paragraph to ppt
</commit_message>
<xml_diff>
--- a/2019_0627_Git_Share_HA.pptx
+++ b/2019_0627_Git_Share_HA.pptx
@@ -4231,6 +4231,44 @@
         <p:txBody>
           <a:bodyPr/>
           <a:lstStyle/>
+          <a:p>
+            <a:r>
+              <a:rPr lang="en-US" altLang="zh-TW" dirty="0"/>
+              <a:t>git log</a:t>
+            </a:r>
+          </a:p>
+          <a:p>
+            <a:r>
+              <a:rPr lang="en-US" altLang="zh-TW" dirty="0"/>
+              <a:t>git </a:t>
+            </a:r>
+            <a:r>
+              <a:rPr lang="en-US" altLang="zh-TW" dirty="0" err="1"/>
+              <a:t>reflog</a:t>
+            </a:r>
+            <a:endParaRPr lang="en-US" altLang="zh-TW" dirty="0"/>
+          </a:p>
+          <a:p>
+            <a:endParaRPr lang="en-US" altLang="zh-TW" dirty="0"/>
+          </a:p>
+          <a:p>
+            <a:r>
+              <a:rPr lang="en-US" altLang="zh-TW" dirty="0"/>
+              <a:t>git reset</a:t>
+            </a:r>
+          </a:p>
+          <a:p>
+            <a:r>
+              <a:rPr lang="en-US" altLang="zh-TW" dirty="0"/>
+              <a:t>git revert</a:t>
+            </a:r>
+          </a:p>
+          <a:p>
+            <a:r>
+              <a:rPr lang="en-US" altLang="zh-TW" dirty="0"/>
+              <a:t>git cherry-pick</a:t>
+            </a:r>
+          </a:p>
           <a:p>
             <a:endParaRPr lang="zh-TW" altLang="en-US" dirty="0"/>
           </a:p>

</xml_diff>

<commit_message>
add def of git pull
</commit_message>
<xml_diff>
--- a/2019_0627_Git_Share_HA.pptx
+++ b/2019_0627_Git_Share_HA.pptx
@@ -5,7 +5,7 @@
     <p:sldMasterId id="2147483648" r:id="rId1"/>
   </p:sldMasterIdLst>
   <p:notesMasterIdLst>
-    <p:notesMasterId r:id="rId16"/>
+    <p:notesMasterId r:id="rId20"/>
   </p:notesMasterIdLst>
   <p:sldIdLst>
     <p:sldId id="256" r:id="rId2"/>
@@ -16,12 +16,16 @@
     <p:sldId id="267" r:id="rId7"/>
     <p:sldId id="268" r:id="rId8"/>
     <p:sldId id="269" r:id="rId9"/>
-    <p:sldId id="270" r:id="rId10"/>
-    <p:sldId id="271" r:id="rId11"/>
+    <p:sldId id="271" r:id="rId10"/>
+    <p:sldId id="270" r:id="rId11"/>
     <p:sldId id="272" r:id="rId12"/>
     <p:sldId id="273" r:id="rId13"/>
-    <p:sldId id="263" r:id="rId14"/>
-    <p:sldId id="258" r:id="rId15"/>
+    <p:sldId id="274" r:id="rId14"/>
+    <p:sldId id="275" r:id="rId15"/>
+    <p:sldId id="276" r:id="rId16"/>
+    <p:sldId id="277" r:id="rId17"/>
+    <p:sldId id="263" r:id="rId18"/>
+    <p:sldId id="258" r:id="rId19"/>
   </p:sldIdLst>
   <p:sldSz cx="9144000" cy="6858000" type="screen4x3"/>
   <p:notesSz cx="6858000" cy="9144000"/>
@@ -3893,7 +3897,7 @@
           <p:cNvPr id="2" name="標題 1">
             <a:extLst>
               <a:ext uri="{FF2B5EF4-FFF2-40B4-BE49-F238E27FC236}">
-                <a16:creationId xmlns:a16="http://schemas.microsoft.com/office/drawing/2014/main" id="{F4C8D03F-7BF2-443A-B34B-E942512AB6D4}"/>
+                <a16:creationId xmlns:a16="http://schemas.microsoft.com/office/drawing/2014/main" id="{BFFEE0E3-D896-49FC-AD42-28E39E9F6684}"/>
               </a:ext>
             </a:extLst>
           </p:cNvPr>
@@ -3911,96 +3915,30 @@
           <a:p>
             <a:r>
               <a:rPr lang="en-US" altLang="zh-TW" dirty="0"/>
-              <a:t>commit</a:t>
-            </a:r>
-            <a:endParaRPr lang="zh-TW" altLang="en-US" dirty="0"/>
-          </a:p>
-        </p:txBody>
-      </p:sp>
-      <p:sp>
-        <p:nvSpPr>
-          <p:cNvPr id="4" name="頁尾版面配置區 3">
+              <a:t>Commit </a:t>
+            </a:r>
+            <a:r>
+              <a:rPr lang="zh-TW" altLang="en-US" dirty="0"/>
+              <a:t>的結構</a:t>
+            </a:r>
+          </a:p>
+        </p:txBody>
+      </p:sp>
+      <p:pic>
+        <p:nvPicPr>
+          <p:cNvPr id="6" name="內容版面配置區 5">
             <a:extLst>
               <a:ext uri="{FF2B5EF4-FFF2-40B4-BE49-F238E27FC236}">
-                <a16:creationId xmlns:a16="http://schemas.microsoft.com/office/drawing/2014/main" id="{F22D0A4E-9104-421C-B2EC-E5932C5BF52D}"/>
-              </a:ext>
-            </a:extLst>
-          </p:cNvPr>
-          <p:cNvSpPr>
-            <a:spLocks noGrp="1"/>
-          </p:cNvSpPr>
-          <p:nvPr>
-            <p:ph type="ftr" sz="quarter" idx="11"/>
-          </p:nvPr>
-        </p:nvSpPr>
-        <p:spPr/>
-        <p:txBody>
-          <a:bodyPr/>
-          <a:lstStyle/>
-          <a:p>
-            <a:r>
-              <a:rPr lang="en-US" altLang="zh-TW"/>
-              <a:t>104</a:t>
-            </a:r>
-            <a:r>
-              <a:rPr lang="zh-TW" altLang="en-US"/>
-              <a:t>人資學院  </a:t>
-            </a:r>
-            <a:r>
-              <a:rPr lang="en-US" altLang="zh-TW"/>
-              <a:t>All Rights Reserved</a:t>
-            </a:r>
-            <a:endParaRPr lang="zh-TW" altLang="en-US"/>
-          </a:p>
-        </p:txBody>
-      </p:sp>
-      <p:sp>
-        <p:nvSpPr>
-          <p:cNvPr id="8" name="內容版面配置區 7">
-            <a:extLst>
-              <a:ext uri="{FF2B5EF4-FFF2-40B4-BE49-F238E27FC236}">
-                <a16:creationId xmlns:a16="http://schemas.microsoft.com/office/drawing/2014/main" id="{E657D714-AC9F-4963-9721-E48B1BD94B3D}"/>
-              </a:ext>
-            </a:extLst>
-          </p:cNvPr>
-          <p:cNvSpPr>
-            <a:spLocks noGrp="1"/>
-          </p:cNvSpPr>
-          <p:nvPr>
-            <p:ph idx="1"/>
-          </p:nvPr>
-        </p:nvSpPr>
-        <p:spPr/>
-        <p:txBody>
-          <a:bodyPr/>
-          <a:lstStyle/>
-          <a:p>
-            <a:r>
-              <a:rPr lang="en-US" altLang="zh-TW" dirty="0"/>
-              <a:t>git add &lt;file&gt; / git reset -- &lt;file&gt;</a:t>
-            </a:r>
-          </a:p>
-          <a:p>
-            <a:r>
-              <a:rPr lang="en-US" altLang="zh-TW" dirty="0"/>
-              <a:t>git commit / git reset HEAD^</a:t>
-            </a:r>
-          </a:p>
-        </p:txBody>
-      </p:sp>
-      <p:pic>
-        <p:nvPicPr>
-          <p:cNvPr id="10" name="圖片 9">
-            <a:extLst>
-              <a:ext uri="{FF2B5EF4-FFF2-40B4-BE49-F238E27FC236}">
-                <a16:creationId xmlns:a16="http://schemas.microsoft.com/office/drawing/2014/main" id="{E8F073B9-3951-4DF2-AB89-270F11395BF4}"/>
+                <a16:creationId xmlns:a16="http://schemas.microsoft.com/office/drawing/2014/main" id="{3A551CA5-4852-4D58-BD45-5A55C6098D88}"/>
               </a:ext>
             </a:extLst>
           </p:cNvPr>
           <p:cNvPicPr>
-            <a:picLocks noChangeAspect="1"/>
+            <a:picLocks noGrp="1" noChangeAspect="1"/>
           </p:cNvPicPr>
-          <p:nvPr/>
+          <p:nvPr>
+            <p:ph idx="1"/>
+          </p:nvPr>
         </p:nvPicPr>
         <p:blipFill>
           <a:blip r:embed="rId2">
@@ -4016,18 +3954,52 @@
         </p:blipFill>
         <p:spPr>
           <a:xfrm>
-            <a:off x="1367644" y="2996952"/>
-            <a:ext cx="6408712" cy="2751214"/>
+            <a:off x="1626592" y="1916832"/>
+            <a:ext cx="5890815" cy="3982191"/>
           </a:xfrm>
-          <a:prstGeom prst="rect">
-            <a:avLst/>
-          </a:prstGeom>
         </p:spPr>
       </p:pic>
+      <p:sp>
+        <p:nvSpPr>
+          <p:cNvPr id="4" name="頁尾版面配置區 3">
+            <a:extLst>
+              <a:ext uri="{FF2B5EF4-FFF2-40B4-BE49-F238E27FC236}">
+                <a16:creationId xmlns:a16="http://schemas.microsoft.com/office/drawing/2014/main" id="{65E62AEC-C8E7-49D7-AEC4-504FDCB9DE5C}"/>
+              </a:ext>
+            </a:extLst>
+          </p:cNvPr>
+          <p:cNvSpPr>
+            <a:spLocks noGrp="1"/>
+          </p:cNvSpPr>
+          <p:nvPr>
+            <p:ph type="ftr" sz="quarter" idx="11"/>
+          </p:nvPr>
+        </p:nvSpPr>
+        <p:spPr/>
+        <p:txBody>
+          <a:bodyPr/>
+          <a:lstStyle/>
+          <a:p>
+            <a:r>
+              <a:rPr lang="en-US" altLang="zh-TW"/>
+              <a:t>104</a:t>
+            </a:r>
+            <a:r>
+              <a:rPr lang="zh-TW" altLang="en-US"/>
+              <a:t>人資學院  </a:t>
+            </a:r>
+            <a:r>
+              <a:rPr lang="en-US" altLang="zh-TW"/>
+              <a:t>All Rights Reserved</a:t>
+            </a:r>
+            <a:endParaRPr lang="zh-TW" altLang="en-US"/>
+          </a:p>
+        </p:txBody>
+      </p:sp>
     </p:spTree>
     <p:extLst>
       <p:ext uri="{BB962C8B-B14F-4D97-AF65-F5344CB8AC3E}">
-        <p14:creationId xmlns:p14="http://schemas.microsoft.com/office/powerpoint/2010/main" val="2254284079"/>
+        <p14:creationId xmlns:p14="http://schemas.microsoft.com/office/powerpoint/2010/main" val="2471281583"/>
       </p:ext>
     </p:extLst>
   </p:cSld>
@@ -4346,6 +4318,540 @@
           <p:cNvPr id="2" name="標題 1">
             <a:extLst>
               <a:ext uri="{FF2B5EF4-FFF2-40B4-BE49-F238E27FC236}">
+                <a16:creationId xmlns:a16="http://schemas.microsoft.com/office/drawing/2014/main" id="{E18474E4-5251-4C95-988C-ED141435C816}"/>
+              </a:ext>
+            </a:extLst>
+          </p:cNvPr>
+          <p:cNvSpPr>
+            <a:spLocks noGrp="1"/>
+          </p:cNvSpPr>
+          <p:nvPr>
+            <p:ph type="title"/>
+          </p:nvPr>
+        </p:nvSpPr>
+        <p:spPr/>
+        <p:txBody>
+          <a:bodyPr/>
+          <a:lstStyle/>
+          <a:p>
+            <a:r>
+              <a:rPr lang="en-US" altLang="zh-TW" dirty="0"/>
+              <a:t>git reset</a:t>
+            </a:r>
+            <a:endParaRPr lang="zh-TW" altLang="en-US" dirty="0"/>
+          </a:p>
+        </p:txBody>
+      </p:sp>
+      <p:pic>
+        <p:nvPicPr>
+          <p:cNvPr id="6" name="內容版面配置區 5">
+            <a:extLst>
+              <a:ext uri="{FF2B5EF4-FFF2-40B4-BE49-F238E27FC236}">
+                <a16:creationId xmlns:a16="http://schemas.microsoft.com/office/drawing/2014/main" id="{4667679F-9C24-423F-8068-4BEA57B575CF}"/>
+              </a:ext>
+            </a:extLst>
+          </p:cNvPr>
+          <p:cNvPicPr>
+            <a:picLocks noGrp="1" noChangeAspect="1"/>
+          </p:cNvPicPr>
+          <p:nvPr>
+            <p:ph idx="1"/>
+          </p:nvPr>
+        </p:nvPicPr>
+        <p:blipFill>
+          <a:blip r:embed="rId2">
+            <a:extLst>
+              <a:ext uri="{28A0092B-C50C-407E-A947-70E740481C1C}">
+                <a14:useLocalDpi xmlns:a14="http://schemas.microsoft.com/office/drawing/2010/main" val="0"/>
+              </a:ext>
+            </a:extLst>
+          </a:blip>
+          <a:stretch>
+            <a:fillRect/>
+          </a:stretch>
+        </p:blipFill>
+        <p:spPr>
+          <a:xfrm>
+            <a:off x="1184986" y="1340768"/>
+            <a:ext cx="6774028" cy="5044826"/>
+          </a:xfrm>
+        </p:spPr>
+      </p:pic>
+      <p:sp>
+        <p:nvSpPr>
+          <p:cNvPr id="4" name="頁尾版面配置區 3">
+            <a:extLst>
+              <a:ext uri="{FF2B5EF4-FFF2-40B4-BE49-F238E27FC236}">
+                <a16:creationId xmlns:a16="http://schemas.microsoft.com/office/drawing/2014/main" id="{D32FFBB7-342D-4ECE-B696-678EAA8A584A}"/>
+              </a:ext>
+            </a:extLst>
+          </p:cNvPr>
+          <p:cNvSpPr>
+            <a:spLocks noGrp="1"/>
+          </p:cNvSpPr>
+          <p:nvPr>
+            <p:ph type="ftr" sz="quarter" idx="11"/>
+          </p:nvPr>
+        </p:nvSpPr>
+        <p:spPr/>
+        <p:txBody>
+          <a:bodyPr/>
+          <a:lstStyle/>
+          <a:p>
+            <a:r>
+              <a:rPr lang="en-US" altLang="zh-TW"/>
+              <a:t>104</a:t>
+            </a:r>
+            <a:r>
+              <a:rPr lang="zh-TW" altLang="en-US"/>
+              <a:t>人資學院  </a:t>
+            </a:r>
+            <a:r>
+              <a:rPr lang="en-US" altLang="zh-TW"/>
+              <a:t>All Rights Reserved</a:t>
+            </a:r>
+            <a:endParaRPr lang="zh-TW" altLang="en-US"/>
+          </a:p>
+        </p:txBody>
+      </p:sp>
+    </p:spTree>
+    <p:extLst>
+      <p:ext uri="{BB962C8B-B14F-4D97-AF65-F5344CB8AC3E}">
+        <p14:creationId xmlns:p14="http://schemas.microsoft.com/office/powerpoint/2010/main" val="2162669686"/>
+      </p:ext>
+    </p:extLst>
+  </p:cSld>
+  <p:clrMapOvr>
+    <a:masterClrMapping/>
+  </p:clrMapOvr>
+</p:sld>
+</file>
+
+<file path=ppt/slides/slide14.xml><?xml version="1.0" encoding="utf-8"?>
+<p:sld xmlns:a="http://schemas.openxmlformats.org/drawingml/2006/main" xmlns:r="http://schemas.openxmlformats.org/officeDocument/2006/relationships" xmlns:p="http://schemas.openxmlformats.org/presentationml/2006/main">
+  <p:cSld>
+    <p:spTree>
+      <p:nvGrpSpPr>
+        <p:cNvPr id="1" name=""/>
+        <p:cNvGrpSpPr/>
+        <p:nvPr/>
+      </p:nvGrpSpPr>
+      <p:grpSpPr>
+        <a:xfrm>
+          <a:off x="0" y="0"/>
+          <a:ext cx="0" cy="0"/>
+          <a:chOff x="0" y="0"/>
+          <a:chExt cx="0" cy="0"/>
+        </a:xfrm>
+      </p:grpSpPr>
+      <p:sp>
+        <p:nvSpPr>
+          <p:cNvPr id="2" name="標題 1">
+            <a:extLst>
+              <a:ext uri="{FF2B5EF4-FFF2-40B4-BE49-F238E27FC236}">
+                <a16:creationId xmlns:a16="http://schemas.microsoft.com/office/drawing/2014/main" id="{F0926E6E-9B88-4725-9516-94C1C779F3B9}"/>
+              </a:ext>
+            </a:extLst>
+          </p:cNvPr>
+          <p:cNvSpPr>
+            <a:spLocks noGrp="1"/>
+          </p:cNvSpPr>
+          <p:nvPr>
+            <p:ph type="title"/>
+          </p:nvPr>
+        </p:nvSpPr>
+        <p:spPr/>
+        <p:txBody>
+          <a:bodyPr/>
+          <a:lstStyle/>
+          <a:p>
+            <a:r>
+              <a:rPr lang="en-US" altLang="zh-TW" dirty="0"/>
+              <a:t>git revert</a:t>
+            </a:r>
+            <a:endParaRPr lang="zh-TW" altLang="en-US" dirty="0"/>
+          </a:p>
+        </p:txBody>
+      </p:sp>
+      <p:pic>
+        <p:nvPicPr>
+          <p:cNvPr id="6" name="內容版面配置區 5">
+            <a:extLst>
+              <a:ext uri="{FF2B5EF4-FFF2-40B4-BE49-F238E27FC236}">
+                <a16:creationId xmlns:a16="http://schemas.microsoft.com/office/drawing/2014/main" id="{47E815E2-1394-48D9-BED1-79568E143C4B}"/>
+              </a:ext>
+            </a:extLst>
+          </p:cNvPr>
+          <p:cNvPicPr>
+            <a:picLocks noGrp="1" noChangeAspect="1"/>
+          </p:cNvPicPr>
+          <p:nvPr>
+            <p:ph idx="1"/>
+          </p:nvPr>
+        </p:nvPicPr>
+        <p:blipFill>
+          <a:blip r:embed="rId2">
+            <a:extLst>
+              <a:ext uri="{28A0092B-C50C-407E-A947-70E740481C1C}">
+                <a14:useLocalDpi xmlns:a14="http://schemas.microsoft.com/office/drawing/2010/main" val="0"/>
+              </a:ext>
+            </a:extLst>
+          </a:blip>
+          <a:stretch>
+            <a:fillRect/>
+          </a:stretch>
+        </p:blipFill>
+        <p:spPr>
+          <a:xfrm>
+            <a:off x="1201692" y="2060849"/>
+            <a:ext cx="6740616" cy="3604666"/>
+          </a:xfrm>
+        </p:spPr>
+      </p:pic>
+      <p:sp>
+        <p:nvSpPr>
+          <p:cNvPr id="4" name="頁尾版面配置區 3">
+            <a:extLst>
+              <a:ext uri="{FF2B5EF4-FFF2-40B4-BE49-F238E27FC236}">
+                <a16:creationId xmlns:a16="http://schemas.microsoft.com/office/drawing/2014/main" id="{8AD330CA-C329-4FE9-8747-39799FD3D86E}"/>
+              </a:ext>
+            </a:extLst>
+          </p:cNvPr>
+          <p:cNvSpPr>
+            <a:spLocks noGrp="1"/>
+          </p:cNvSpPr>
+          <p:nvPr>
+            <p:ph type="ftr" sz="quarter" idx="11"/>
+          </p:nvPr>
+        </p:nvSpPr>
+        <p:spPr/>
+        <p:txBody>
+          <a:bodyPr/>
+          <a:lstStyle/>
+          <a:p>
+            <a:r>
+              <a:rPr lang="en-US" altLang="zh-TW"/>
+              <a:t>104</a:t>
+            </a:r>
+            <a:r>
+              <a:rPr lang="zh-TW" altLang="en-US"/>
+              <a:t>人資學院  </a:t>
+            </a:r>
+            <a:r>
+              <a:rPr lang="en-US" altLang="zh-TW"/>
+              <a:t>All Rights Reserved</a:t>
+            </a:r>
+            <a:endParaRPr lang="zh-TW" altLang="en-US"/>
+          </a:p>
+        </p:txBody>
+      </p:sp>
+    </p:spTree>
+    <p:extLst>
+      <p:ext uri="{BB962C8B-B14F-4D97-AF65-F5344CB8AC3E}">
+        <p14:creationId xmlns:p14="http://schemas.microsoft.com/office/powerpoint/2010/main" val="673396586"/>
+      </p:ext>
+    </p:extLst>
+  </p:cSld>
+  <p:clrMapOvr>
+    <a:masterClrMapping/>
+  </p:clrMapOvr>
+</p:sld>
+</file>
+
+<file path=ppt/slides/slide15.xml><?xml version="1.0" encoding="utf-8"?>
+<p:sld xmlns:a="http://schemas.openxmlformats.org/drawingml/2006/main" xmlns:r="http://schemas.openxmlformats.org/officeDocument/2006/relationships" xmlns:p="http://schemas.openxmlformats.org/presentationml/2006/main">
+  <p:cSld>
+    <p:spTree>
+      <p:nvGrpSpPr>
+        <p:cNvPr id="1" name=""/>
+        <p:cNvGrpSpPr/>
+        <p:nvPr/>
+      </p:nvGrpSpPr>
+      <p:grpSpPr>
+        <a:xfrm>
+          <a:off x="0" y="0"/>
+          <a:ext cx="0" cy="0"/>
+          <a:chOff x="0" y="0"/>
+          <a:chExt cx="0" cy="0"/>
+        </a:xfrm>
+      </p:grpSpPr>
+      <p:sp>
+        <p:nvSpPr>
+          <p:cNvPr id="2" name="標題 1">
+            <a:extLst>
+              <a:ext uri="{FF2B5EF4-FFF2-40B4-BE49-F238E27FC236}">
+                <a16:creationId xmlns:a16="http://schemas.microsoft.com/office/drawing/2014/main" id="{68EFB24C-0379-4CFF-81D1-16A5BC12F95C}"/>
+              </a:ext>
+            </a:extLst>
+          </p:cNvPr>
+          <p:cNvSpPr>
+            <a:spLocks noGrp="1"/>
+          </p:cNvSpPr>
+          <p:nvPr>
+            <p:ph type="title"/>
+          </p:nvPr>
+        </p:nvSpPr>
+        <p:spPr/>
+        <p:txBody>
+          <a:bodyPr/>
+          <a:lstStyle/>
+          <a:p>
+            <a:r>
+              <a:rPr lang="en-US" altLang="zh-TW" dirty="0"/>
+              <a:t>git cherry-pick</a:t>
+            </a:r>
+            <a:endParaRPr lang="zh-TW" altLang="en-US" dirty="0"/>
+          </a:p>
+        </p:txBody>
+      </p:sp>
+      <p:pic>
+        <p:nvPicPr>
+          <p:cNvPr id="6" name="內容版面配置區 5">
+            <a:extLst>
+              <a:ext uri="{FF2B5EF4-FFF2-40B4-BE49-F238E27FC236}">
+                <a16:creationId xmlns:a16="http://schemas.microsoft.com/office/drawing/2014/main" id="{CA9C99F7-B077-4489-B6ED-7A5EF3ADEE02}"/>
+              </a:ext>
+            </a:extLst>
+          </p:cNvPr>
+          <p:cNvPicPr>
+            <a:picLocks noGrp="1" noChangeAspect="1"/>
+          </p:cNvPicPr>
+          <p:nvPr>
+            <p:ph idx="1"/>
+          </p:nvPr>
+        </p:nvPicPr>
+        <p:blipFill>
+          <a:blip r:embed="rId2">
+            <a:extLst>
+              <a:ext uri="{28A0092B-C50C-407E-A947-70E740481C1C}">
+                <a14:useLocalDpi xmlns:a14="http://schemas.microsoft.com/office/drawing/2010/main" val="0"/>
+              </a:ext>
+            </a:extLst>
+          </a:blip>
+          <a:stretch>
+            <a:fillRect/>
+          </a:stretch>
+        </p:blipFill>
+        <p:spPr>
+          <a:xfrm>
+            <a:off x="1331640" y="1972971"/>
+            <a:ext cx="6480720" cy="3780420"/>
+          </a:xfrm>
+        </p:spPr>
+      </p:pic>
+      <p:sp>
+        <p:nvSpPr>
+          <p:cNvPr id="4" name="頁尾版面配置區 3">
+            <a:extLst>
+              <a:ext uri="{FF2B5EF4-FFF2-40B4-BE49-F238E27FC236}">
+                <a16:creationId xmlns:a16="http://schemas.microsoft.com/office/drawing/2014/main" id="{1749E8FA-7421-4F9A-8813-3D49F426C46C}"/>
+              </a:ext>
+            </a:extLst>
+          </p:cNvPr>
+          <p:cNvSpPr>
+            <a:spLocks noGrp="1"/>
+          </p:cNvSpPr>
+          <p:nvPr>
+            <p:ph type="ftr" sz="quarter" idx="11"/>
+          </p:nvPr>
+        </p:nvSpPr>
+        <p:spPr/>
+        <p:txBody>
+          <a:bodyPr/>
+          <a:lstStyle/>
+          <a:p>
+            <a:r>
+              <a:rPr lang="en-US" altLang="zh-TW"/>
+              <a:t>104</a:t>
+            </a:r>
+            <a:r>
+              <a:rPr lang="zh-TW" altLang="en-US"/>
+              <a:t>人資學院  </a:t>
+            </a:r>
+            <a:r>
+              <a:rPr lang="en-US" altLang="zh-TW"/>
+              <a:t>All Rights Reserved</a:t>
+            </a:r>
+            <a:endParaRPr lang="zh-TW" altLang="en-US"/>
+          </a:p>
+        </p:txBody>
+      </p:sp>
+    </p:spTree>
+    <p:extLst>
+      <p:ext uri="{BB962C8B-B14F-4D97-AF65-F5344CB8AC3E}">
+        <p14:creationId xmlns:p14="http://schemas.microsoft.com/office/powerpoint/2010/main" val="3339302955"/>
+      </p:ext>
+    </p:extLst>
+  </p:cSld>
+  <p:clrMapOvr>
+    <a:masterClrMapping/>
+  </p:clrMapOvr>
+</p:sld>
+</file>
+
+<file path=ppt/slides/slide16.xml><?xml version="1.0" encoding="utf-8"?>
+<p:sld xmlns:a="http://schemas.openxmlformats.org/drawingml/2006/main" xmlns:r="http://schemas.openxmlformats.org/officeDocument/2006/relationships" xmlns:p="http://schemas.openxmlformats.org/presentationml/2006/main">
+  <p:cSld>
+    <p:spTree>
+      <p:nvGrpSpPr>
+        <p:cNvPr id="1" name=""/>
+        <p:cNvGrpSpPr/>
+        <p:nvPr/>
+      </p:nvGrpSpPr>
+      <p:grpSpPr>
+        <a:xfrm>
+          <a:off x="0" y="0"/>
+          <a:ext cx="0" cy="0"/>
+          <a:chOff x="0" y="0"/>
+          <a:chExt cx="0" cy="0"/>
+        </a:xfrm>
+      </p:grpSpPr>
+      <p:sp>
+        <p:nvSpPr>
+          <p:cNvPr id="2" name="標題 1">
+            <a:extLst>
+              <a:ext uri="{FF2B5EF4-FFF2-40B4-BE49-F238E27FC236}">
+                <a16:creationId xmlns:a16="http://schemas.microsoft.com/office/drawing/2014/main" id="{1112BDCB-BE94-4727-941C-E907AEC3328C}"/>
+              </a:ext>
+            </a:extLst>
+          </p:cNvPr>
+          <p:cNvSpPr>
+            <a:spLocks noGrp="1"/>
+          </p:cNvSpPr>
+          <p:nvPr>
+            <p:ph type="title"/>
+          </p:nvPr>
+        </p:nvSpPr>
+        <p:spPr/>
+        <p:txBody>
+          <a:bodyPr/>
+          <a:lstStyle/>
+          <a:p>
+            <a:r>
+              <a:rPr lang="en-US" altLang="zh-TW" dirty="0"/>
+              <a:t>git branch</a:t>
+            </a:r>
+            <a:r>
+              <a:rPr lang="zh-TW" altLang="en-US" dirty="0"/>
+              <a:t> 的相關操作</a:t>
+            </a:r>
+          </a:p>
+        </p:txBody>
+      </p:sp>
+      <p:sp>
+        <p:nvSpPr>
+          <p:cNvPr id="3" name="內容版面配置區 2">
+            <a:extLst>
+              <a:ext uri="{FF2B5EF4-FFF2-40B4-BE49-F238E27FC236}">
+                <a16:creationId xmlns:a16="http://schemas.microsoft.com/office/drawing/2014/main" id="{01FA9E98-7A1B-4DEC-AA24-87357FFA1532}"/>
+              </a:ext>
+            </a:extLst>
+          </p:cNvPr>
+          <p:cNvSpPr>
+            <a:spLocks noGrp="1"/>
+          </p:cNvSpPr>
+          <p:nvPr>
+            <p:ph idx="1"/>
+          </p:nvPr>
+        </p:nvSpPr>
+        <p:spPr/>
+        <p:txBody>
+          <a:bodyPr/>
+          <a:lstStyle/>
+          <a:p>
+            <a:r>
+              <a:rPr lang="en-US" altLang="zh-TW" dirty="0"/>
+              <a:t>git fetch</a:t>
+            </a:r>
+            <a:r>
+              <a:rPr lang="zh-TW" altLang="en-US" dirty="0"/>
+              <a:t> </a:t>
+            </a:r>
+            <a:r>
+              <a:rPr lang="en-US" altLang="zh-TW" dirty="0"/>
+              <a:t>(git pull = git fetch + git merge)</a:t>
+            </a:r>
+          </a:p>
+          <a:p>
+            <a:endParaRPr lang="en-US" altLang="zh-TW" dirty="0"/>
+          </a:p>
+          <a:p>
+            <a:endParaRPr lang="zh-TW" altLang="en-US" dirty="0"/>
+          </a:p>
+        </p:txBody>
+      </p:sp>
+      <p:sp>
+        <p:nvSpPr>
+          <p:cNvPr id="4" name="頁尾版面配置區 3">
+            <a:extLst>
+              <a:ext uri="{FF2B5EF4-FFF2-40B4-BE49-F238E27FC236}">
+                <a16:creationId xmlns:a16="http://schemas.microsoft.com/office/drawing/2014/main" id="{B910B239-2AC6-4CCB-B12B-422DFB75E142}"/>
+              </a:ext>
+            </a:extLst>
+          </p:cNvPr>
+          <p:cNvSpPr>
+            <a:spLocks noGrp="1"/>
+          </p:cNvSpPr>
+          <p:nvPr>
+            <p:ph type="ftr" sz="quarter" idx="11"/>
+          </p:nvPr>
+        </p:nvSpPr>
+        <p:spPr/>
+        <p:txBody>
+          <a:bodyPr/>
+          <a:lstStyle/>
+          <a:p>
+            <a:r>
+              <a:rPr lang="en-US" altLang="zh-TW"/>
+              <a:t>104</a:t>
+            </a:r>
+            <a:r>
+              <a:rPr lang="zh-TW" altLang="en-US"/>
+              <a:t>人資學院  </a:t>
+            </a:r>
+            <a:r>
+              <a:rPr lang="en-US" altLang="zh-TW"/>
+              <a:t>All Rights Reserved</a:t>
+            </a:r>
+            <a:endParaRPr lang="zh-TW" altLang="en-US"/>
+          </a:p>
+        </p:txBody>
+      </p:sp>
+    </p:spTree>
+    <p:extLst>
+      <p:ext uri="{BB962C8B-B14F-4D97-AF65-F5344CB8AC3E}">
+        <p14:creationId xmlns:p14="http://schemas.microsoft.com/office/powerpoint/2010/main" val="94732751"/>
+      </p:ext>
+    </p:extLst>
+  </p:cSld>
+  <p:clrMapOvr>
+    <a:masterClrMapping/>
+  </p:clrMapOvr>
+</p:sld>
+</file>
+
+<file path=ppt/slides/slide17.xml><?xml version="1.0" encoding="utf-8"?>
+<p:sld xmlns:a="http://schemas.openxmlformats.org/drawingml/2006/main" xmlns:r="http://schemas.openxmlformats.org/officeDocument/2006/relationships" xmlns:p="http://schemas.openxmlformats.org/presentationml/2006/main">
+  <p:cSld>
+    <p:spTree>
+      <p:nvGrpSpPr>
+        <p:cNvPr id="1" name=""/>
+        <p:cNvGrpSpPr/>
+        <p:nvPr/>
+      </p:nvGrpSpPr>
+      <p:grpSpPr>
+        <a:xfrm>
+          <a:off x="0" y="0"/>
+          <a:ext cx="0" cy="0"/>
+          <a:chOff x="0" y="0"/>
+          <a:chExt cx="0" cy="0"/>
+        </a:xfrm>
+      </p:grpSpPr>
+      <p:sp>
+        <p:nvSpPr>
+          <p:cNvPr id="2" name="標題 1">
+            <a:extLst>
+              <a:ext uri="{FF2B5EF4-FFF2-40B4-BE49-F238E27FC236}">
                 <a16:creationId xmlns:a16="http://schemas.microsoft.com/office/drawing/2014/main" id="{50FD158A-3005-4C2F-9E0B-172513459AB0}"/>
               </a:ext>
             </a:extLst>
@@ -4553,7 +5059,7 @@
 </p:sld>
 </file>
 
-<file path=ppt/slides/slide14.xml><?xml version="1.0" encoding="utf-8"?>
+<file path=ppt/slides/slide18.xml><?xml version="1.0" encoding="utf-8"?>
 <p:sld xmlns:a="http://schemas.openxmlformats.org/drawingml/2006/main" xmlns:r="http://schemas.openxmlformats.org/officeDocument/2006/relationships" xmlns:p="http://schemas.openxmlformats.org/presentationml/2006/main">
   <p:cSld>
     <p:spTree>
@@ -6144,7 +6650,7 @@
           <p:cNvPr id="2" name="標題 1">
             <a:extLst>
               <a:ext uri="{FF2B5EF4-FFF2-40B4-BE49-F238E27FC236}">
-                <a16:creationId xmlns:a16="http://schemas.microsoft.com/office/drawing/2014/main" id="{BFFEE0E3-D896-49FC-AD42-28E39E9F6684}"/>
+                <a16:creationId xmlns:a16="http://schemas.microsoft.com/office/drawing/2014/main" id="{F4C8D03F-7BF2-443A-B34B-E942512AB6D4}"/>
               </a:ext>
             </a:extLst>
           </p:cNvPr>
@@ -6162,27 +6668,104 @@
           <a:p>
             <a:r>
               <a:rPr lang="en-US" altLang="zh-TW" dirty="0"/>
-              <a:t>commit</a:t>
+              <a:t>Commit</a:t>
+            </a:r>
+            <a:r>
+              <a:rPr lang="zh-TW" altLang="en-US" dirty="0"/>
+              <a:t> </a:t>
+            </a:r>
+            <a:r>
+              <a:rPr lang="en-US" altLang="zh-TW" dirty="0"/>
+              <a:t>work-tree</a:t>
             </a:r>
             <a:endParaRPr lang="zh-TW" altLang="en-US" dirty="0"/>
+          </a:p>
+        </p:txBody>
+      </p:sp>
+      <p:sp>
+        <p:nvSpPr>
+          <p:cNvPr id="4" name="頁尾版面配置區 3">
+            <a:extLst>
+              <a:ext uri="{FF2B5EF4-FFF2-40B4-BE49-F238E27FC236}">
+                <a16:creationId xmlns:a16="http://schemas.microsoft.com/office/drawing/2014/main" id="{F22D0A4E-9104-421C-B2EC-E5932C5BF52D}"/>
+              </a:ext>
+            </a:extLst>
+          </p:cNvPr>
+          <p:cNvSpPr>
+            <a:spLocks noGrp="1"/>
+          </p:cNvSpPr>
+          <p:nvPr>
+            <p:ph type="ftr" sz="quarter" idx="11"/>
+          </p:nvPr>
+        </p:nvSpPr>
+        <p:spPr/>
+        <p:txBody>
+          <a:bodyPr/>
+          <a:lstStyle/>
+          <a:p>
+            <a:r>
+              <a:rPr lang="en-US" altLang="zh-TW"/>
+              <a:t>104</a:t>
+            </a:r>
+            <a:r>
+              <a:rPr lang="zh-TW" altLang="en-US"/>
+              <a:t>人資學院  </a:t>
+            </a:r>
+            <a:r>
+              <a:rPr lang="en-US" altLang="zh-TW"/>
+              <a:t>All Rights Reserved</a:t>
+            </a:r>
+            <a:endParaRPr lang="zh-TW" altLang="en-US"/>
+          </a:p>
+        </p:txBody>
+      </p:sp>
+      <p:sp>
+        <p:nvSpPr>
+          <p:cNvPr id="8" name="內容版面配置區 7">
+            <a:extLst>
+              <a:ext uri="{FF2B5EF4-FFF2-40B4-BE49-F238E27FC236}">
+                <a16:creationId xmlns:a16="http://schemas.microsoft.com/office/drawing/2014/main" id="{E657D714-AC9F-4963-9721-E48B1BD94B3D}"/>
+              </a:ext>
+            </a:extLst>
+          </p:cNvPr>
+          <p:cNvSpPr>
+            <a:spLocks noGrp="1"/>
+          </p:cNvSpPr>
+          <p:nvPr>
+            <p:ph idx="1"/>
+          </p:nvPr>
+        </p:nvSpPr>
+        <p:spPr/>
+        <p:txBody>
+          <a:bodyPr/>
+          <a:lstStyle/>
+          <a:p>
+            <a:r>
+              <a:rPr lang="en-US" altLang="zh-TW" dirty="0"/>
+              <a:t>git add &lt;file&gt; / git reset -- &lt;file&gt;</a:t>
+            </a:r>
+          </a:p>
+          <a:p>
+            <a:r>
+              <a:rPr lang="en-US" altLang="zh-TW" dirty="0"/>
+              <a:t>git commit / git reset HEAD^</a:t>
+            </a:r>
           </a:p>
         </p:txBody>
       </p:sp>
       <p:pic>
         <p:nvPicPr>
-          <p:cNvPr id="6" name="內容版面配置區 5">
+          <p:cNvPr id="10" name="圖片 9">
             <a:extLst>
               <a:ext uri="{FF2B5EF4-FFF2-40B4-BE49-F238E27FC236}">
-                <a16:creationId xmlns:a16="http://schemas.microsoft.com/office/drawing/2014/main" id="{3A551CA5-4852-4D58-BD45-5A55C6098D88}"/>
+                <a16:creationId xmlns:a16="http://schemas.microsoft.com/office/drawing/2014/main" id="{E8F073B9-3951-4DF2-AB89-270F11395BF4}"/>
               </a:ext>
             </a:extLst>
           </p:cNvPr>
           <p:cNvPicPr>
-            <a:picLocks noGrp="1" noChangeAspect="1"/>
+            <a:picLocks noChangeAspect="1"/>
           </p:cNvPicPr>
-          <p:nvPr>
-            <p:ph idx="1"/>
-          </p:nvPr>
+          <p:nvPr/>
         </p:nvPicPr>
         <p:blipFill>
           <a:blip r:embed="rId2">
@@ -6198,52 +6781,18 @@
         </p:blipFill>
         <p:spPr>
           <a:xfrm>
-            <a:off x="1626592" y="1916832"/>
-            <a:ext cx="5890815" cy="3982191"/>
+            <a:off x="1367644" y="2996952"/>
+            <a:ext cx="6408712" cy="2751214"/>
           </a:xfrm>
+          <a:prstGeom prst="rect">
+            <a:avLst/>
+          </a:prstGeom>
         </p:spPr>
       </p:pic>
-      <p:sp>
-        <p:nvSpPr>
-          <p:cNvPr id="4" name="頁尾版面配置區 3">
-            <a:extLst>
-              <a:ext uri="{FF2B5EF4-FFF2-40B4-BE49-F238E27FC236}">
-                <a16:creationId xmlns:a16="http://schemas.microsoft.com/office/drawing/2014/main" id="{65E62AEC-C8E7-49D7-AEC4-504FDCB9DE5C}"/>
-              </a:ext>
-            </a:extLst>
-          </p:cNvPr>
-          <p:cNvSpPr>
-            <a:spLocks noGrp="1"/>
-          </p:cNvSpPr>
-          <p:nvPr>
-            <p:ph type="ftr" sz="quarter" idx="11"/>
-          </p:nvPr>
-        </p:nvSpPr>
-        <p:spPr/>
-        <p:txBody>
-          <a:bodyPr/>
-          <a:lstStyle/>
-          <a:p>
-            <a:r>
-              <a:rPr lang="en-US" altLang="zh-TW"/>
-              <a:t>104</a:t>
-            </a:r>
-            <a:r>
-              <a:rPr lang="zh-TW" altLang="en-US"/>
-              <a:t>人資學院  </a:t>
-            </a:r>
-            <a:r>
-              <a:rPr lang="en-US" altLang="zh-TW"/>
-              <a:t>All Rights Reserved</a:t>
-            </a:r>
-            <a:endParaRPr lang="zh-TW" altLang="en-US"/>
-          </a:p>
-        </p:txBody>
-      </p:sp>
     </p:spTree>
     <p:extLst>
       <p:ext uri="{BB962C8B-B14F-4D97-AF65-F5344CB8AC3E}">
-        <p14:creationId xmlns:p14="http://schemas.microsoft.com/office/powerpoint/2010/main" val="2471281583"/>
+        <p14:creationId xmlns:p14="http://schemas.microsoft.com/office/powerpoint/2010/main" val="2254284079"/>
       </p:ext>
     </p:extLst>
   </p:cSld>

</xml_diff>

<commit_message>
update config description to push.default
</commit_message>
<xml_diff>
--- a/2019_0627_Git_Share_HA.pptx
+++ b/2019_0627_Git_Share_HA.pptx
@@ -4081,9 +4081,13 @@
           <a:p>
             <a:r>
               <a:rPr lang="en-US" altLang="zh-TW" dirty="0"/>
-              <a:t>assume-unchanged</a:t>
-            </a:r>
-            <a:endParaRPr lang="zh-TW" altLang="en-US" dirty="0"/>
+              <a:t>assume-unchanged	 </a:t>
+            </a:r>
+            <a:r>
+              <a:rPr lang="zh-TW" altLang="en-US" dirty="0"/>
+              <a:t>練習</a:t>
+            </a:r>
+            <a:endParaRPr lang="en-US" altLang="zh-TW" dirty="0"/>
           </a:p>
         </p:txBody>
       </p:sp>
@@ -4754,7 +4758,12 @@
             <p:ph idx="1"/>
           </p:nvPr>
         </p:nvSpPr>
-        <p:spPr/>
+        <p:spPr>
+          <a:xfrm>
+            <a:off x="457200" y="1600200"/>
+            <a:ext cx="8229600" cy="4525963"/>
+          </a:xfrm>
+        </p:spPr>
         <p:txBody>
           <a:bodyPr/>
           <a:lstStyle/>
@@ -4773,10 +4782,34 @@
             </a:r>
           </a:p>
           <a:p>
-            <a:endParaRPr lang="en-US" altLang="zh-TW" dirty="0"/>
-          </a:p>
-          <a:p>
-            <a:endParaRPr lang="zh-TW" altLang="en-US" dirty="0"/>
+            <a:r>
+              <a:rPr lang="en-US" altLang="zh-TW" dirty="0"/>
+              <a:t>git tracking</a:t>
+            </a:r>
+          </a:p>
+          <a:p>
+            <a:r>
+              <a:rPr lang="en-US" altLang="zh-TW" dirty="0"/>
+              <a:t>git merge</a:t>
+            </a:r>
+          </a:p>
+          <a:p>
+            <a:r>
+              <a:rPr lang="en-US" altLang="zh-TW" dirty="0"/>
+              <a:t>git rebase</a:t>
+            </a:r>
+          </a:p>
+          <a:p>
+            <a:r>
+              <a:rPr lang="en-US" altLang="zh-TW" dirty="0"/>
+              <a:t>git pull</a:t>
+            </a:r>
+          </a:p>
+          <a:p>
+            <a:r>
+              <a:rPr lang="en-US" altLang="zh-TW" dirty="0"/>
+              <a:t>git push</a:t>
+            </a:r>
           </a:p>
         </p:txBody>
       </p:sp>

</xml_diff>

<commit_message>
ppt & github modify
</commit_message>
<xml_diff>
--- a/2019_0627_Git_Share_HA.pptx
+++ b/2019_0627_Git_Share_HA.pptx
@@ -5077,19 +5077,19 @@
           <a:p>
             <a:r>
               <a:rPr lang="en-US" altLang="zh-TW" dirty="0"/>
-              <a:t>git branch -b</a:t>
-            </a:r>
-          </a:p>
-          <a:p>
-            <a:r>
-              <a:rPr lang="en-US" altLang="zh-TW" dirty="0"/>
-              <a:t>git branch -d</a:t>
-            </a:r>
-          </a:p>
-          <a:p>
-            <a:r>
-              <a:rPr lang="en-US" altLang="zh-TW" dirty="0"/>
-              <a:t>git branch -D</a:t>
+              <a:t>git branch –b &gt;&gt; new branch</a:t>
+            </a:r>
+          </a:p>
+          <a:p>
+            <a:r>
+              <a:rPr lang="en-US" altLang="zh-TW" dirty="0"/>
+              <a:t>git branch –d &gt;&gt; delete branch</a:t>
+            </a:r>
+          </a:p>
+          <a:p>
+            <a:r>
+              <a:rPr lang="en-US" altLang="zh-TW" dirty="0"/>
+              <a:t>git branch –D &gt;&gt; force delete branch</a:t>
             </a:r>
           </a:p>
           <a:p>
@@ -5292,7 +5292,7 @@
         <p:spPr>
           <a:xfrm>
             <a:off x="5720694" y="5939392"/>
-            <a:ext cx="3273076" cy="369332"/>
+            <a:ext cx="4095545" cy="369332"/>
           </a:xfrm>
           <a:prstGeom prst="rect">
             <a:avLst/>
@@ -5307,7 +5307,7 @@
           <a:p>
             <a:r>
               <a:rPr lang="en-US" altLang="zh-TW" dirty="0"/>
-              <a:t>*git merge dev / git merge prod?</a:t>
+              <a:t>*(V)git merge feature / git merge master?</a:t>
             </a:r>
             <a:endParaRPr lang="zh-TW" altLang="en-US" dirty="0"/>
           </a:p>
@@ -5526,8 +5526,12 @@
           </a:p>
           <a:p>
             <a:r>
-              <a:rPr lang="en-US" altLang="zh-TW" dirty="0"/>
-              <a:t>Gitlab (issue tracking, branch by issue(?), pull request)</a:t>
+              <a:rPr lang="en-US" altLang="zh-TW" dirty="0" err="1"/>
+              <a:t>Githab</a:t>
+            </a:r>
+            <a:r>
+              <a:rPr lang="en-US" altLang="zh-TW" dirty="0"/>
+              <a:t> (issue tracking, branch by issue(?), pull request)</a:t>
             </a:r>
           </a:p>
           <a:p>
@@ -5721,7 +5725,7 @@
         <p:spPr>
           <a:xfrm>
             <a:off x="5720694" y="5939392"/>
-            <a:ext cx="3334887" cy="369332"/>
+            <a:ext cx="4142031" cy="369332"/>
           </a:xfrm>
           <a:prstGeom prst="rect">
             <a:avLst/>
@@ -5736,7 +5740,7 @@
           <a:p>
             <a:r>
               <a:rPr lang="en-US" altLang="zh-TW" dirty="0"/>
-              <a:t>*git rebase dev / git rebase prod?</a:t>
+              <a:t>*git rebase staging / (V)git rebase master?</a:t>
             </a:r>
             <a:endParaRPr lang="zh-TW" altLang="en-US" dirty="0"/>
           </a:p>
@@ -6170,8 +6174,13 @@
           <a:p>
             <a:r>
               <a:rPr lang="en-US" altLang="zh-TW" dirty="0"/>
-              <a:t>git pull –rebase</a:t>
-            </a:r>
+              <a:t>git pull --rebase	</a:t>
+            </a:r>
+            <a:r>
+              <a:rPr lang="zh-TW" altLang="en-US" dirty="0"/>
+              <a:t>建議加入此動作即可</a:t>
+            </a:r>
+            <a:endParaRPr lang="en-US" altLang="zh-TW" dirty="0"/>
           </a:p>
           <a:p>
             <a:r>
@@ -6190,7 +6199,7 @@
           <a:p>
             <a:r>
               <a:rPr lang="en-US" altLang="zh-TW" dirty="0"/>
-              <a:t>git push -f</a:t>
+              <a:t>git push –f `force push without protect`</a:t>
             </a:r>
             <a:endParaRPr lang="zh-TW" altLang="en-US" dirty="0"/>
           </a:p>
@@ -6454,31 +6463,39 @@
           <a:p>
             <a:r>
               <a:rPr lang="en-US" altLang="zh-TW" dirty="0"/>
-              <a:t>git config</a:t>
-            </a:r>
-          </a:p>
-          <a:p>
-            <a:r>
-              <a:rPr lang="en-US" altLang="zh-TW" dirty="0"/>
-              <a:t>git ignore</a:t>
-            </a:r>
-          </a:p>
-          <a:p>
-            <a:r>
-              <a:rPr lang="en-US" altLang="zh-TW" dirty="0"/>
-              <a:t>git attributes</a:t>
-            </a:r>
-          </a:p>
-          <a:p>
-            <a:r>
-              <a:rPr lang="en-US" altLang="zh-TW" dirty="0"/>
-              <a:t>git hook</a:t>
-            </a:r>
-          </a:p>
-          <a:p>
-            <a:r>
-              <a:rPr lang="en-US" altLang="zh-TW" dirty="0"/>
-              <a:t>git rev-parse</a:t>
+              <a:t>git config	`alias`</a:t>
+            </a:r>
+          </a:p>
+          <a:p>
+            <a:r>
+              <a:rPr lang="en-US" altLang="zh-TW" dirty="0"/>
+              <a:t>git ignore	`~$`, `</a:t>
+            </a:r>
+            <a:r>
+              <a:rPr lang="en-US" altLang="zh-TW" dirty="0" err="1"/>
+              <a:t>node_modules</a:t>
+            </a:r>
+            <a:r>
+              <a:rPr lang="en-US" altLang="zh-TW" dirty="0"/>
+              <a:t>/`</a:t>
+            </a:r>
+          </a:p>
+          <a:p>
+            <a:r>
+              <a:rPr lang="en-US" altLang="zh-TW" dirty="0"/>
+              <a:t>git attributes	`* -text`</a:t>
+            </a:r>
+          </a:p>
+          <a:p>
+            <a:r>
+              <a:rPr lang="en-US" altLang="zh-TW" dirty="0"/>
+              <a:t>git hook		`pre-commit`</a:t>
+            </a:r>
+          </a:p>
+          <a:p>
+            <a:r>
+              <a:rPr lang="en-US" altLang="zh-TW" dirty="0"/>
+              <a:t>git rev-parse    `sha1`</a:t>
             </a:r>
           </a:p>
           <a:p>
@@ -6492,8 +6509,13 @@
             </a:r>
             <a:r>
               <a:rPr lang="en-US" altLang="zh-TW" dirty="0"/>
-              <a:t> --count --all dev</a:t>
-            </a:r>
+              <a:t> --count --</a:t>
+            </a:r>
+            <a:r>
+              <a:rPr lang="en-US" altLang="zh-TW"/>
+              <a:t>all dev   `208`</a:t>
+            </a:r>
+            <a:endParaRPr lang="en-US" altLang="zh-TW" dirty="0"/>
           </a:p>
         </p:txBody>
       </p:sp>

</xml_diff>